<commit_message>
Last Update 05-02-2019 18:55:06.86
</commit_message>
<xml_diff>
--- a/Slides/GE8291-U2.pptx
+++ b/Slides/GE8291-U2.pptx
@@ -5,7 +5,7 @@
     <p:sldMasterId id="2147483648" r:id="rId1"/>
   </p:sldMasterIdLst>
   <p:notesMasterIdLst>
-    <p:notesMasterId r:id="rId19"/>
+    <p:notesMasterId r:id="rId36"/>
   </p:notesMasterIdLst>
   <p:sldIdLst>
     <p:sldId id="256" r:id="rId2"/>
@@ -24,7 +24,24 @@
     <p:sldId id="286" r:id="rId15"/>
     <p:sldId id="287" r:id="rId16"/>
     <p:sldId id="288" r:id="rId17"/>
-    <p:sldId id="272" r:id="rId18"/>
+    <p:sldId id="289" r:id="rId18"/>
+    <p:sldId id="290" r:id="rId19"/>
+    <p:sldId id="291" r:id="rId20"/>
+    <p:sldId id="292" r:id="rId21"/>
+    <p:sldId id="293" r:id="rId22"/>
+    <p:sldId id="294" r:id="rId23"/>
+    <p:sldId id="295" r:id="rId24"/>
+    <p:sldId id="296" r:id="rId25"/>
+    <p:sldId id="297" r:id="rId26"/>
+    <p:sldId id="299" r:id="rId27"/>
+    <p:sldId id="300" r:id="rId28"/>
+    <p:sldId id="301" r:id="rId29"/>
+    <p:sldId id="302" r:id="rId30"/>
+    <p:sldId id="303" r:id="rId31"/>
+    <p:sldId id="304" r:id="rId32"/>
+    <p:sldId id="305" r:id="rId33"/>
+    <p:sldId id="306" r:id="rId34"/>
+    <p:sldId id="272" r:id="rId35"/>
   </p:sldIdLst>
   <p:sldSz cx="9144000" cy="6858000" type="screen4x3"/>
   <p:notesSz cx="6858000" cy="9144000"/>
@@ -123,6 +140,22 @@
       </a:defRPr>
     </a:lvl9pPr>
   </p:defaultTextStyle>
+  <p:extLst>
+    <p:ext uri="{EFAFB233-063F-42B5-8137-9DF3F51BA10A}">
+      <p15:sldGuideLst xmlns:p15="http://schemas.microsoft.com/office/powerpoint/2012/main">
+        <p15:guide id="1" orient="horz" pos="2160">
+          <p15:clr>
+            <a:srgbClr val="A4A3A4"/>
+          </p15:clr>
+        </p15:guide>
+        <p15:guide id="2" pos="2880">
+          <p15:clr>
+            <a:srgbClr val="A4A3A4"/>
+          </p15:clr>
+        </p15:guide>
+      </p15:sldGuideLst>
+    </p:ext>
+  </p:extLst>
 </p:presentation>
 </file>
 
@@ -209,7 +242,7 @@
             <a:fld id="{9515075B-F3F0-4441-A1BD-B7B515B708FF}" type="datetimeFigureOut">
               <a:rPr lang="en-US" smtClean="0"/>
               <a:pPr/>
-              <a:t>1/24/2019</a:t>
+              <a:t>2/4/2019</a:t>
             </a:fld>
             <a:endParaRPr lang="en-US"/>
           </a:p>
@@ -378,6 +411,11 @@
         </p:txBody>
       </p:sp>
     </p:spTree>
+    <p:extLst>
+      <p:ext uri="{BB962C8B-B14F-4D97-AF65-F5344CB8AC3E}">
+        <p14:creationId xmlns:p14="http://schemas.microsoft.com/office/powerpoint/2010/main" val="2470614597"/>
+      </p:ext>
+    </p:extLst>
   </p:cSld>
   <p:clrMap bg1="lt1" tx1="dk1" bg2="lt2" tx2="dk2" accent1="accent1" accent2="accent2" accent3="accent3" accent4="accent4" accent5="accent5" accent6="accent6" hlink="hlink" folHlink="folHlink"/>
   <p:notesStyle>
@@ -676,7 +714,7 @@
             <a:fld id="{6E658DF8-B8C0-4C7F-85EB-B53A2DDD44A9}" type="datetimeFigureOut">
               <a:rPr lang="en-US" smtClean="0"/>
               <a:pPr/>
-              <a:t>1/24/2019</a:t>
+              <a:t>2/4/2019</a:t>
             </a:fld>
             <a:endParaRPr lang="en-US"/>
           </a:p>
@@ -843,7 +881,7 @@
             <a:fld id="{6E658DF8-B8C0-4C7F-85EB-B53A2DDD44A9}" type="datetimeFigureOut">
               <a:rPr lang="en-US" smtClean="0"/>
               <a:pPr/>
-              <a:t>1/24/2019</a:t>
+              <a:t>2/4/2019</a:t>
             </a:fld>
             <a:endParaRPr lang="en-US"/>
           </a:p>
@@ -1020,7 +1058,7 @@
             <a:fld id="{6E658DF8-B8C0-4C7F-85EB-B53A2DDD44A9}" type="datetimeFigureOut">
               <a:rPr lang="en-US" smtClean="0"/>
               <a:pPr/>
-              <a:t>1/24/2019</a:t>
+              <a:t>2/4/2019</a:t>
             </a:fld>
             <a:endParaRPr lang="en-US"/>
           </a:p>
@@ -1219,7 +1257,7 @@
             <a:fld id="{6E658DF8-B8C0-4C7F-85EB-B53A2DDD44A9}" type="datetimeFigureOut">
               <a:rPr lang="en-US" smtClean="0"/>
               <a:pPr/>
-              <a:t>1/24/2019</a:t>
+              <a:t>2/4/2019</a:t>
             </a:fld>
             <a:endParaRPr lang="en-US"/>
           </a:p>
@@ -1462,7 +1500,7 @@
             <a:fld id="{6E658DF8-B8C0-4C7F-85EB-B53A2DDD44A9}" type="datetimeFigureOut">
               <a:rPr lang="en-US" smtClean="0"/>
               <a:pPr/>
-              <a:t>1/24/2019</a:t>
+              <a:t>2/4/2019</a:t>
             </a:fld>
             <a:endParaRPr lang="en-US"/>
           </a:p>
@@ -1747,7 +1785,7 @@
             <a:fld id="{6E658DF8-B8C0-4C7F-85EB-B53A2DDD44A9}" type="datetimeFigureOut">
               <a:rPr lang="en-US" smtClean="0"/>
               <a:pPr/>
-              <a:t>1/24/2019</a:t>
+              <a:t>2/4/2019</a:t>
             </a:fld>
             <a:endParaRPr lang="en-US"/>
           </a:p>
@@ -2166,7 +2204,7 @@
             <a:fld id="{6E658DF8-B8C0-4C7F-85EB-B53A2DDD44A9}" type="datetimeFigureOut">
               <a:rPr lang="en-US" smtClean="0"/>
               <a:pPr/>
-              <a:t>1/24/2019</a:t>
+              <a:t>2/4/2019</a:t>
             </a:fld>
             <a:endParaRPr lang="en-US"/>
           </a:p>
@@ -2281,7 +2319,7 @@
             <a:fld id="{6E658DF8-B8C0-4C7F-85EB-B53A2DDD44A9}" type="datetimeFigureOut">
               <a:rPr lang="en-US" smtClean="0"/>
               <a:pPr/>
-              <a:t>1/24/2019</a:t>
+              <a:t>2/4/2019</a:t>
             </a:fld>
             <a:endParaRPr lang="en-US"/>
           </a:p>
@@ -2373,7 +2411,7 @@
             <a:fld id="{6E658DF8-B8C0-4C7F-85EB-B53A2DDD44A9}" type="datetimeFigureOut">
               <a:rPr lang="en-US" smtClean="0"/>
               <a:pPr/>
-              <a:t>1/24/2019</a:t>
+              <a:t>2/4/2019</a:t>
             </a:fld>
             <a:endParaRPr lang="en-US"/>
           </a:p>
@@ -2647,7 +2685,7 @@
             <a:fld id="{6E658DF8-B8C0-4C7F-85EB-B53A2DDD44A9}" type="datetimeFigureOut">
               <a:rPr lang="en-US" smtClean="0"/>
               <a:pPr/>
-              <a:t>1/24/2019</a:t>
+              <a:t>2/4/2019</a:t>
             </a:fld>
             <a:endParaRPr lang="en-US"/>
           </a:p>
@@ -2901,7 +2939,7 @@
             <a:fld id="{6E658DF8-B8C0-4C7F-85EB-B53A2DDD44A9}" type="datetimeFigureOut">
               <a:rPr lang="en-US" smtClean="0"/>
               <a:pPr/>
-              <a:t>1/24/2019</a:t>
+              <a:t>2/4/2019</a:t>
             </a:fld>
             <a:endParaRPr lang="en-US"/>
           </a:p>
@@ -3123,7 +3161,7 @@
             <a:fld id="{6E658DF8-B8C0-4C7F-85EB-B53A2DDD44A9}" type="datetimeFigureOut">
               <a:rPr lang="en-US" smtClean="0"/>
               <a:pPr/>
-              <a:t>1/24/2019</a:t>
+              <a:t>2/4/2019</a:t>
             </a:fld>
             <a:endParaRPr lang="en-US"/>
           </a:p>
@@ -3780,11 +3818,7 @@
             </a:r>
             <a:r>
               <a:rPr lang="en-IN" dirty="0" smtClean="0"/>
-              <a:t> + </a:t>
-            </a:r>
-            <a:r>
-              <a:rPr lang="en-IN" dirty="0" smtClean="0"/>
-              <a:t>h</a:t>
+              <a:t> + h</a:t>
             </a:r>
             <a:r>
               <a:rPr lang="el-GR" dirty="0" smtClean="0">
@@ -3883,13 +3917,7 @@
               <a:rPr lang="en-IN" dirty="0" smtClean="0">
                 <a:sym typeface="Wingdings" pitchFamily="2" charset="2"/>
               </a:rPr>
-              <a:t> </a:t>
-            </a:r>
-            <a:r>
-              <a:rPr lang="en-IN" dirty="0" smtClean="0">
-                <a:sym typeface="Wingdings" pitchFamily="2" charset="2"/>
-              </a:rPr>
-              <a:t>+ [O]  [</a:t>
+              <a:t> + [O]  [</a:t>
             </a:r>
             <a:r>
               <a:rPr lang="en-IN" dirty="0" err="1" smtClean="0">
@@ -4366,11 +4394,7 @@
             </a:r>
             <a:r>
               <a:rPr lang="en-IN" dirty="0" smtClean="0"/>
-              <a:t> </a:t>
-            </a:r>
-            <a:r>
-              <a:rPr lang="en-IN" dirty="0" smtClean="0"/>
-              <a:t>+ H</a:t>
+              <a:t> + H</a:t>
             </a:r>
             <a:r>
               <a:rPr lang="en-IN" sz="1600" dirty="0" smtClean="0"/>
@@ -4384,13 +4408,7 @@
               <a:rPr lang="en-IN" dirty="0" smtClean="0">
                 <a:sym typeface="Wingdings" pitchFamily="2" charset="2"/>
               </a:rPr>
-              <a:t> </a:t>
-            </a:r>
-            <a:r>
-              <a:rPr lang="en-IN" dirty="0" smtClean="0">
-                <a:sym typeface="Wingdings" pitchFamily="2" charset="2"/>
-              </a:rPr>
-              <a:t>H</a:t>
+              <a:t> H</a:t>
             </a:r>
             <a:r>
               <a:rPr lang="en-IN" sz="1600" dirty="0" smtClean="0">
@@ -4829,352 +4847,313 @@
             <p:ph type="title"/>
           </p:nvPr>
         </p:nvSpPr>
-        <p:spPr>
-          <a:xfrm>
-            <a:off x="457200" y="1981200"/>
-            <a:ext cx="8229600" cy="1143000"/>
-          </a:xfrm>
-        </p:spPr>
+        <p:spPr/>
         <p:txBody>
           <a:bodyPr/>
           <a:lstStyle/>
           <a:p>
             <a:r>
-              <a:rPr lang="en-US" dirty="0" smtClean="0"/>
-              <a:t>Thank You</a:t>
-            </a:r>
-            <a:endParaRPr lang="en-US" dirty="0"/>
-          </a:p>
-        </p:txBody>
-      </p:sp>
-      <p:sp>
-        <p:nvSpPr>
-          <p:cNvPr id="4" name="Subtitle 2"/>
-          <p:cNvSpPr txBox="1">
-            <a:spLocks/>
-          </p:cNvSpPr>
-          <p:nvPr/>
-        </p:nvSpPr>
-        <p:spPr>
-          <a:xfrm>
-            <a:off x="4038600" y="4191000"/>
-            <a:ext cx="4191000" cy="1752600"/>
-          </a:xfrm>
-          <a:prstGeom prst="rect">
-            <a:avLst/>
-          </a:prstGeom>
-        </p:spPr>
-        <p:txBody>
-          <a:bodyPr vert="horz" lIns="91440" tIns="45720" rIns="91440" bIns="45720" rtlCol="0">
-            <a:normAutofit fontScale="92500" lnSpcReduction="10000"/>
-          </a:bodyPr>
-          <a:lstStyle/>
-          <a:p>
-            <a:pPr marL="342900" marR="0" lvl="0" indent="-342900" algn="r" defTabSz="914400" rtl="0" eaLnBrk="1" fontAlgn="auto" latinLnBrk="0" hangingPunct="1">
-              <a:lnSpc>
-                <a:spcPct val="100000"/>
-              </a:lnSpc>
-              <a:spcBef>
-                <a:spcPct val="20000"/>
-              </a:spcBef>
-              <a:spcAft>
-                <a:spcPts val="0"/>
-              </a:spcAft>
-              <a:buClrTx/>
-              <a:buSzTx/>
-              <a:tabLst/>
-              <a:defRPr/>
-            </a:pPr>
-            <a:r>
-              <a:rPr kumimoji="0" lang="en-US" sz="2200" b="0" i="0" u="none" strike="noStrike" kern="1200" cap="none" spc="0" normalizeH="0" baseline="0" noProof="0" dirty="0" err="1" smtClean="0">
-                <a:ln>
-                  <a:noFill/>
-                </a:ln>
-                <a:solidFill>
-                  <a:schemeClr val="tx1"/>
-                </a:solidFill>
-                <a:effectLst/>
-                <a:uLnTx/>
-                <a:uFillTx/>
-                <a:latin typeface="Cambria" pitchFamily="18" charset="0"/>
-                <a:ea typeface="+mn-ea"/>
-                <a:cs typeface="+mn-cs"/>
-              </a:rPr>
-              <a:t>Rajasekaran</a:t>
-            </a:r>
-            <a:r>
-              <a:rPr kumimoji="0" lang="en-US" sz="2200" b="0" i="0" u="none" strike="noStrike" kern="1200" cap="none" spc="0" normalizeH="0" baseline="0" noProof="0" dirty="0" smtClean="0">
-                <a:ln>
-                  <a:noFill/>
-                </a:ln>
-                <a:solidFill>
-                  <a:schemeClr val="tx1"/>
-                </a:solidFill>
-                <a:effectLst/>
-                <a:uLnTx/>
-                <a:uFillTx/>
-                <a:latin typeface="Cambria" pitchFamily="18" charset="0"/>
-                <a:ea typeface="+mn-ea"/>
-                <a:cs typeface="+mn-cs"/>
-              </a:rPr>
-              <a:t> S</a:t>
-            </a:r>
-          </a:p>
-          <a:p>
-            <a:pPr marL="342900" marR="0" lvl="0" indent="-342900" algn="r" defTabSz="914400" rtl="0" eaLnBrk="1" fontAlgn="auto" latinLnBrk="0" hangingPunct="1">
-              <a:lnSpc>
-                <a:spcPct val="100000"/>
-              </a:lnSpc>
-              <a:spcBef>
-                <a:spcPct val="20000"/>
-              </a:spcBef>
-              <a:spcAft>
-                <a:spcPts val="0"/>
-              </a:spcAft>
-              <a:buClrTx/>
-              <a:buSzTx/>
-              <a:tabLst/>
-              <a:defRPr/>
-            </a:pPr>
-            <a:r>
-              <a:rPr kumimoji="0" lang="en-US" sz="1600" b="0" i="0" u="none" strike="noStrike" kern="1200" cap="none" spc="0" normalizeH="0" baseline="0" noProof="0" dirty="0" smtClean="0">
-                <a:ln>
-                  <a:noFill/>
-                </a:ln>
-                <a:solidFill>
-                  <a:schemeClr val="tx1"/>
-                </a:solidFill>
-                <a:effectLst/>
-                <a:uLnTx/>
-                <a:uFillTx/>
-                <a:latin typeface="Cambria" pitchFamily="18" charset="0"/>
-                <a:ea typeface="+mn-ea"/>
-                <a:cs typeface="+mn-cs"/>
-              </a:rPr>
-              <a:t>Assistant Professor,</a:t>
-            </a:r>
-          </a:p>
-          <a:p>
-            <a:pPr marL="342900" marR="0" lvl="0" indent="-342900" algn="r" defTabSz="914400" rtl="0" eaLnBrk="1" fontAlgn="auto" latinLnBrk="0" hangingPunct="1">
-              <a:lnSpc>
-                <a:spcPct val="100000"/>
-              </a:lnSpc>
-              <a:spcBef>
-                <a:spcPct val="20000"/>
-              </a:spcBef>
-              <a:spcAft>
-                <a:spcPts val="0"/>
-              </a:spcAft>
-              <a:buClrTx/>
-              <a:buSzTx/>
-              <a:tabLst/>
-              <a:defRPr/>
-            </a:pPr>
-            <a:r>
-              <a:rPr kumimoji="0" lang="en-US" sz="1600" b="0" i="0" u="none" strike="noStrike" kern="1200" cap="none" spc="0" normalizeH="0" baseline="0" noProof="0" dirty="0" smtClean="0">
-                <a:ln>
-                  <a:noFill/>
-                </a:ln>
-                <a:solidFill>
-                  <a:schemeClr val="tx1"/>
-                </a:solidFill>
-                <a:effectLst/>
-                <a:uLnTx/>
-                <a:uFillTx/>
-                <a:latin typeface="Cambria" pitchFamily="18" charset="0"/>
-                <a:ea typeface="+mn-ea"/>
-                <a:cs typeface="+mn-cs"/>
-              </a:rPr>
-              <a:t>Department of Information Technology,</a:t>
-            </a:r>
-          </a:p>
-          <a:p>
-            <a:pPr marL="342900" marR="0" lvl="0" indent="-342900" algn="r" defTabSz="914400" rtl="0" eaLnBrk="1" fontAlgn="auto" latinLnBrk="0" hangingPunct="1">
-              <a:lnSpc>
-                <a:spcPct val="100000"/>
-              </a:lnSpc>
-              <a:spcBef>
-                <a:spcPct val="20000"/>
-              </a:spcBef>
-              <a:spcAft>
-                <a:spcPts val="0"/>
-              </a:spcAft>
-              <a:buClrTx/>
-              <a:buSzTx/>
-              <a:tabLst/>
-              <a:defRPr/>
-            </a:pPr>
-            <a:r>
-              <a:rPr kumimoji="0" lang="en-US" sz="1600" b="0" i="0" u="none" strike="noStrike" kern="1200" cap="none" spc="0" normalizeH="0" baseline="0" noProof="0" dirty="0" err="1" smtClean="0">
-                <a:ln>
-                  <a:noFill/>
-                </a:ln>
-                <a:solidFill>
-                  <a:schemeClr val="tx1"/>
-                </a:solidFill>
-                <a:effectLst/>
-                <a:uLnTx/>
-                <a:uFillTx/>
-                <a:latin typeface="Cambria" pitchFamily="18" charset="0"/>
-                <a:ea typeface="+mn-ea"/>
-                <a:cs typeface="+mn-cs"/>
-              </a:rPr>
-              <a:t>KGiSL</a:t>
-            </a:r>
-            <a:r>
-              <a:rPr kumimoji="0" lang="en-US" sz="1600" b="0" i="0" u="none" strike="noStrike" kern="1200" cap="none" spc="0" normalizeH="0" baseline="0" noProof="0" dirty="0" smtClean="0">
-                <a:ln>
-                  <a:noFill/>
-                </a:ln>
-                <a:solidFill>
-                  <a:schemeClr val="tx1"/>
-                </a:solidFill>
-                <a:effectLst/>
-                <a:uLnTx/>
-                <a:uFillTx/>
-                <a:latin typeface="Cambria" pitchFamily="18" charset="0"/>
-                <a:ea typeface="+mn-ea"/>
-                <a:cs typeface="+mn-cs"/>
-              </a:rPr>
-              <a:t> Institute of Technology,</a:t>
-            </a:r>
-          </a:p>
-          <a:p>
-            <a:pPr marL="342900" marR="0" lvl="0" indent="-342900" algn="r" defTabSz="914400" rtl="0" eaLnBrk="1" fontAlgn="auto" latinLnBrk="0" hangingPunct="1">
-              <a:lnSpc>
-                <a:spcPct val="100000"/>
-              </a:lnSpc>
-              <a:spcBef>
-                <a:spcPct val="20000"/>
-              </a:spcBef>
-              <a:spcAft>
-                <a:spcPts val="0"/>
-              </a:spcAft>
-              <a:buClrTx/>
-              <a:buSzTx/>
-              <a:tabLst/>
-              <a:defRPr/>
-            </a:pPr>
-            <a:r>
-              <a:rPr kumimoji="0" lang="en-US" sz="1600" b="0" i="0" u="none" strike="noStrike" kern="1200" cap="none" spc="0" normalizeH="0" baseline="0" noProof="0" dirty="0" smtClean="0">
-                <a:ln>
-                  <a:noFill/>
-                </a:ln>
-                <a:solidFill>
-                  <a:schemeClr val="tx1"/>
-                </a:solidFill>
-                <a:effectLst/>
-                <a:uLnTx/>
-                <a:uFillTx/>
-                <a:latin typeface="Cambria" pitchFamily="18" charset="0"/>
-                <a:ea typeface="+mn-ea"/>
-                <a:cs typeface="+mn-cs"/>
-              </a:rPr>
-              <a:t>email: </a:t>
-            </a:r>
-            <a:r>
-              <a:rPr kumimoji="0" lang="en-US" sz="1600" b="0" i="0" u="none" strike="noStrike" kern="1200" cap="none" spc="0" normalizeH="0" baseline="0" noProof="0" dirty="0" smtClean="0">
-                <a:ln>
-                  <a:noFill/>
-                </a:ln>
-                <a:solidFill>
-                  <a:schemeClr val="tx1"/>
-                </a:solidFill>
-                <a:effectLst/>
-                <a:uLnTx/>
-                <a:uFillTx/>
-                <a:latin typeface="Cambria" pitchFamily="18" charset="0"/>
-                <a:ea typeface="+mn-ea"/>
-                <a:cs typeface="+mn-cs"/>
-                <a:hlinkClick r:id="rId2"/>
-              </a:rPr>
-              <a:t>proffraja@gmail.com</a:t>
-            </a:r>
-            <a:endParaRPr lang="en-US" sz="1600" dirty="0" smtClean="0">
-              <a:latin typeface="Cambria" pitchFamily="18" charset="0"/>
-            </a:endParaRPr>
-          </a:p>
-          <a:p>
-            <a:pPr marL="342900" marR="0" lvl="0" indent="-342900" algn="r" defTabSz="914400" rtl="0" eaLnBrk="1" fontAlgn="auto" latinLnBrk="0" hangingPunct="1">
-              <a:lnSpc>
-                <a:spcPct val="100000"/>
-              </a:lnSpc>
-              <a:spcBef>
-                <a:spcPct val="20000"/>
-              </a:spcBef>
-              <a:spcAft>
-                <a:spcPts val="0"/>
-              </a:spcAft>
-              <a:buClrTx/>
-              <a:buSzTx/>
-              <a:tabLst/>
-              <a:defRPr/>
-            </a:pPr>
-            <a:r>
-              <a:rPr lang="en-US" sz="1600" dirty="0" err="1" smtClean="0">
-                <a:latin typeface="Cambria" pitchFamily="18" charset="0"/>
-              </a:rPr>
-              <a:t>Github:</a:t>
-            </a:r>
-            <a:r>
-              <a:rPr lang="en-US" sz="1600" dirty="0" err="1" smtClean="0">
-                <a:latin typeface="Cambria" pitchFamily="18" charset="0"/>
-                <a:hlinkClick r:id="rId3"/>
-              </a:rPr>
-              <a:t>www.github.com</a:t>
-            </a:r>
-            <a:r>
-              <a:rPr lang="en-US" sz="1600" dirty="0" smtClean="0">
-                <a:latin typeface="Cambria" pitchFamily="18" charset="0"/>
-                <a:hlinkClick r:id="rId3"/>
-              </a:rPr>
-              <a:t>/</a:t>
-            </a:r>
-            <a:r>
-              <a:rPr lang="en-US" sz="1600" dirty="0" err="1" smtClean="0">
-                <a:latin typeface="Cambria" pitchFamily="18" charset="0"/>
-                <a:hlinkClick r:id="rId3"/>
-              </a:rPr>
-              <a:t>rajasekaranap</a:t>
-            </a:r>
-            <a:endParaRPr lang="en-US" sz="1600" dirty="0" smtClean="0">
-              <a:latin typeface="Cambria" pitchFamily="18" charset="0"/>
-            </a:endParaRPr>
-          </a:p>
-          <a:p>
-            <a:pPr marL="342900" marR="0" lvl="0" indent="-342900" algn="r" defTabSz="914400" rtl="0" eaLnBrk="1" fontAlgn="auto" latinLnBrk="0" hangingPunct="1">
-              <a:lnSpc>
-                <a:spcPct val="100000"/>
-              </a:lnSpc>
-              <a:spcBef>
-                <a:spcPct val="20000"/>
-              </a:spcBef>
-              <a:spcAft>
-                <a:spcPts val="0"/>
-              </a:spcAft>
-              <a:buClrTx/>
-              <a:buSzTx/>
-              <a:tabLst/>
-              <a:defRPr/>
-            </a:pPr>
-            <a:endParaRPr lang="en-US" sz="1600" dirty="0" smtClean="0">
-              <a:latin typeface="Cambria" pitchFamily="18" charset="0"/>
-            </a:endParaRPr>
+              <a:rPr lang="en-IN" dirty="0" smtClean="0"/>
+              <a:t>Global Warming</a:t>
+            </a:r>
+            <a:endParaRPr lang="en-IN" dirty="0"/>
+          </a:p>
+        </p:txBody>
+      </p:sp>
+      <p:sp>
+        <p:nvSpPr>
+          <p:cNvPr id="3" name="Content Placeholder 2"/>
+          <p:cNvSpPr>
+            <a:spLocks noGrp="1"/>
+          </p:cNvSpPr>
+          <p:nvPr>
+            <p:ph idx="1"/>
+          </p:nvPr>
+        </p:nvSpPr>
+        <p:spPr/>
+        <p:txBody>
+          <a:bodyPr/>
+          <a:lstStyle/>
+          <a:p>
+            <a:r>
+              <a:rPr lang="en-IN" dirty="0" smtClean="0"/>
+              <a:t>Causes</a:t>
+            </a:r>
+            <a:endParaRPr lang="en-IN" dirty="0"/>
+          </a:p>
+          <a:p>
+            <a:pPr lvl="1"/>
+            <a:r>
+              <a:rPr lang="en-IN" dirty="0" smtClean="0"/>
+              <a:t>Industrialization</a:t>
+            </a:r>
+          </a:p>
+          <a:p>
+            <a:pPr lvl="1"/>
+            <a:r>
+              <a:rPr lang="en-IN" dirty="0" smtClean="0"/>
+              <a:t>Transportation</a:t>
+            </a:r>
+          </a:p>
+          <a:p>
+            <a:pPr lvl="1"/>
+            <a:r>
+              <a:rPr lang="en-IN" dirty="0" smtClean="0"/>
+              <a:t>Combustion of fossil fuel</a:t>
+            </a:r>
+          </a:p>
+          <a:p>
+            <a:pPr lvl="1"/>
+            <a:r>
+              <a:rPr lang="en-IN" dirty="0" smtClean="0"/>
+              <a:t>Deforestation</a:t>
+            </a:r>
+            <a:endParaRPr lang="en-IN" dirty="0"/>
           </a:p>
         </p:txBody>
       </p:sp>
     </p:spTree>
+    <p:extLst>
+      <p:ext uri="{BB962C8B-B14F-4D97-AF65-F5344CB8AC3E}">
+        <p14:creationId xmlns:p14="http://schemas.microsoft.com/office/powerpoint/2010/main" val="786349847"/>
+      </p:ext>
+    </p:extLst>
   </p:cSld>
   <p:clrMapOvr>
     <a:masterClrMapping/>
   </p:clrMapOvr>
-  <p:timing>
-    <p:tnLst>
-      <p:par>
-        <p:cTn id="1" dur="indefinite" restart="never" nodeType="tmRoot"/>
-      </p:par>
-    </p:tnLst>
-  </p:timing>
+</p:sld>
+</file>
+
+<file path=ppt/slides/slide18.xml><?xml version="1.0" encoding="utf-8"?>
+<p:sld xmlns:a="http://schemas.openxmlformats.org/drawingml/2006/main" xmlns:r="http://schemas.openxmlformats.org/officeDocument/2006/relationships" xmlns:p="http://schemas.openxmlformats.org/presentationml/2006/main">
+  <p:cSld>
+    <p:spTree>
+      <p:nvGrpSpPr>
+        <p:cNvPr id="1" name=""/>
+        <p:cNvGrpSpPr/>
+        <p:nvPr/>
+      </p:nvGrpSpPr>
+      <p:grpSpPr>
+        <a:xfrm>
+          <a:off x="0" y="0"/>
+          <a:ext cx="0" cy="0"/>
+          <a:chOff x="0" y="0"/>
+          <a:chExt cx="0" cy="0"/>
+        </a:xfrm>
+      </p:grpSpPr>
+      <p:sp>
+        <p:nvSpPr>
+          <p:cNvPr id="2" name="Title 1"/>
+          <p:cNvSpPr>
+            <a:spLocks noGrp="1"/>
+          </p:cNvSpPr>
+          <p:nvPr>
+            <p:ph type="title"/>
+          </p:nvPr>
+        </p:nvSpPr>
+        <p:spPr/>
+        <p:txBody>
+          <a:bodyPr/>
+          <a:lstStyle/>
+          <a:p>
+            <a:r>
+              <a:rPr lang="en-IN" dirty="0" smtClean="0"/>
+              <a:t>Global Warming</a:t>
+            </a:r>
+            <a:endParaRPr lang="en-IN" dirty="0"/>
+          </a:p>
+        </p:txBody>
+      </p:sp>
+      <p:sp>
+        <p:nvSpPr>
+          <p:cNvPr id="3" name="Content Placeholder 2"/>
+          <p:cNvSpPr>
+            <a:spLocks noGrp="1"/>
+          </p:cNvSpPr>
+          <p:nvPr>
+            <p:ph idx="1"/>
+          </p:nvPr>
+        </p:nvSpPr>
+        <p:spPr/>
+        <p:txBody>
+          <a:bodyPr>
+            <a:normAutofit lnSpcReduction="10000"/>
+          </a:bodyPr>
+          <a:lstStyle/>
+          <a:p>
+            <a:r>
+              <a:rPr lang="en-IN" dirty="0" smtClean="0"/>
+              <a:t>Impacts</a:t>
+            </a:r>
+          </a:p>
+          <a:p>
+            <a:pPr lvl="1"/>
+            <a:r>
+              <a:rPr lang="en-IN" dirty="0" smtClean="0"/>
+              <a:t>Earth’s temperature increase from 1.5 ℃ to 5.5 ℃ by 2050.</a:t>
+            </a:r>
+          </a:p>
+          <a:p>
+            <a:pPr lvl="1"/>
+            <a:r>
+              <a:rPr lang="en-IN" dirty="0" smtClean="0"/>
+              <a:t>Melting of polar ice leads to sea water level increase.</a:t>
+            </a:r>
+          </a:p>
+          <a:p>
+            <a:pPr lvl="1"/>
+            <a:r>
+              <a:rPr lang="en-IN" dirty="0" smtClean="0"/>
+              <a:t> Change of rainfall pattern lead to spread of water borne diseases.</a:t>
+            </a:r>
+          </a:p>
+          <a:p>
+            <a:pPr lvl="1"/>
+            <a:r>
+              <a:rPr lang="en-IN" dirty="0" smtClean="0"/>
+              <a:t>Leading to drought and flood causes water demand.</a:t>
+            </a:r>
+          </a:p>
+          <a:p>
+            <a:pPr lvl="1"/>
+            <a:r>
+              <a:rPr lang="en-IN" dirty="0" smtClean="0"/>
+              <a:t>Species extinction due to rapid changes. </a:t>
+            </a:r>
+            <a:endParaRPr lang="en-IN" dirty="0"/>
+          </a:p>
+        </p:txBody>
+      </p:sp>
+    </p:spTree>
+    <p:extLst>
+      <p:ext uri="{BB962C8B-B14F-4D97-AF65-F5344CB8AC3E}">
+        <p14:creationId xmlns:p14="http://schemas.microsoft.com/office/powerpoint/2010/main" val="751624673"/>
+      </p:ext>
+    </p:extLst>
+  </p:cSld>
+  <p:clrMapOvr>
+    <a:masterClrMapping/>
+  </p:clrMapOvr>
+</p:sld>
+</file>
+
+<file path=ppt/slides/slide19.xml><?xml version="1.0" encoding="utf-8"?>
+<p:sld xmlns:a="http://schemas.openxmlformats.org/drawingml/2006/main" xmlns:r="http://schemas.openxmlformats.org/officeDocument/2006/relationships" xmlns:p="http://schemas.openxmlformats.org/presentationml/2006/main">
+  <p:cSld>
+    <p:spTree>
+      <p:nvGrpSpPr>
+        <p:cNvPr id="1" name=""/>
+        <p:cNvGrpSpPr/>
+        <p:nvPr/>
+      </p:nvGrpSpPr>
+      <p:grpSpPr>
+        <a:xfrm>
+          <a:off x="0" y="0"/>
+          <a:ext cx="0" cy="0"/>
+          <a:chOff x="0" y="0"/>
+          <a:chExt cx="0" cy="0"/>
+        </a:xfrm>
+      </p:grpSpPr>
+      <p:sp>
+        <p:nvSpPr>
+          <p:cNvPr id="2" name="Title 1"/>
+          <p:cNvSpPr>
+            <a:spLocks noGrp="1"/>
+          </p:cNvSpPr>
+          <p:nvPr>
+            <p:ph type="title"/>
+          </p:nvPr>
+        </p:nvSpPr>
+        <p:spPr/>
+        <p:txBody>
+          <a:bodyPr/>
+          <a:lstStyle/>
+          <a:p>
+            <a:r>
+              <a:rPr lang="en-IN" dirty="0" smtClean="0"/>
+              <a:t>Global Warming</a:t>
+            </a:r>
+            <a:endParaRPr lang="en-IN" dirty="0"/>
+          </a:p>
+        </p:txBody>
+      </p:sp>
+      <p:sp>
+        <p:nvSpPr>
+          <p:cNvPr id="3" name="Content Placeholder 2"/>
+          <p:cNvSpPr>
+            <a:spLocks noGrp="1"/>
+          </p:cNvSpPr>
+          <p:nvPr>
+            <p:ph idx="1"/>
+          </p:nvPr>
+        </p:nvSpPr>
+        <p:spPr/>
+        <p:txBody>
+          <a:bodyPr>
+            <a:normAutofit/>
+          </a:bodyPr>
+          <a:lstStyle/>
+          <a:p>
+            <a:r>
+              <a:rPr lang="en-IN" dirty="0" smtClean="0"/>
+              <a:t>Control Measures</a:t>
+            </a:r>
+          </a:p>
+          <a:p>
+            <a:pPr lvl="1"/>
+            <a:r>
+              <a:rPr lang="en-IN" dirty="0" smtClean="0"/>
+              <a:t>Reduce usage of CFC.</a:t>
+            </a:r>
+          </a:p>
+          <a:p>
+            <a:pPr lvl="1"/>
+            <a:r>
+              <a:rPr lang="en-IN" dirty="0" smtClean="0"/>
+              <a:t>Use of energy effectively.</a:t>
+            </a:r>
+          </a:p>
+          <a:p>
+            <a:pPr lvl="1"/>
+            <a:r>
+              <a:rPr lang="en-IN" dirty="0" smtClean="0"/>
+              <a:t>Use of renewable energy.</a:t>
+            </a:r>
+          </a:p>
+          <a:p>
+            <a:pPr lvl="1"/>
+            <a:r>
+              <a:rPr lang="en-IN" dirty="0" smtClean="0"/>
+              <a:t>Shift of coal to natural gas.</a:t>
+            </a:r>
+          </a:p>
+          <a:p>
+            <a:pPr lvl="1"/>
+            <a:r>
+              <a:rPr lang="en-IN" dirty="0" smtClean="0"/>
+              <a:t>Adopt sustainable agriculture.</a:t>
+            </a:r>
+          </a:p>
+          <a:p>
+            <a:pPr lvl="1"/>
+            <a:r>
+              <a:rPr lang="en-IN" dirty="0" smtClean="0"/>
+              <a:t>Stabilize the population growth.</a:t>
+            </a:r>
+          </a:p>
+        </p:txBody>
+      </p:sp>
+    </p:spTree>
+    <p:extLst>
+      <p:ext uri="{BB962C8B-B14F-4D97-AF65-F5344CB8AC3E}">
+        <p14:creationId xmlns:p14="http://schemas.microsoft.com/office/powerpoint/2010/main" val="810217702"/>
+      </p:ext>
+    </p:extLst>
+  </p:cSld>
+  <p:clrMapOvr>
+    <a:masterClrMapping/>
+  </p:clrMapOvr>
 </p:sld>
 </file>
 
@@ -5266,7 +5245,6 @@
               <a:rPr lang="en-IN" dirty="0" smtClean="0"/>
               <a:t>	</a:t>
             </a:r>
-            <a:endParaRPr lang="en-IN" dirty="0" smtClean="0"/>
           </a:p>
         </p:txBody>
       </p:sp>
@@ -5574,6 +5552,1907 @@
 </p:sld>
 </file>
 
+<file path=ppt/slides/slide20.xml><?xml version="1.0" encoding="utf-8"?>
+<p:sld xmlns:a="http://schemas.openxmlformats.org/drawingml/2006/main" xmlns:r="http://schemas.openxmlformats.org/officeDocument/2006/relationships" xmlns:p="http://schemas.openxmlformats.org/presentationml/2006/main">
+  <p:cSld>
+    <p:spTree>
+      <p:nvGrpSpPr>
+        <p:cNvPr id="1" name=""/>
+        <p:cNvGrpSpPr/>
+        <p:nvPr/>
+      </p:nvGrpSpPr>
+      <p:grpSpPr>
+        <a:xfrm>
+          <a:off x="0" y="0"/>
+          <a:ext cx="0" cy="0"/>
+          <a:chOff x="0" y="0"/>
+          <a:chExt cx="0" cy="0"/>
+        </a:xfrm>
+      </p:grpSpPr>
+      <p:sp>
+        <p:nvSpPr>
+          <p:cNvPr id="2" name="Title 1"/>
+          <p:cNvSpPr>
+            <a:spLocks noGrp="1"/>
+          </p:cNvSpPr>
+          <p:nvPr>
+            <p:ph type="title"/>
+          </p:nvPr>
+        </p:nvSpPr>
+        <p:spPr/>
+        <p:txBody>
+          <a:bodyPr/>
+          <a:lstStyle/>
+          <a:p>
+            <a:r>
+              <a:rPr lang="en-IN" dirty="0" smtClean="0"/>
+              <a:t>Particulate Matters</a:t>
+            </a:r>
+            <a:endParaRPr lang="en-IN" dirty="0"/>
+          </a:p>
+        </p:txBody>
+      </p:sp>
+      <p:sp>
+        <p:nvSpPr>
+          <p:cNvPr id="3" name="Content Placeholder 2"/>
+          <p:cNvSpPr>
+            <a:spLocks noGrp="1"/>
+          </p:cNvSpPr>
+          <p:nvPr>
+            <p:ph idx="1"/>
+          </p:nvPr>
+        </p:nvSpPr>
+        <p:spPr/>
+        <p:txBody>
+          <a:bodyPr>
+            <a:normAutofit lnSpcReduction="10000"/>
+          </a:bodyPr>
+          <a:lstStyle/>
+          <a:p>
+            <a:pPr algn="just"/>
+            <a:r>
+              <a:rPr lang="en-IN" dirty="0" smtClean="0"/>
+              <a:t>Particulate matters is a suspended droplets (or) solid particles or mixture of these two. It consists of inert or reactive materials is a size from 100 µ m.</a:t>
+            </a:r>
+          </a:p>
+          <a:p>
+            <a:pPr algn="just"/>
+            <a:r>
+              <a:rPr lang="en-IN" dirty="0" smtClean="0"/>
+              <a:t>Types</a:t>
+            </a:r>
+          </a:p>
+          <a:p>
+            <a:pPr lvl="1" algn="just"/>
+            <a:r>
+              <a:rPr lang="en-IN" dirty="0" smtClean="0"/>
+              <a:t>Inorganic dust (iron dust).</a:t>
+            </a:r>
+          </a:p>
+          <a:p>
+            <a:pPr lvl="1" algn="just"/>
+            <a:r>
+              <a:rPr lang="en-IN" dirty="0" smtClean="0"/>
+              <a:t>Droplets (Mist).</a:t>
+            </a:r>
+          </a:p>
+          <a:p>
+            <a:pPr lvl="1" algn="just"/>
+            <a:r>
+              <a:rPr lang="en-IN" dirty="0" smtClean="0"/>
+              <a:t>Fly ash (coal combustion).</a:t>
+            </a:r>
+          </a:p>
+          <a:p>
+            <a:pPr lvl="1" algn="just"/>
+            <a:r>
+              <a:rPr lang="en-IN" dirty="0" smtClean="0"/>
+              <a:t>Organic matters (benzene).</a:t>
+            </a:r>
+          </a:p>
+          <a:p>
+            <a:pPr lvl="1" algn="just"/>
+            <a:endParaRPr lang="en-IN" dirty="0"/>
+          </a:p>
+        </p:txBody>
+      </p:sp>
+    </p:spTree>
+    <p:extLst>
+      <p:ext uri="{BB962C8B-B14F-4D97-AF65-F5344CB8AC3E}">
+        <p14:creationId xmlns:p14="http://schemas.microsoft.com/office/powerpoint/2010/main" val="1394536903"/>
+      </p:ext>
+    </p:extLst>
+  </p:cSld>
+  <p:clrMapOvr>
+    <a:masterClrMapping/>
+  </p:clrMapOvr>
+</p:sld>
+</file>
+
+<file path=ppt/slides/slide21.xml><?xml version="1.0" encoding="utf-8"?>
+<p:sld xmlns:a="http://schemas.openxmlformats.org/drawingml/2006/main" xmlns:r="http://schemas.openxmlformats.org/officeDocument/2006/relationships" xmlns:p="http://schemas.openxmlformats.org/presentationml/2006/main">
+  <p:cSld>
+    <p:spTree>
+      <p:nvGrpSpPr>
+        <p:cNvPr id="1" name=""/>
+        <p:cNvGrpSpPr/>
+        <p:nvPr/>
+      </p:nvGrpSpPr>
+      <p:grpSpPr>
+        <a:xfrm>
+          <a:off x="0" y="0"/>
+          <a:ext cx="0" cy="0"/>
+          <a:chOff x="0" y="0"/>
+          <a:chExt cx="0" cy="0"/>
+        </a:xfrm>
+      </p:grpSpPr>
+      <p:sp>
+        <p:nvSpPr>
+          <p:cNvPr id="2" name="Title 1"/>
+          <p:cNvSpPr>
+            <a:spLocks noGrp="1"/>
+          </p:cNvSpPr>
+          <p:nvPr>
+            <p:ph type="title"/>
+          </p:nvPr>
+        </p:nvSpPr>
+        <p:spPr/>
+        <p:txBody>
+          <a:bodyPr/>
+          <a:lstStyle/>
+          <a:p>
+            <a:r>
+              <a:rPr lang="en-IN" dirty="0"/>
+              <a:t>Particulate Matters</a:t>
+            </a:r>
+          </a:p>
+        </p:txBody>
+      </p:sp>
+      <p:sp>
+        <p:nvSpPr>
+          <p:cNvPr id="3" name="Content Placeholder 2"/>
+          <p:cNvSpPr>
+            <a:spLocks noGrp="1"/>
+          </p:cNvSpPr>
+          <p:nvPr>
+            <p:ph idx="1"/>
+          </p:nvPr>
+        </p:nvSpPr>
+        <p:spPr/>
+        <p:txBody>
+          <a:bodyPr/>
+          <a:lstStyle/>
+          <a:p>
+            <a:r>
+              <a:rPr lang="en-IN" dirty="0" smtClean="0"/>
+              <a:t>Effects</a:t>
+            </a:r>
+          </a:p>
+          <a:p>
+            <a:pPr lvl="1"/>
+            <a:r>
+              <a:rPr lang="en-IN" dirty="0" smtClean="0"/>
+              <a:t>Petroleum combustion particles affects the haemoglobin formation.</a:t>
+            </a:r>
+          </a:p>
+          <a:p>
+            <a:pPr lvl="1"/>
+            <a:r>
+              <a:rPr lang="en-IN" dirty="0" smtClean="0"/>
+              <a:t>Fly ash – respiratory problems</a:t>
+            </a:r>
+          </a:p>
+          <a:p>
+            <a:pPr lvl="1"/>
+            <a:r>
+              <a:rPr lang="en-IN" dirty="0" smtClean="0"/>
+              <a:t>Metal dust - </a:t>
+            </a:r>
+            <a:r>
+              <a:rPr lang="en-IN" dirty="0"/>
+              <a:t>respiratory problems</a:t>
+            </a:r>
+          </a:p>
+          <a:p>
+            <a:pPr lvl="1"/>
+            <a:r>
+              <a:rPr lang="en-IN" dirty="0" smtClean="0"/>
+              <a:t>Aerosols by airplanes – depletion of ozone layer.</a:t>
+            </a:r>
+          </a:p>
+          <a:p>
+            <a:pPr lvl="1"/>
+            <a:r>
+              <a:rPr lang="en-IN" dirty="0" smtClean="0"/>
+              <a:t>Smog – effects on man and animal, cracks the rubber.</a:t>
+            </a:r>
+          </a:p>
+          <a:p>
+            <a:pPr lvl="1"/>
+            <a:r>
+              <a:rPr lang="en-IN" dirty="0" smtClean="0"/>
+              <a:t>Dust coating – in effect photo synthesis. </a:t>
+            </a:r>
+            <a:endParaRPr lang="en-IN" dirty="0"/>
+          </a:p>
+        </p:txBody>
+      </p:sp>
+    </p:spTree>
+    <p:extLst>
+      <p:ext uri="{BB962C8B-B14F-4D97-AF65-F5344CB8AC3E}">
+        <p14:creationId xmlns:p14="http://schemas.microsoft.com/office/powerpoint/2010/main" val="1486086999"/>
+      </p:ext>
+    </p:extLst>
+  </p:cSld>
+  <p:clrMapOvr>
+    <a:masterClrMapping/>
+  </p:clrMapOvr>
+</p:sld>
+</file>
+
+<file path=ppt/slides/slide22.xml><?xml version="1.0" encoding="utf-8"?>
+<p:sld xmlns:a="http://schemas.openxmlformats.org/drawingml/2006/main" xmlns:r="http://schemas.openxmlformats.org/officeDocument/2006/relationships" xmlns:p="http://schemas.openxmlformats.org/presentationml/2006/main">
+  <p:cSld>
+    <p:spTree>
+      <p:nvGrpSpPr>
+        <p:cNvPr id="1" name=""/>
+        <p:cNvGrpSpPr/>
+        <p:nvPr/>
+      </p:nvGrpSpPr>
+      <p:grpSpPr>
+        <a:xfrm>
+          <a:off x="0" y="0"/>
+          <a:ext cx="0" cy="0"/>
+          <a:chOff x="0" y="0"/>
+          <a:chExt cx="0" cy="0"/>
+        </a:xfrm>
+      </p:grpSpPr>
+      <p:sp>
+        <p:nvSpPr>
+          <p:cNvPr id="2" name="Title 1"/>
+          <p:cNvSpPr>
+            <a:spLocks noGrp="1"/>
+          </p:cNvSpPr>
+          <p:nvPr>
+            <p:ph type="title"/>
+          </p:nvPr>
+        </p:nvSpPr>
+        <p:spPr/>
+        <p:txBody>
+          <a:bodyPr/>
+          <a:lstStyle/>
+          <a:p>
+            <a:r>
+              <a:rPr lang="en-IN" dirty="0"/>
+              <a:t>Particulate Matters</a:t>
+            </a:r>
+          </a:p>
+        </p:txBody>
+      </p:sp>
+      <p:sp>
+        <p:nvSpPr>
+          <p:cNvPr id="3" name="Content Placeholder 2"/>
+          <p:cNvSpPr>
+            <a:spLocks noGrp="1"/>
+          </p:cNvSpPr>
+          <p:nvPr>
+            <p:ph idx="1"/>
+          </p:nvPr>
+        </p:nvSpPr>
+        <p:spPr/>
+        <p:txBody>
+          <a:bodyPr/>
+          <a:lstStyle/>
+          <a:p>
+            <a:r>
+              <a:rPr lang="en-IN" dirty="0" smtClean="0"/>
+              <a:t>Control Measures</a:t>
+            </a:r>
+            <a:endParaRPr lang="en-IN" dirty="0"/>
+          </a:p>
+          <a:p>
+            <a:pPr lvl="1"/>
+            <a:r>
+              <a:rPr lang="en-IN" dirty="0" smtClean="0"/>
+              <a:t>It should be controlled at source.</a:t>
+            </a:r>
+          </a:p>
+          <a:p>
+            <a:pPr lvl="1"/>
+            <a:r>
+              <a:rPr lang="en-IN" dirty="0" smtClean="0"/>
+              <a:t>Sedimentation.</a:t>
+            </a:r>
+          </a:p>
+          <a:p>
+            <a:pPr lvl="1"/>
+            <a:r>
+              <a:rPr lang="en-IN" dirty="0" smtClean="0"/>
+              <a:t>Centrifugation.</a:t>
+            </a:r>
+          </a:p>
+          <a:p>
+            <a:pPr lvl="1"/>
+            <a:r>
+              <a:rPr lang="en-IN" dirty="0" smtClean="0"/>
+              <a:t>Impaction.</a:t>
+            </a:r>
+          </a:p>
+          <a:p>
+            <a:pPr lvl="1"/>
+            <a:r>
+              <a:rPr lang="en-IN" dirty="0" smtClean="0"/>
+              <a:t>Filtration.</a:t>
+            </a:r>
+          </a:p>
+          <a:p>
+            <a:pPr lvl="1"/>
+            <a:r>
+              <a:rPr lang="en-IN" dirty="0" smtClean="0"/>
+              <a:t>Electrostatic precipitators.                                                              </a:t>
+            </a:r>
+          </a:p>
+          <a:p>
+            <a:pPr lvl="1"/>
+            <a:endParaRPr lang="en-IN" dirty="0" smtClean="0"/>
+          </a:p>
+          <a:p>
+            <a:pPr lvl="2"/>
+            <a:endParaRPr lang="en-IN" dirty="0"/>
+          </a:p>
+        </p:txBody>
+      </p:sp>
+    </p:spTree>
+    <p:extLst>
+      <p:ext uri="{BB962C8B-B14F-4D97-AF65-F5344CB8AC3E}">
+        <p14:creationId xmlns:p14="http://schemas.microsoft.com/office/powerpoint/2010/main" val="2068020488"/>
+      </p:ext>
+    </p:extLst>
+  </p:cSld>
+  <p:clrMapOvr>
+    <a:masterClrMapping/>
+  </p:clrMapOvr>
+</p:sld>
+</file>
+
+<file path=ppt/slides/slide23.xml><?xml version="1.0" encoding="utf-8"?>
+<p:sld xmlns:a="http://schemas.openxmlformats.org/drawingml/2006/main" xmlns:r="http://schemas.openxmlformats.org/officeDocument/2006/relationships" xmlns:p="http://schemas.openxmlformats.org/presentationml/2006/main">
+  <p:cSld>
+    <p:spTree>
+      <p:nvGrpSpPr>
+        <p:cNvPr id="1" name=""/>
+        <p:cNvGrpSpPr/>
+        <p:nvPr/>
+      </p:nvGrpSpPr>
+      <p:grpSpPr>
+        <a:xfrm>
+          <a:off x="0" y="0"/>
+          <a:ext cx="0" cy="0"/>
+          <a:chOff x="0" y="0"/>
+          <a:chExt cx="0" cy="0"/>
+        </a:xfrm>
+      </p:grpSpPr>
+      <p:sp>
+        <p:nvSpPr>
+          <p:cNvPr id="2" name="Title 1"/>
+          <p:cNvSpPr>
+            <a:spLocks noGrp="1"/>
+          </p:cNvSpPr>
+          <p:nvPr>
+            <p:ph type="title"/>
+          </p:nvPr>
+        </p:nvSpPr>
+        <p:spPr/>
+        <p:txBody>
+          <a:bodyPr/>
+          <a:lstStyle/>
+          <a:p>
+            <a:r>
+              <a:rPr lang="en-IN" dirty="0" smtClean="0"/>
+              <a:t>Oxides of Nitrogen (</a:t>
+            </a:r>
+            <a:r>
+              <a:rPr lang="en-IN" dirty="0" err="1" smtClean="0"/>
+              <a:t>NOx</a:t>
+            </a:r>
+            <a:r>
+              <a:rPr lang="en-IN" dirty="0" smtClean="0"/>
+              <a:t>)</a:t>
+            </a:r>
+            <a:endParaRPr lang="en-IN" dirty="0"/>
+          </a:p>
+        </p:txBody>
+      </p:sp>
+      <mc:AlternateContent xmlns:mc="http://schemas.openxmlformats.org/markup-compatibility/2006">
+        <mc:Choice xmlns:a14="http://schemas.microsoft.com/office/drawing/2010/main" Requires="a14">
+          <p:sp>
+            <p:nvSpPr>
+              <p:cNvPr id="3" name="Content Placeholder 2"/>
+              <p:cNvSpPr>
+                <a:spLocks noGrp="1"/>
+              </p:cNvSpPr>
+              <p:nvPr>
+                <p:ph idx="1"/>
+              </p:nvPr>
+            </p:nvSpPr>
+            <p:spPr/>
+            <p:txBody>
+              <a:bodyPr/>
+              <a:lstStyle/>
+              <a:p>
+                <a:r>
+                  <a:rPr lang="en-IN" dirty="0" smtClean="0"/>
+                  <a:t>NO forms </a:t>
+                </a:r>
+                <a14:m>
+                  <m:oMath xmlns:m="http://schemas.openxmlformats.org/officeDocument/2006/math">
+                    <m:sSub>
+                      <m:sSubPr>
+                        <m:ctrlPr>
+                          <a:rPr lang="en-IN" i="1">
+                            <a:latin typeface="Cambria Math" panose="02040503050406030204" pitchFamily="18" charset="0"/>
+                          </a:rPr>
+                        </m:ctrlPr>
+                      </m:sSubPr>
+                      <m:e>
+                        <m:r>
+                          <a:rPr lang="en-IN" i="1">
+                            <a:latin typeface="Cambria Math" panose="02040503050406030204" pitchFamily="18" charset="0"/>
+                          </a:rPr>
+                          <m:t>𝑁𝑂</m:t>
+                        </m:r>
+                      </m:e>
+                      <m:sub>
+                        <m:r>
+                          <a:rPr lang="en-IN" b="0" i="1" smtClean="0">
+                            <a:latin typeface="Cambria Math" panose="02040503050406030204" pitchFamily="18" charset="0"/>
+                          </a:rPr>
+                          <m:t>2</m:t>
+                        </m:r>
+                      </m:sub>
+                    </m:sSub>
+                  </m:oMath>
+                </a14:m>
+                <a:r>
+                  <a:rPr lang="en-IN" dirty="0" smtClean="0"/>
+                  <a:t> and forms </a:t>
+                </a:r>
+                <a14:m>
+                  <m:oMath xmlns:m="http://schemas.openxmlformats.org/officeDocument/2006/math">
+                    <m:sSub>
+                      <m:sSubPr>
+                        <m:ctrlPr>
+                          <a:rPr lang="en-IN" i="1">
+                            <a:latin typeface="Cambria Math" panose="02040503050406030204" pitchFamily="18" charset="0"/>
+                          </a:rPr>
+                        </m:ctrlPr>
+                      </m:sSubPr>
+                      <m:e>
+                        <m:r>
+                          <a:rPr lang="en-IN" b="0" i="1" smtClean="0">
+                            <a:latin typeface="Cambria Math" panose="02040503050406030204" pitchFamily="18" charset="0"/>
+                          </a:rPr>
+                          <m:t>𝐻</m:t>
+                        </m:r>
+                        <m:r>
+                          <a:rPr lang="en-IN" i="1">
+                            <a:latin typeface="Cambria Math" panose="02040503050406030204" pitchFamily="18" charset="0"/>
+                          </a:rPr>
+                          <m:t>𝑁𝑂</m:t>
+                        </m:r>
+                      </m:e>
+                      <m:sub>
+                        <m:r>
+                          <a:rPr lang="en-IN" b="0" i="1" smtClean="0">
+                            <a:latin typeface="Cambria Math" panose="02040503050406030204" pitchFamily="18" charset="0"/>
+                          </a:rPr>
+                          <m:t>3</m:t>
+                        </m:r>
+                      </m:sub>
+                    </m:sSub>
+                  </m:oMath>
+                </a14:m>
+                <a:r>
+                  <a:rPr lang="en-IN" dirty="0" smtClean="0"/>
+                  <a:t>.</a:t>
+                </a:r>
+              </a:p>
+              <a:p>
+                <a14:m>
+                  <m:oMath xmlns:m="http://schemas.openxmlformats.org/officeDocument/2006/math">
+                    <m:sSub>
+                      <m:sSubPr>
+                        <m:ctrlPr>
+                          <a:rPr lang="en-IN" i="1">
+                            <a:latin typeface="Cambria Math" panose="02040503050406030204" pitchFamily="18" charset="0"/>
+                          </a:rPr>
+                        </m:ctrlPr>
+                      </m:sSubPr>
+                      <m:e>
+                        <m:r>
+                          <a:rPr lang="en-IN" b="0" i="1" smtClean="0">
+                            <a:latin typeface="Cambria Math" panose="02040503050406030204" pitchFamily="18" charset="0"/>
+                          </a:rPr>
+                          <m:t>2</m:t>
+                        </m:r>
+                        <m:r>
+                          <a:rPr lang="en-IN" i="1">
+                            <a:latin typeface="Cambria Math" panose="02040503050406030204" pitchFamily="18" charset="0"/>
+                          </a:rPr>
+                          <m:t>𝑁𝑂</m:t>
+                        </m:r>
+                      </m:e>
+                      <m:sub>
+                        <m:r>
+                          <a:rPr lang="en-IN" i="1">
+                            <a:latin typeface="Cambria Math" panose="02040503050406030204" pitchFamily="18" charset="0"/>
+                          </a:rPr>
+                          <m:t>𝑥</m:t>
+                        </m:r>
+                      </m:sub>
+                    </m:sSub>
+                    <m:r>
+                      <a:rPr lang="en-IN" b="0" i="1" smtClean="0">
+                        <a:latin typeface="Cambria Math" panose="02040503050406030204" pitchFamily="18" charset="0"/>
+                      </a:rPr>
+                      <m:t>+</m:t>
+                    </m:r>
+                    <m:sSub>
+                      <m:sSubPr>
+                        <m:ctrlPr>
+                          <a:rPr lang="en-IN" i="1">
+                            <a:latin typeface="Cambria Math" panose="02040503050406030204" pitchFamily="18" charset="0"/>
+                          </a:rPr>
+                        </m:ctrlPr>
+                      </m:sSubPr>
+                      <m:e>
+                        <m:r>
+                          <a:rPr lang="en-IN" i="1">
+                            <a:latin typeface="Cambria Math" panose="02040503050406030204" pitchFamily="18" charset="0"/>
+                          </a:rPr>
+                          <m:t>𝑂</m:t>
+                        </m:r>
+                      </m:e>
+                      <m:sub>
+                        <m:r>
+                          <a:rPr lang="en-IN" b="0" i="1" smtClean="0">
+                            <a:latin typeface="Cambria Math" panose="02040503050406030204" pitchFamily="18" charset="0"/>
+                          </a:rPr>
+                          <m:t>2</m:t>
+                        </m:r>
+                      </m:sub>
+                    </m:sSub>
+                    <m:r>
+                      <a:rPr lang="en-IN" b="0" i="1" smtClean="0">
+                        <a:latin typeface="Cambria Math" panose="02040503050406030204" pitchFamily="18" charset="0"/>
+                      </a:rPr>
+                      <m:t>→</m:t>
+                    </m:r>
+                    <m:sSub>
+                      <m:sSubPr>
+                        <m:ctrlPr>
+                          <a:rPr lang="en-IN" i="1">
+                            <a:latin typeface="Cambria Math" panose="02040503050406030204" pitchFamily="18" charset="0"/>
+                          </a:rPr>
+                        </m:ctrlPr>
+                      </m:sSubPr>
+                      <m:e>
+                        <m:r>
+                          <a:rPr lang="en-IN" i="1">
+                            <a:latin typeface="Cambria Math" panose="02040503050406030204" pitchFamily="18" charset="0"/>
+                          </a:rPr>
+                          <m:t>𝑁𝑂</m:t>
+                        </m:r>
+                      </m:e>
+                      <m:sub>
+                        <m:r>
+                          <a:rPr lang="en-IN" b="0" i="1" smtClean="0">
+                            <a:latin typeface="Cambria Math" panose="02040503050406030204" pitchFamily="18" charset="0"/>
+                          </a:rPr>
+                          <m:t>2</m:t>
+                        </m:r>
+                      </m:sub>
+                    </m:sSub>
+                  </m:oMath>
+                </a14:m>
+                <a:endParaRPr lang="en-IN" dirty="0" smtClean="0"/>
+              </a:p>
+              <a:p>
+                <a14:m>
+                  <m:oMath xmlns:m="http://schemas.openxmlformats.org/officeDocument/2006/math">
+                    <m:sSub>
+                      <m:sSubPr>
+                        <m:ctrlPr>
+                          <a:rPr lang="en-IN" i="1">
+                            <a:latin typeface="Cambria Math" panose="02040503050406030204" pitchFamily="18" charset="0"/>
+                          </a:rPr>
+                        </m:ctrlPr>
+                      </m:sSubPr>
+                      <m:e>
+                        <m:r>
+                          <a:rPr lang="en-IN" b="0" i="1" smtClean="0">
+                            <a:latin typeface="Cambria Math" panose="02040503050406030204" pitchFamily="18" charset="0"/>
+                          </a:rPr>
+                          <m:t>4</m:t>
+                        </m:r>
+                        <m:r>
+                          <a:rPr lang="en-IN" i="1">
+                            <a:latin typeface="Cambria Math" panose="02040503050406030204" pitchFamily="18" charset="0"/>
+                          </a:rPr>
+                          <m:t>𝑁𝑂</m:t>
+                        </m:r>
+                      </m:e>
+                      <m:sub>
+                        <m:r>
+                          <a:rPr lang="en-IN" b="0" i="1" smtClean="0">
+                            <a:latin typeface="Cambria Math" panose="02040503050406030204" pitchFamily="18" charset="0"/>
+                          </a:rPr>
+                          <m:t>2</m:t>
+                        </m:r>
+                      </m:sub>
+                    </m:sSub>
+                    <m:r>
+                      <a:rPr lang="en-IN" i="1">
+                        <a:latin typeface="Cambria Math" panose="02040503050406030204" pitchFamily="18" charset="0"/>
+                      </a:rPr>
+                      <m:t>+</m:t>
+                    </m:r>
+                    <m:sSub>
+                      <m:sSubPr>
+                        <m:ctrlPr>
+                          <a:rPr lang="en-IN" i="1">
+                            <a:latin typeface="Cambria Math" panose="02040503050406030204" pitchFamily="18" charset="0"/>
+                          </a:rPr>
+                        </m:ctrlPr>
+                      </m:sSubPr>
+                      <m:e>
+                        <m:r>
+                          <a:rPr lang="en-IN" b="0" i="1" smtClean="0">
+                            <a:latin typeface="Cambria Math" panose="02040503050406030204" pitchFamily="18" charset="0"/>
+                          </a:rPr>
+                          <m:t>2</m:t>
+                        </m:r>
+                        <m:r>
+                          <a:rPr lang="en-IN" b="0" i="1" smtClean="0">
+                            <a:latin typeface="Cambria Math" panose="02040503050406030204" pitchFamily="18" charset="0"/>
+                          </a:rPr>
+                          <m:t>𝐻</m:t>
+                        </m:r>
+                      </m:e>
+                      <m:sub>
+                        <m:r>
+                          <a:rPr lang="en-IN" b="0" i="1" smtClean="0">
+                            <a:latin typeface="Cambria Math" panose="02040503050406030204" pitchFamily="18" charset="0"/>
+                          </a:rPr>
+                          <m:t>2</m:t>
+                        </m:r>
+                      </m:sub>
+                    </m:sSub>
+                    <m:sSub>
+                      <m:sSubPr>
+                        <m:ctrlPr>
+                          <a:rPr lang="en-IN" i="1">
+                            <a:latin typeface="Cambria Math" panose="02040503050406030204" pitchFamily="18" charset="0"/>
+                          </a:rPr>
+                        </m:ctrlPr>
+                      </m:sSubPr>
+                      <m:e>
+                        <m:r>
+                          <a:rPr lang="en-IN" i="1">
+                            <a:latin typeface="Cambria Math" panose="02040503050406030204" pitchFamily="18" charset="0"/>
+                          </a:rPr>
+                          <m:t>𝑂</m:t>
+                        </m:r>
+                      </m:e>
+                      <m:sub>
+                        <m:r>
+                          <a:rPr lang="en-IN" b="0" i="1" smtClean="0">
+                            <a:latin typeface="Cambria Math" panose="02040503050406030204" pitchFamily="18" charset="0"/>
+                          </a:rPr>
+                          <m:t> </m:t>
+                        </m:r>
+                      </m:sub>
+                    </m:sSub>
+                    <m:r>
+                      <a:rPr lang="en-IN" b="0" i="1" smtClean="0">
+                        <a:latin typeface="Cambria Math" panose="02040503050406030204" pitchFamily="18" charset="0"/>
+                      </a:rPr>
+                      <m:t>+</m:t>
+                    </m:r>
+                    <m:sSub>
+                      <m:sSubPr>
+                        <m:ctrlPr>
+                          <a:rPr lang="en-IN" i="1">
+                            <a:latin typeface="Cambria Math" panose="02040503050406030204" pitchFamily="18" charset="0"/>
+                          </a:rPr>
+                        </m:ctrlPr>
+                      </m:sSubPr>
+                      <m:e>
+                        <m:r>
+                          <a:rPr lang="en-IN" i="1">
+                            <a:latin typeface="Cambria Math" panose="02040503050406030204" pitchFamily="18" charset="0"/>
+                          </a:rPr>
+                          <m:t>𝑂</m:t>
+                        </m:r>
+                      </m:e>
+                      <m:sub>
+                        <m:r>
+                          <a:rPr lang="en-IN" i="1">
+                            <a:latin typeface="Cambria Math" panose="02040503050406030204" pitchFamily="18" charset="0"/>
+                          </a:rPr>
+                          <m:t>2</m:t>
+                        </m:r>
+                      </m:sub>
+                    </m:sSub>
+                    <m:r>
+                      <a:rPr lang="en-IN" i="1">
+                        <a:latin typeface="Cambria Math" panose="02040503050406030204" pitchFamily="18" charset="0"/>
+                      </a:rPr>
+                      <m:t>→</m:t>
+                    </m:r>
+                    <m:sSub>
+                      <m:sSubPr>
+                        <m:ctrlPr>
+                          <a:rPr lang="en-IN" i="1">
+                            <a:latin typeface="Cambria Math" panose="02040503050406030204" pitchFamily="18" charset="0"/>
+                          </a:rPr>
+                        </m:ctrlPr>
+                      </m:sSubPr>
+                      <m:e>
+                        <m:r>
+                          <a:rPr lang="en-IN" b="0" i="1" smtClean="0">
+                            <a:latin typeface="Cambria Math" panose="02040503050406030204" pitchFamily="18" charset="0"/>
+                          </a:rPr>
+                          <m:t>4</m:t>
+                        </m:r>
+                        <m:r>
+                          <a:rPr lang="en-IN" b="0" i="1" smtClean="0">
+                            <a:latin typeface="Cambria Math" panose="02040503050406030204" pitchFamily="18" charset="0"/>
+                          </a:rPr>
+                          <m:t>𝐻𝑁</m:t>
+                        </m:r>
+                        <m:r>
+                          <a:rPr lang="en-IN" i="1">
+                            <a:latin typeface="Cambria Math" panose="02040503050406030204" pitchFamily="18" charset="0"/>
+                          </a:rPr>
+                          <m:t>𝑂</m:t>
+                        </m:r>
+                      </m:e>
+                      <m:sub>
+                        <m:r>
+                          <a:rPr lang="en-IN" b="0" i="1" smtClean="0">
+                            <a:latin typeface="Cambria Math" panose="02040503050406030204" pitchFamily="18" charset="0"/>
+                          </a:rPr>
+                          <m:t>3</m:t>
+                        </m:r>
+                      </m:sub>
+                    </m:sSub>
+                  </m:oMath>
+                </a14:m>
+                <a:endParaRPr lang="en-IN" dirty="0" smtClean="0"/>
+              </a:p>
+              <a:p>
+                <a:r>
+                  <a:rPr lang="en-IN" dirty="0" smtClean="0"/>
+                  <a:t>Sources</a:t>
+                </a:r>
+              </a:p>
+              <a:p>
+                <a:pPr lvl="1"/>
+                <a:r>
+                  <a:rPr lang="en-IN" dirty="0" smtClean="0"/>
+                  <a:t>Fuel combustion.</a:t>
+                </a:r>
+              </a:p>
+              <a:p>
+                <a:pPr lvl="1"/>
+                <a:r>
+                  <a:rPr lang="en-IN" dirty="0" smtClean="0"/>
+                  <a:t>Lightening.</a:t>
+                </a:r>
+              </a:p>
+              <a:p>
+                <a:pPr lvl="1"/>
+                <a:r>
+                  <a:rPr lang="en-IN" dirty="0" smtClean="0"/>
+                  <a:t>Forest fire.</a:t>
+                </a:r>
+              </a:p>
+              <a:p>
+                <a:pPr lvl="1"/>
+                <a:r>
+                  <a:rPr lang="en-IN" dirty="0" smtClean="0"/>
+                  <a:t>Decomposition of organic matters.</a:t>
+                </a:r>
+                <a:endParaRPr lang="en-IN" dirty="0"/>
+              </a:p>
+            </p:txBody>
+          </p:sp>
+        </mc:Choice>
+        <mc:Fallback>
+          <p:sp>
+            <p:nvSpPr>
+              <p:cNvPr id="3" name="Content Placeholder 2"/>
+              <p:cNvSpPr>
+                <a:spLocks noGrp="1" noRot="1" noChangeAspect="1" noMove="1" noResize="1" noEditPoints="1" noAdjustHandles="1" noChangeArrowheads="1" noChangeShapeType="1" noTextEdit="1"/>
+              </p:cNvSpPr>
+              <p:nvPr>
+                <p:ph idx="1"/>
+              </p:nvPr>
+            </p:nvSpPr>
+            <p:spPr>
+              <a:blipFill rotWithShape="0">
+                <a:blip r:embed="rId2"/>
+                <a:stretch>
+                  <a:fillRect l="-1704" t="-1752" b="-539"/>
+                </a:stretch>
+              </a:blipFill>
+            </p:spPr>
+            <p:txBody>
+              <a:bodyPr/>
+              <a:lstStyle/>
+              <a:p>
+                <a:r>
+                  <a:rPr lang="en-IN">
+                    <a:noFill/>
+                  </a:rPr>
+                  <a:t> </a:t>
+                </a:r>
+              </a:p>
+            </p:txBody>
+          </p:sp>
+        </mc:Fallback>
+      </mc:AlternateContent>
+    </p:spTree>
+    <p:extLst>
+      <p:ext uri="{BB962C8B-B14F-4D97-AF65-F5344CB8AC3E}">
+        <p14:creationId xmlns:p14="http://schemas.microsoft.com/office/powerpoint/2010/main" val="3960848393"/>
+      </p:ext>
+    </p:extLst>
+  </p:cSld>
+  <p:clrMapOvr>
+    <a:masterClrMapping/>
+  </p:clrMapOvr>
+</p:sld>
+</file>
+
+<file path=ppt/slides/slide24.xml><?xml version="1.0" encoding="utf-8"?>
+<p:sld xmlns:a="http://schemas.openxmlformats.org/drawingml/2006/main" xmlns:r="http://schemas.openxmlformats.org/officeDocument/2006/relationships" xmlns:p="http://schemas.openxmlformats.org/presentationml/2006/main">
+  <p:cSld>
+    <p:spTree>
+      <p:nvGrpSpPr>
+        <p:cNvPr id="1" name=""/>
+        <p:cNvGrpSpPr/>
+        <p:nvPr/>
+      </p:nvGrpSpPr>
+      <p:grpSpPr>
+        <a:xfrm>
+          <a:off x="0" y="0"/>
+          <a:ext cx="0" cy="0"/>
+          <a:chOff x="0" y="0"/>
+          <a:chExt cx="0" cy="0"/>
+        </a:xfrm>
+      </p:grpSpPr>
+      <p:sp>
+        <p:nvSpPr>
+          <p:cNvPr id="2" name="Title 1"/>
+          <p:cNvSpPr>
+            <a:spLocks noGrp="1"/>
+          </p:cNvSpPr>
+          <p:nvPr>
+            <p:ph type="title"/>
+          </p:nvPr>
+        </p:nvSpPr>
+        <p:spPr/>
+        <p:txBody>
+          <a:bodyPr/>
+          <a:lstStyle/>
+          <a:p>
+            <a:r>
+              <a:rPr lang="en-IN" dirty="0" smtClean="0"/>
+              <a:t>Oxides of Nitrogen (</a:t>
+            </a:r>
+            <a:r>
+              <a:rPr lang="en-IN" dirty="0" err="1" smtClean="0"/>
+              <a:t>NOx</a:t>
+            </a:r>
+            <a:r>
+              <a:rPr lang="en-IN" dirty="0" smtClean="0"/>
+              <a:t>)</a:t>
+            </a:r>
+            <a:endParaRPr lang="en-IN" dirty="0"/>
+          </a:p>
+        </p:txBody>
+      </p:sp>
+      <mc:AlternateContent xmlns:mc="http://schemas.openxmlformats.org/markup-compatibility/2006">
+        <mc:Choice xmlns:a14="http://schemas.microsoft.com/office/drawing/2010/main" Requires="a14">
+          <p:sp>
+            <p:nvSpPr>
+              <p:cNvPr id="3" name="Content Placeholder 2"/>
+              <p:cNvSpPr>
+                <a:spLocks noGrp="1"/>
+              </p:cNvSpPr>
+              <p:nvPr>
+                <p:ph idx="1"/>
+              </p:nvPr>
+            </p:nvSpPr>
+            <p:spPr/>
+            <p:txBody>
+              <a:bodyPr/>
+              <a:lstStyle/>
+              <a:p>
+                <a:r>
+                  <a:rPr lang="en-IN" dirty="0" smtClean="0"/>
+                  <a:t>Effects</a:t>
+                </a:r>
+              </a:p>
+              <a:p>
+                <a:pPr lvl="1"/>
+                <a:r>
+                  <a:rPr lang="en-IN" dirty="0" smtClean="0"/>
+                  <a:t>It combined with haemoglobin and affects.</a:t>
+                </a:r>
+              </a:p>
+              <a:p>
+                <a:pPr lvl="1"/>
+                <a14:m>
+                  <m:oMath xmlns:m="http://schemas.openxmlformats.org/officeDocument/2006/math">
+                    <m:sSub>
+                      <m:sSubPr>
+                        <m:ctrlPr>
+                          <a:rPr lang="en-IN" i="1">
+                            <a:latin typeface="Cambria Math" panose="02040503050406030204" pitchFamily="18" charset="0"/>
+                          </a:rPr>
+                        </m:ctrlPr>
+                      </m:sSubPr>
+                      <m:e>
+                        <m:r>
+                          <a:rPr lang="en-IN" i="1">
+                            <a:latin typeface="Cambria Math" panose="02040503050406030204" pitchFamily="18" charset="0"/>
+                          </a:rPr>
+                          <m:t>𝑁𝑂</m:t>
+                        </m:r>
+                      </m:e>
+                      <m:sub>
+                        <m:r>
+                          <a:rPr lang="en-IN" i="1">
+                            <a:latin typeface="Cambria Math" panose="02040503050406030204" pitchFamily="18" charset="0"/>
+                          </a:rPr>
+                          <m:t>2</m:t>
+                        </m:r>
+                      </m:sub>
+                    </m:sSub>
+                  </m:oMath>
+                </a14:m>
+                <a:r>
+                  <a:rPr lang="en-IN" dirty="0" smtClean="0"/>
+                  <a:t> is more toxic than </a:t>
+                </a:r>
+                <a:r>
+                  <a:rPr lang="en-IN" i="1" dirty="0" smtClean="0"/>
+                  <a:t>NO </a:t>
+                </a:r>
+                <a:r>
+                  <a:rPr lang="en-IN" dirty="0" smtClean="0"/>
+                  <a:t>affects the lungs and high concentration causes bronchitis (</a:t>
+                </a:r>
+                <a:r>
+                  <a:rPr lang="en-IN" dirty="0"/>
+                  <a:t>inflammation of the </a:t>
+                </a:r>
+                <a:r>
+                  <a:rPr lang="en-IN" dirty="0" smtClean="0"/>
+                  <a:t>bronchi).</a:t>
+                </a:r>
+              </a:p>
+              <a:p>
+                <a:r>
+                  <a:rPr lang="en-IN" dirty="0" smtClean="0"/>
+                  <a:t>Control</a:t>
+                </a:r>
+              </a:p>
+              <a:p>
+                <a:pPr lvl="1"/>
+                <a:r>
+                  <a:rPr lang="en-IN" dirty="0" smtClean="0"/>
+                  <a:t>Modification of combustion conditions helps to reduces the NO levels.</a:t>
+                </a:r>
+              </a:p>
+              <a:p>
+                <a:pPr lvl="1"/>
+                <a:r>
+                  <a:rPr lang="en-IN" dirty="0" smtClean="0"/>
+                  <a:t>Usage of NO controlling devices. </a:t>
+                </a:r>
+              </a:p>
+              <a:p>
+                <a:pPr lvl="1"/>
+                <a:endParaRPr lang="en-IN" dirty="0" smtClean="0"/>
+              </a:p>
+            </p:txBody>
+          </p:sp>
+        </mc:Choice>
+        <mc:Fallback>
+          <p:sp>
+            <p:nvSpPr>
+              <p:cNvPr id="3" name="Content Placeholder 2"/>
+              <p:cNvSpPr>
+                <a:spLocks noGrp="1" noRot="1" noChangeAspect="1" noMove="1" noResize="1" noEditPoints="1" noAdjustHandles="1" noChangeArrowheads="1" noChangeShapeType="1" noTextEdit="1"/>
+              </p:cNvSpPr>
+              <p:nvPr>
+                <p:ph idx="1"/>
+              </p:nvPr>
+            </p:nvSpPr>
+            <p:spPr>
+              <a:blipFill rotWithShape="0">
+                <a:blip r:embed="rId2"/>
+                <a:stretch>
+                  <a:fillRect l="-1704" t="-1752" r="-519" b="-2965"/>
+                </a:stretch>
+              </a:blipFill>
+            </p:spPr>
+            <p:txBody>
+              <a:bodyPr/>
+              <a:lstStyle/>
+              <a:p>
+                <a:r>
+                  <a:rPr lang="en-IN">
+                    <a:noFill/>
+                  </a:rPr>
+                  <a:t> </a:t>
+                </a:r>
+              </a:p>
+            </p:txBody>
+          </p:sp>
+        </mc:Fallback>
+      </mc:AlternateContent>
+    </p:spTree>
+    <p:extLst>
+      <p:ext uri="{BB962C8B-B14F-4D97-AF65-F5344CB8AC3E}">
+        <p14:creationId xmlns:p14="http://schemas.microsoft.com/office/powerpoint/2010/main" val="3449931136"/>
+      </p:ext>
+    </p:extLst>
+  </p:cSld>
+  <p:clrMapOvr>
+    <a:masterClrMapping/>
+  </p:clrMapOvr>
+</p:sld>
+</file>
+
+<file path=ppt/slides/slide25.xml><?xml version="1.0" encoding="utf-8"?>
+<p:sld xmlns:a="http://schemas.openxmlformats.org/drawingml/2006/main" xmlns:r="http://schemas.openxmlformats.org/officeDocument/2006/relationships" xmlns:p="http://schemas.openxmlformats.org/presentationml/2006/main">
+  <p:cSld>
+    <p:spTree>
+      <p:nvGrpSpPr>
+        <p:cNvPr id="1" name=""/>
+        <p:cNvGrpSpPr/>
+        <p:nvPr/>
+      </p:nvGrpSpPr>
+      <p:grpSpPr>
+        <a:xfrm>
+          <a:off x="0" y="0"/>
+          <a:ext cx="0" cy="0"/>
+          <a:chOff x="0" y="0"/>
+          <a:chExt cx="0" cy="0"/>
+        </a:xfrm>
+      </p:grpSpPr>
+      <p:sp>
+        <p:nvSpPr>
+          <p:cNvPr id="2" name="Title 1"/>
+          <p:cNvSpPr>
+            <a:spLocks noGrp="1"/>
+          </p:cNvSpPr>
+          <p:nvPr>
+            <p:ph type="title"/>
+          </p:nvPr>
+        </p:nvSpPr>
+        <p:spPr/>
+        <p:txBody>
+          <a:bodyPr/>
+          <a:lstStyle/>
+          <a:p>
+            <a:r>
+              <a:rPr lang="en-IN" dirty="0" smtClean="0"/>
+              <a:t>Carbon Monoxide</a:t>
+            </a:r>
+            <a:endParaRPr lang="en-IN" dirty="0"/>
+          </a:p>
+        </p:txBody>
+      </p:sp>
+      <p:sp>
+        <p:nvSpPr>
+          <p:cNvPr id="3" name="Content Placeholder 2"/>
+          <p:cNvSpPr>
+            <a:spLocks noGrp="1"/>
+          </p:cNvSpPr>
+          <p:nvPr>
+            <p:ph idx="1"/>
+          </p:nvPr>
+        </p:nvSpPr>
+        <p:spPr/>
+        <p:txBody>
+          <a:bodyPr>
+            <a:normAutofit lnSpcReduction="10000"/>
+          </a:bodyPr>
+          <a:lstStyle/>
+          <a:p>
+            <a:r>
+              <a:rPr lang="en-IN" dirty="0" smtClean="0"/>
+              <a:t>Effects</a:t>
+            </a:r>
+          </a:p>
+          <a:p>
+            <a:pPr lvl="1"/>
+            <a:r>
+              <a:rPr lang="en-IN" dirty="0" smtClean="0"/>
+              <a:t>It affects the haemoglobin.</a:t>
+            </a:r>
+          </a:p>
+          <a:p>
+            <a:pPr lvl="1"/>
+            <a:r>
+              <a:rPr lang="en-IN" dirty="0" smtClean="0"/>
+              <a:t>Head aches and anaemia.</a:t>
+            </a:r>
+          </a:p>
+          <a:p>
+            <a:r>
+              <a:rPr lang="en-IN" dirty="0" smtClean="0"/>
+              <a:t>Control</a:t>
+            </a:r>
+          </a:p>
+          <a:p>
+            <a:pPr lvl="1"/>
+            <a:r>
+              <a:rPr lang="en-IN" dirty="0" smtClean="0"/>
+              <a:t>Adsorption</a:t>
+            </a:r>
+          </a:p>
+          <a:p>
+            <a:pPr lvl="1"/>
+            <a:r>
+              <a:rPr lang="en-IN" dirty="0" smtClean="0"/>
+              <a:t>Absorption</a:t>
+            </a:r>
+            <a:endParaRPr lang="en-IN" dirty="0"/>
+          </a:p>
+          <a:p>
+            <a:pPr lvl="1"/>
+            <a:r>
+              <a:rPr lang="en-IN" dirty="0" smtClean="0"/>
+              <a:t>Condensation</a:t>
+            </a:r>
+          </a:p>
+          <a:p>
+            <a:pPr lvl="1"/>
+            <a:r>
+              <a:rPr lang="en-IN" dirty="0" smtClean="0"/>
+              <a:t>Combustion</a:t>
+            </a:r>
+          </a:p>
+          <a:p>
+            <a:pPr lvl="1"/>
+            <a:r>
+              <a:rPr lang="en-IN" dirty="0" smtClean="0"/>
+              <a:t>Source control</a:t>
+            </a:r>
+            <a:endParaRPr lang="en-IN" dirty="0"/>
+          </a:p>
+        </p:txBody>
+      </p:sp>
+    </p:spTree>
+    <p:extLst>
+      <p:ext uri="{BB962C8B-B14F-4D97-AF65-F5344CB8AC3E}">
+        <p14:creationId xmlns:p14="http://schemas.microsoft.com/office/powerpoint/2010/main" val="2496806906"/>
+      </p:ext>
+    </p:extLst>
+  </p:cSld>
+  <p:clrMapOvr>
+    <a:masterClrMapping/>
+  </p:clrMapOvr>
+</p:sld>
+</file>
+
+<file path=ppt/slides/slide26.xml><?xml version="1.0" encoding="utf-8"?>
+<p:sld xmlns:a="http://schemas.openxmlformats.org/drawingml/2006/main" xmlns:r="http://schemas.openxmlformats.org/officeDocument/2006/relationships" xmlns:p="http://schemas.openxmlformats.org/presentationml/2006/main">
+  <p:cSld>
+    <p:spTree>
+      <p:nvGrpSpPr>
+        <p:cNvPr id="1" name=""/>
+        <p:cNvGrpSpPr/>
+        <p:nvPr/>
+      </p:nvGrpSpPr>
+      <p:grpSpPr>
+        <a:xfrm>
+          <a:off x="0" y="0"/>
+          <a:ext cx="0" cy="0"/>
+          <a:chOff x="0" y="0"/>
+          <a:chExt cx="0" cy="0"/>
+        </a:xfrm>
+      </p:grpSpPr>
+      <p:sp>
+        <p:nvSpPr>
+          <p:cNvPr id="2" name="Title 1"/>
+          <p:cNvSpPr>
+            <a:spLocks noGrp="1"/>
+          </p:cNvSpPr>
+          <p:nvPr>
+            <p:ph type="title"/>
+          </p:nvPr>
+        </p:nvSpPr>
+        <p:spPr/>
+        <p:txBody>
+          <a:bodyPr/>
+          <a:lstStyle/>
+          <a:p>
+            <a:r>
+              <a:rPr lang="en-IN" dirty="0" smtClean="0"/>
+              <a:t>Carbon Monoxide</a:t>
+            </a:r>
+            <a:endParaRPr lang="en-IN" dirty="0"/>
+          </a:p>
+        </p:txBody>
+      </p:sp>
+      <mc:AlternateContent xmlns:mc="http://schemas.openxmlformats.org/markup-compatibility/2006">
+        <mc:Choice xmlns:a14="http://schemas.microsoft.com/office/drawing/2010/main" Requires="a14">
+          <p:sp>
+            <p:nvSpPr>
+              <p:cNvPr id="3" name="Content Placeholder 2"/>
+              <p:cNvSpPr>
+                <a:spLocks noGrp="1"/>
+              </p:cNvSpPr>
+              <p:nvPr>
+                <p:ph idx="1"/>
+              </p:nvPr>
+            </p:nvSpPr>
+            <p:spPr/>
+            <p:txBody>
+              <a:bodyPr>
+                <a:normAutofit fontScale="92500" lnSpcReduction="20000"/>
+              </a:bodyPr>
+              <a:lstStyle/>
+              <a:p>
+                <a:r>
+                  <a:rPr lang="en-IN" dirty="0" smtClean="0"/>
+                  <a:t>It is colourless and odourless gas and poisonous to air-breathing animals.</a:t>
+                </a:r>
+              </a:p>
+              <a:p>
+                <a:r>
+                  <a:rPr lang="en-IN" dirty="0" smtClean="0"/>
+                  <a:t>2C</a:t>
+                </a:r>
+                <a14:m>
+                  <m:oMath xmlns:m="http://schemas.openxmlformats.org/officeDocument/2006/math">
+                    <m:r>
+                      <a:rPr lang="en-IN" i="1">
+                        <a:latin typeface="Cambria Math" panose="02040503050406030204" pitchFamily="18" charset="0"/>
+                      </a:rPr>
+                      <m:t>+</m:t>
+                    </m:r>
+                    <m:sSub>
+                      <m:sSubPr>
+                        <m:ctrlPr>
+                          <a:rPr lang="en-IN" i="1">
+                            <a:latin typeface="Cambria Math" panose="02040503050406030204" pitchFamily="18" charset="0"/>
+                          </a:rPr>
+                        </m:ctrlPr>
+                      </m:sSubPr>
+                      <m:e>
+                        <m:r>
+                          <a:rPr lang="en-IN" i="1">
+                            <a:latin typeface="Cambria Math" panose="02040503050406030204" pitchFamily="18" charset="0"/>
+                          </a:rPr>
+                          <m:t>𝑂</m:t>
+                        </m:r>
+                      </m:e>
+                      <m:sub>
+                        <m:r>
+                          <a:rPr lang="en-IN" i="1">
+                            <a:latin typeface="Cambria Math" panose="02040503050406030204" pitchFamily="18" charset="0"/>
+                          </a:rPr>
+                          <m:t>2</m:t>
+                        </m:r>
+                      </m:sub>
+                    </m:sSub>
+                    <m:r>
+                      <a:rPr lang="en-IN" i="1">
+                        <a:latin typeface="Cambria Math" panose="02040503050406030204" pitchFamily="18" charset="0"/>
+                      </a:rPr>
+                      <m:t>→</m:t>
+                    </m:r>
+                    <m:sSub>
+                      <m:sSubPr>
+                        <m:ctrlPr>
+                          <a:rPr lang="en-IN" i="1">
+                            <a:latin typeface="Cambria Math" panose="02040503050406030204" pitchFamily="18" charset="0"/>
+                          </a:rPr>
+                        </m:ctrlPr>
+                      </m:sSubPr>
+                      <m:e>
+                        <m:r>
+                          <a:rPr lang="en-IN" b="0" i="1" smtClean="0">
+                            <a:latin typeface="Cambria Math" panose="02040503050406030204" pitchFamily="18" charset="0"/>
+                          </a:rPr>
+                          <m:t>2</m:t>
+                        </m:r>
+                        <m:r>
+                          <a:rPr lang="en-IN" b="0" i="1" smtClean="0">
+                            <a:latin typeface="Cambria Math" panose="02040503050406030204" pitchFamily="18" charset="0"/>
+                          </a:rPr>
+                          <m:t>𝐶𝑂</m:t>
+                        </m:r>
+                      </m:e>
+                      <m:sub>
+                        <m:r>
+                          <a:rPr lang="en-IN" b="0" i="1" smtClean="0">
+                            <a:latin typeface="Cambria Math" panose="02040503050406030204" pitchFamily="18" charset="0"/>
+                          </a:rPr>
+                          <m:t> </m:t>
+                        </m:r>
+                      </m:sub>
+                    </m:sSub>
+                  </m:oMath>
+                </a14:m>
+                <a:endParaRPr lang="en-IN" dirty="0" smtClean="0"/>
+              </a:p>
+              <a:p>
+                <a:r>
+                  <a:rPr lang="en-IN" dirty="0"/>
+                  <a:t>2C</a:t>
+                </a:r>
+                <a14:m>
+                  <m:oMath xmlns:m="http://schemas.openxmlformats.org/officeDocument/2006/math">
+                    <m:r>
+                      <m:rPr>
+                        <m:sty m:val="p"/>
+                      </m:rPr>
+                      <a:rPr lang="en-IN" dirty="0">
+                        <a:latin typeface="Cambria Math" panose="02040503050406030204" pitchFamily="18" charset="0"/>
+                      </a:rPr>
+                      <m:t>O</m:t>
+                    </m:r>
+                    <m:r>
+                      <a:rPr lang="en-IN" i="1">
+                        <a:latin typeface="Cambria Math" panose="02040503050406030204" pitchFamily="18" charset="0"/>
+                      </a:rPr>
+                      <m:t>+</m:t>
+                    </m:r>
+                    <m:sSub>
+                      <m:sSubPr>
+                        <m:ctrlPr>
+                          <a:rPr lang="en-IN" i="1">
+                            <a:latin typeface="Cambria Math" panose="02040503050406030204" pitchFamily="18" charset="0"/>
+                          </a:rPr>
+                        </m:ctrlPr>
+                      </m:sSubPr>
+                      <m:e>
+                        <m:r>
+                          <a:rPr lang="en-IN" i="1">
+                            <a:latin typeface="Cambria Math" panose="02040503050406030204" pitchFamily="18" charset="0"/>
+                          </a:rPr>
+                          <m:t>𝑂</m:t>
+                        </m:r>
+                      </m:e>
+                      <m:sub>
+                        <m:r>
+                          <a:rPr lang="en-IN" i="1">
+                            <a:latin typeface="Cambria Math" panose="02040503050406030204" pitchFamily="18" charset="0"/>
+                          </a:rPr>
+                          <m:t>2</m:t>
+                        </m:r>
+                      </m:sub>
+                    </m:sSub>
+                    <m:r>
+                      <a:rPr lang="en-IN" i="1">
+                        <a:latin typeface="Cambria Math" panose="02040503050406030204" pitchFamily="18" charset="0"/>
+                      </a:rPr>
+                      <m:t>→</m:t>
+                    </m:r>
+                    <m:sSub>
+                      <m:sSubPr>
+                        <m:ctrlPr>
+                          <a:rPr lang="en-IN" i="1">
+                            <a:latin typeface="Cambria Math" panose="02040503050406030204" pitchFamily="18" charset="0"/>
+                          </a:rPr>
+                        </m:ctrlPr>
+                      </m:sSubPr>
+                      <m:e>
+                        <m:r>
+                          <a:rPr lang="en-IN" i="1">
+                            <a:latin typeface="Cambria Math" panose="02040503050406030204" pitchFamily="18" charset="0"/>
+                          </a:rPr>
+                          <m:t>2</m:t>
+                        </m:r>
+                        <m:r>
+                          <a:rPr lang="en-IN" i="1">
+                            <a:latin typeface="Cambria Math" panose="02040503050406030204" pitchFamily="18" charset="0"/>
+                          </a:rPr>
+                          <m:t>𝐶𝑂</m:t>
+                        </m:r>
+                      </m:e>
+                      <m:sub>
+                        <m:r>
+                          <a:rPr lang="en-IN" b="0" i="1" smtClean="0">
+                            <a:latin typeface="Cambria Math" panose="02040503050406030204" pitchFamily="18" charset="0"/>
+                          </a:rPr>
+                          <m:t>2</m:t>
+                        </m:r>
+                      </m:sub>
+                    </m:sSub>
+                  </m:oMath>
+                </a14:m>
+                <a:endParaRPr lang="en-IN" dirty="0" smtClean="0"/>
+              </a:p>
+              <a:p>
+                <a:r>
+                  <a:rPr lang="en-IN" dirty="0" smtClean="0"/>
+                  <a:t>Sources</a:t>
+                </a:r>
+              </a:p>
+              <a:p>
+                <a:pPr lvl="1"/>
+                <a:r>
+                  <a:rPr lang="en-IN" dirty="0" smtClean="0"/>
+                  <a:t>Cigarette smoking.</a:t>
+                </a:r>
+              </a:p>
+              <a:p>
+                <a:pPr lvl="1"/>
+                <a:r>
+                  <a:rPr lang="en-IN" dirty="0" smtClean="0"/>
+                  <a:t>Forest fire.</a:t>
+                </a:r>
+              </a:p>
+              <a:p>
+                <a:pPr lvl="1"/>
+                <a:r>
+                  <a:rPr lang="en-IN" dirty="0" smtClean="0"/>
+                  <a:t>Coal mines.</a:t>
+                </a:r>
+              </a:p>
+              <a:p>
+                <a:pPr lvl="1"/>
+                <a:r>
+                  <a:rPr lang="en-IN" dirty="0" smtClean="0"/>
+                  <a:t>Gas heaters.</a:t>
+                </a:r>
+              </a:p>
+              <a:p>
+                <a:pPr lvl="1"/>
+                <a:r>
+                  <a:rPr lang="en-IN" dirty="0" smtClean="0"/>
+                  <a:t>Incomplete combustion of fossil fuel.</a:t>
+                </a:r>
+              </a:p>
+              <a:p>
+                <a:pPr lvl="1"/>
+                <a:endParaRPr lang="en-IN" dirty="0" smtClean="0"/>
+              </a:p>
+              <a:p>
+                <a:endParaRPr lang="en-IN" dirty="0"/>
+              </a:p>
+            </p:txBody>
+          </p:sp>
+        </mc:Choice>
+        <mc:Fallback>
+          <p:sp>
+            <p:nvSpPr>
+              <p:cNvPr id="3" name="Content Placeholder 2"/>
+              <p:cNvSpPr>
+                <a:spLocks noGrp="1" noRot="1" noChangeAspect="1" noMove="1" noResize="1" noEditPoints="1" noAdjustHandles="1" noChangeArrowheads="1" noChangeShapeType="1" noTextEdit="1"/>
+              </p:cNvSpPr>
+              <p:nvPr>
+                <p:ph idx="1"/>
+              </p:nvPr>
+            </p:nvSpPr>
+            <p:spPr>
+              <a:blipFill rotWithShape="0">
+                <a:blip r:embed="rId2"/>
+                <a:stretch>
+                  <a:fillRect l="-1481" t="-3774"/>
+                </a:stretch>
+              </a:blipFill>
+            </p:spPr>
+            <p:txBody>
+              <a:bodyPr/>
+              <a:lstStyle/>
+              <a:p>
+                <a:r>
+                  <a:rPr lang="en-IN">
+                    <a:noFill/>
+                  </a:rPr>
+                  <a:t> </a:t>
+                </a:r>
+              </a:p>
+            </p:txBody>
+          </p:sp>
+        </mc:Fallback>
+      </mc:AlternateContent>
+    </p:spTree>
+    <p:extLst>
+      <p:ext uri="{BB962C8B-B14F-4D97-AF65-F5344CB8AC3E}">
+        <p14:creationId xmlns:p14="http://schemas.microsoft.com/office/powerpoint/2010/main" val="862476431"/>
+      </p:ext>
+    </p:extLst>
+  </p:cSld>
+  <p:clrMapOvr>
+    <a:masterClrMapping/>
+  </p:clrMapOvr>
+</p:sld>
+</file>
+
+<file path=ppt/slides/slide27.xml><?xml version="1.0" encoding="utf-8"?>
+<p:sld xmlns:a="http://schemas.openxmlformats.org/drawingml/2006/main" xmlns:r="http://schemas.openxmlformats.org/officeDocument/2006/relationships" xmlns:p="http://schemas.openxmlformats.org/presentationml/2006/main">
+  <p:cSld>
+    <p:spTree>
+      <p:nvGrpSpPr>
+        <p:cNvPr id="1" name=""/>
+        <p:cNvGrpSpPr/>
+        <p:nvPr/>
+      </p:nvGrpSpPr>
+      <p:grpSpPr>
+        <a:xfrm>
+          <a:off x="0" y="0"/>
+          <a:ext cx="0" cy="0"/>
+          <a:chOff x="0" y="0"/>
+          <a:chExt cx="0" cy="0"/>
+        </a:xfrm>
+      </p:grpSpPr>
+      <p:sp>
+        <p:nvSpPr>
+          <p:cNvPr id="2" name="Title 1"/>
+          <p:cNvSpPr>
+            <a:spLocks noGrp="1"/>
+          </p:cNvSpPr>
+          <p:nvPr>
+            <p:ph type="title"/>
+          </p:nvPr>
+        </p:nvSpPr>
+        <p:spPr/>
+        <p:txBody>
+          <a:bodyPr/>
+          <a:lstStyle/>
+          <a:p>
+            <a:r>
+              <a:rPr lang="en-IN" dirty="0" smtClean="0"/>
+              <a:t>Sulphur Dioxides</a:t>
+            </a:r>
+            <a:endParaRPr lang="en-IN" dirty="0"/>
+          </a:p>
+        </p:txBody>
+      </p:sp>
+      <p:sp>
+        <p:nvSpPr>
+          <p:cNvPr id="3" name="Content Placeholder 2"/>
+          <p:cNvSpPr>
+            <a:spLocks noGrp="1"/>
+          </p:cNvSpPr>
+          <p:nvPr>
+            <p:ph idx="1"/>
+          </p:nvPr>
+        </p:nvSpPr>
+        <p:spPr/>
+        <p:txBody>
+          <a:bodyPr>
+            <a:normAutofit fontScale="92500" lnSpcReduction="10000"/>
+          </a:bodyPr>
+          <a:lstStyle/>
+          <a:p>
+            <a:r>
+              <a:rPr lang="en-IN" dirty="0" smtClean="0"/>
+              <a:t>It is colourless odourless irritating gas.</a:t>
+            </a:r>
+          </a:p>
+          <a:p>
+            <a:r>
+              <a:rPr lang="en-IN" dirty="0" smtClean="0"/>
+              <a:t>Sources</a:t>
+            </a:r>
+          </a:p>
+          <a:p>
+            <a:pPr lvl="1"/>
+            <a:r>
+              <a:rPr lang="en-IN" dirty="0" smtClean="0"/>
+              <a:t>Fossil fuels</a:t>
+            </a:r>
+          </a:p>
+          <a:p>
+            <a:r>
+              <a:rPr lang="en-IN" dirty="0" smtClean="0"/>
+              <a:t>Effects</a:t>
+            </a:r>
+          </a:p>
+          <a:p>
+            <a:pPr lvl="1"/>
+            <a:r>
+              <a:rPr lang="en-IN" dirty="0" smtClean="0"/>
+              <a:t>Breathing problem</a:t>
+            </a:r>
+            <a:endParaRPr lang="en-IN" dirty="0"/>
+          </a:p>
+          <a:p>
+            <a:pPr lvl="1"/>
+            <a:r>
+              <a:rPr lang="en-IN" dirty="0" smtClean="0"/>
+              <a:t>Irritates the lungs.</a:t>
+            </a:r>
+          </a:p>
+          <a:p>
+            <a:r>
+              <a:rPr lang="en-IN" dirty="0" smtClean="0"/>
+              <a:t>Control</a:t>
+            </a:r>
+          </a:p>
+          <a:p>
+            <a:pPr lvl="1"/>
+            <a:r>
+              <a:rPr lang="en-IN" dirty="0" smtClean="0"/>
+              <a:t>Burning fuel with less sulphur.</a:t>
+            </a:r>
+          </a:p>
+          <a:p>
+            <a:pPr lvl="1"/>
+            <a:r>
+              <a:rPr lang="en-IN" dirty="0" smtClean="0"/>
+              <a:t>Liquefying coal and other sulphur contain fuels. </a:t>
+            </a:r>
+            <a:endParaRPr lang="en-IN" dirty="0"/>
+          </a:p>
+        </p:txBody>
+      </p:sp>
+    </p:spTree>
+    <p:extLst>
+      <p:ext uri="{BB962C8B-B14F-4D97-AF65-F5344CB8AC3E}">
+        <p14:creationId xmlns:p14="http://schemas.microsoft.com/office/powerpoint/2010/main" val="3525498654"/>
+      </p:ext>
+    </p:extLst>
+  </p:cSld>
+  <p:clrMapOvr>
+    <a:masterClrMapping/>
+  </p:clrMapOvr>
+</p:sld>
+</file>
+
+<file path=ppt/slides/slide28.xml><?xml version="1.0" encoding="utf-8"?>
+<p:sld xmlns:a="http://schemas.openxmlformats.org/drawingml/2006/main" xmlns:r="http://schemas.openxmlformats.org/officeDocument/2006/relationships" xmlns:p="http://schemas.openxmlformats.org/presentationml/2006/main">
+  <p:cSld>
+    <p:spTree>
+      <p:nvGrpSpPr>
+        <p:cNvPr id="1" name=""/>
+        <p:cNvGrpSpPr/>
+        <p:nvPr/>
+      </p:nvGrpSpPr>
+      <p:grpSpPr>
+        <a:xfrm>
+          <a:off x="0" y="0"/>
+          <a:ext cx="0" cy="0"/>
+          <a:chOff x="0" y="0"/>
+          <a:chExt cx="0" cy="0"/>
+        </a:xfrm>
+      </p:grpSpPr>
+      <p:sp>
+        <p:nvSpPr>
+          <p:cNvPr id="2" name="Title 1"/>
+          <p:cNvSpPr>
+            <a:spLocks noGrp="1"/>
+          </p:cNvSpPr>
+          <p:nvPr>
+            <p:ph type="title"/>
+          </p:nvPr>
+        </p:nvSpPr>
+        <p:spPr/>
+        <p:txBody>
+          <a:bodyPr/>
+          <a:lstStyle/>
+          <a:p>
+            <a:r>
+              <a:rPr lang="en-IN" dirty="0" smtClean="0"/>
+              <a:t>Hydrocarbons</a:t>
+            </a:r>
+            <a:endParaRPr lang="en-IN" dirty="0"/>
+          </a:p>
+        </p:txBody>
+      </p:sp>
+      <p:sp>
+        <p:nvSpPr>
+          <p:cNvPr id="3" name="Content Placeholder 2"/>
+          <p:cNvSpPr>
+            <a:spLocks noGrp="1"/>
+          </p:cNvSpPr>
+          <p:nvPr>
+            <p:ph idx="1"/>
+          </p:nvPr>
+        </p:nvSpPr>
+        <p:spPr/>
+        <p:txBody>
+          <a:bodyPr>
+            <a:normAutofit fontScale="85000" lnSpcReduction="20000"/>
+          </a:bodyPr>
+          <a:lstStyle/>
+          <a:p>
+            <a:r>
+              <a:rPr lang="en-IN" dirty="0" smtClean="0"/>
+              <a:t>It is produced in the atmosphere in the presence of sunlight and nitrogen.</a:t>
+            </a:r>
+          </a:p>
+          <a:p>
+            <a:r>
+              <a:rPr lang="en-IN" dirty="0" smtClean="0"/>
+              <a:t>Sources</a:t>
+            </a:r>
+          </a:p>
+          <a:p>
+            <a:pPr lvl="1"/>
+            <a:r>
+              <a:rPr lang="en-IN" dirty="0" smtClean="0"/>
+              <a:t>Fossil fuels.</a:t>
+            </a:r>
+          </a:p>
+          <a:p>
+            <a:r>
+              <a:rPr lang="en-IN" dirty="0" smtClean="0"/>
+              <a:t>Effects</a:t>
+            </a:r>
+          </a:p>
+          <a:p>
+            <a:pPr lvl="1"/>
+            <a:r>
+              <a:rPr lang="en-IN" dirty="0" smtClean="0"/>
+              <a:t>Irritates the eyes.</a:t>
+            </a:r>
+          </a:p>
+          <a:p>
+            <a:pPr lvl="1"/>
+            <a:r>
+              <a:rPr lang="en-IN" dirty="0" smtClean="0"/>
+              <a:t>Damage the lungs.</a:t>
+            </a:r>
+          </a:p>
+          <a:p>
+            <a:pPr lvl="1"/>
+            <a:r>
+              <a:rPr lang="en-IN" dirty="0" smtClean="0"/>
+              <a:t>Aggressive respiratory problems.</a:t>
+            </a:r>
+          </a:p>
+          <a:p>
+            <a:r>
+              <a:rPr lang="en-IN" dirty="0" smtClean="0"/>
+              <a:t>Control</a:t>
+            </a:r>
+          </a:p>
+          <a:p>
+            <a:pPr lvl="1"/>
+            <a:r>
+              <a:rPr lang="en-IN" dirty="0" smtClean="0"/>
+              <a:t>It can be reduced by fixing catalytic convertors in the exhaust pipes in automobiles.</a:t>
+            </a:r>
+          </a:p>
+          <a:p>
+            <a:pPr lvl="1"/>
+            <a:r>
+              <a:rPr lang="en-IN" dirty="0" smtClean="0"/>
+              <a:t>Controlling emission of hydrocarbons at the sources.</a:t>
+            </a:r>
+            <a:endParaRPr lang="en-IN" dirty="0"/>
+          </a:p>
+        </p:txBody>
+      </p:sp>
+    </p:spTree>
+    <p:extLst>
+      <p:ext uri="{BB962C8B-B14F-4D97-AF65-F5344CB8AC3E}">
+        <p14:creationId xmlns:p14="http://schemas.microsoft.com/office/powerpoint/2010/main" val="2538870756"/>
+      </p:ext>
+    </p:extLst>
+  </p:cSld>
+  <p:clrMapOvr>
+    <a:masterClrMapping/>
+  </p:clrMapOvr>
+</p:sld>
+</file>
+
+<file path=ppt/slides/slide29.xml><?xml version="1.0" encoding="utf-8"?>
+<p:sld xmlns:a="http://schemas.openxmlformats.org/drawingml/2006/main" xmlns:r="http://schemas.openxmlformats.org/officeDocument/2006/relationships" xmlns:p="http://schemas.openxmlformats.org/presentationml/2006/main">
+  <p:cSld>
+    <p:spTree>
+      <p:nvGrpSpPr>
+        <p:cNvPr id="1" name=""/>
+        <p:cNvGrpSpPr/>
+        <p:nvPr/>
+      </p:nvGrpSpPr>
+      <p:grpSpPr>
+        <a:xfrm>
+          <a:off x="0" y="0"/>
+          <a:ext cx="0" cy="0"/>
+          <a:chOff x="0" y="0"/>
+          <a:chExt cx="0" cy="0"/>
+        </a:xfrm>
+      </p:grpSpPr>
+      <p:sp>
+        <p:nvSpPr>
+          <p:cNvPr id="2" name="Title 1"/>
+          <p:cNvSpPr>
+            <a:spLocks noGrp="1"/>
+          </p:cNvSpPr>
+          <p:nvPr>
+            <p:ph type="title"/>
+          </p:nvPr>
+        </p:nvSpPr>
+        <p:spPr/>
+        <p:txBody>
+          <a:bodyPr/>
+          <a:lstStyle/>
+          <a:p>
+            <a:r>
+              <a:rPr lang="en-IN" dirty="0" smtClean="0"/>
+              <a:t>Water Pollution</a:t>
+            </a:r>
+            <a:endParaRPr lang="en-IN" dirty="0"/>
+          </a:p>
+        </p:txBody>
+      </p:sp>
+      <p:sp>
+        <p:nvSpPr>
+          <p:cNvPr id="3" name="Content Placeholder 2"/>
+          <p:cNvSpPr>
+            <a:spLocks noGrp="1"/>
+          </p:cNvSpPr>
+          <p:nvPr>
+            <p:ph idx="1"/>
+          </p:nvPr>
+        </p:nvSpPr>
+        <p:spPr/>
+        <p:txBody>
+          <a:bodyPr/>
+          <a:lstStyle/>
+          <a:p>
+            <a:pPr algn="just"/>
+            <a:r>
+              <a:rPr lang="en-IN" dirty="0" smtClean="0"/>
+              <a:t>Water pollution is defined as the discharging of impurities to water which alter physical, chemical or biological properties and make it unfit for drinking and domestic purpose.</a:t>
+            </a:r>
+          </a:p>
+          <a:p>
+            <a:pPr algn="just"/>
+            <a:r>
+              <a:rPr lang="en-IN" dirty="0" smtClean="0"/>
+              <a:t>Sources</a:t>
+            </a:r>
+          </a:p>
+          <a:p>
+            <a:pPr lvl="1" algn="just"/>
+            <a:r>
+              <a:rPr lang="en-IN" dirty="0" smtClean="0"/>
+              <a:t>Point sources.</a:t>
+            </a:r>
+          </a:p>
+          <a:p>
+            <a:pPr lvl="1" algn="just"/>
+            <a:r>
+              <a:rPr lang="en-IN" dirty="0" smtClean="0"/>
+              <a:t>Non point sources.</a:t>
+            </a:r>
+          </a:p>
+          <a:p>
+            <a:pPr lvl="1" algn="just"/>
+            <a:endParaRPr lang="en-IN" dirty="0"/>
+          </a:p>
+        </p:txBody>
+      </p:sp>
+    </p:spTree>
+    <p:extLst>
+      <p:ext uri="{BB962C8B-B14F-4D97-AF65-F5344CB8AC3E}">
+        <p14:creationId xmlns:p14="http://schemas.microsoft.com/office/powerpoint/2010/main" val="2849909764"/>
+      </p:ext>
+    </p:extLst>
+  </p:cSld>
+  <p:clrMapOvr>
+    <a:masterClrMapping/>
+  </p:clrMapOvr>
+</p:sld>
+</file>
+
 <file path=ppt/slides/slide3.xml><?xml version="1.0" encoding="utf-8"?>
 <p:sld xmlns:a="http://schemas.openxmlformats.org/drawingml/2006/main" xmlns:r="http://schemas.openxmlformats.org/officeDocument/2006/relationships" xmlns:p="http://schemas.openxmlformats.org/presentationml/2006/main">
   <p:cSld>
@@ -5685,6 +7564,862 @@
 </p:sld>
 </file>
 
+<file path=ppt/slides/slide30.xml><?xml version="1.0" encoding="utf-8"?>
+<p:sld xmlns:a="http://schemas.openxmlformats.org/drawingml/2006/main" xmlns:r="http://schemas.openxmlformats.org/officeDocument/2006/relationships" xmlns:p="http://schemas.openxmlformats.org/presentationml/2006/main">
+  <p:cSld>
+    <p:spTree>
+      <p:nvGrpSpPr>
+        <p:cNvPr id="1" name=""/>
+        <p:cNvGrpSpPr/>
+        <p:nvPr/>
+      </p:nvGrpSpPr>
+      <p:grpSpPr>
+        <a:xfrm>
+          <a:off x="0" y="0"/>
+          <a:ext cx="0" cy="0"/>
+          <a:chOff x="0" y="0"/>
+          <a:chExt cx="0" cy="0"/>
+        </a:xfrm>
+      </p:grpSpPr>
+      <p:sp>
+        <p:nvSpPr>
+          <p:cNvPr id="2" name="Title 1"/>
+          <p:cNvSpPr>
+            <a:spLocks noGrp="1"/>
+          </p:cNvSpPr>
+          <p:nvPr>
+            <p:ph type="title"/>
+          </p:nvPr>
+        </p:nvSpPr>
+        <p:spPr/>
+        <p:txBody>
+          <a:bodyPr/>
+          <a:lstStyle/>
+          <a:p>
+            <a:r>
+              <a:rPr lang="en-IN" dirty="0" smtClean="0"/>
+              <a:t>Water Pollution</a:t>
+            </a:r>
+            <a:endParaRPr lang="en-IN" dirty="0"/>
+          </a:p>
+        </p:txBody>
+      </p:sp>
+      <p:sp>
+        <p:nvSpPr>
+          <p:cNvPr id="3" name="Content Placeholder 2"/>
+          <p:cNvSpPr>
+            <a:spLocks noGrp="1"/>
+          </p:cNvSpPr>
+          <p:nvPr>
+            <p:ph idx="1"/>
+          </p:nvPr>
+        </p:nvSpPr>
+        <p:spPr/>
+        <p:txBody>
+          <a:bodyPr>
+            <a:normAutofit/>
+          </a:bodyPr>
+          <a:lstStyle/>
+          <a:p>
+            <a:pPr algn="just"/>
+            <a:r>
+              <a:rPr lang="en-IN" dirty="0" smtClean="0"/>
+              <a:t>Point Sources</a:t>
+            </a:r>
+          </a:p>
+          <a:p>
+            <a:pPr lvl="1" algn="just"/>
+            <a:r>
+              <a:rPr lang="en-IN" dirty="0" smtClean="0"/>
+              <a:t>It are specific sites which directly discharge effluents to water bodies.</a:t>
+            </a:r>
+          </a:p>
+          <a:p>
+            <a:pPr lvl="2" algn="just"/>
+            <a:r>
+              <a:rPr lang="en-IN" dirty="0" smtClean="0"/>
+              <a:t>Mining</a:t>
+            </a:r>
+          </a:p>
+          <a:p>
+            <a:pPr lvl="2" algn="just"/>
+            <a:r>
+              <a:rPr lang="en-IN" dirty="0" smtClean="0"/>
+              <a:t>Iron and steel</a:t>
+            </a:r>
+          </a:p>
+          <a:p>
+            <a:pPr lvl="2" algn="just"/>
+            <a:r>
+              <a:rPr lang="en-IN" dirty="0" smtClean="0"/>
+              <a:t>Chemical plants</a:t>
+            </a:r>
+          </a:p>
+          <a:p>
+            <a:pPr lvl="2" algn="just"/>
+            <a:r>
+              <a:rPr lang="en-IN" dirty="0" smtClean="0"/>
+              <a:t>Soap and detergents</a:t>
+            </a:r>
+          </a:p>
+          <a:p>
+            <a:pPr lvl="2" algn="just"/>
+            <a:r>
+              <a:rPr lang="en-IN" dirty="0" smtClean="0"/>
+              <a:t>Food processing</a:t>
+            </a:r>
+          </a:p>
+          <a:p>
+            <a:pPr lvl="2" algn="just"/>
+            <a:r>
+              <a:rPr lang="en-IN" dirty="0" smtClean="0"/>
+              <a:t>Paper and in the pulp effluents</a:t>
+            </a:r>
+            <a:endParaRPr lang="en-IN" dirty="0"/>
+          </a:p>
+        </p:txBody>
+      </p:sp>
+    </p:spTree>
+    <p:extLst>
+      <p:ext uri="{BB962C8B-B14F-4D97-AF65-F5344CB8AC3E}">
+        <p14:creationId xmlns:p14="http://schemas.microsoft.com/office/powerpoint/2010/main" val="2319041030"/>
+      </p:ext>
+    </p:extLst>
+  </p:cSld>
+  <p:clrMapOvr>
+    <a:masterClrMapping/>
+  </p:clrMapOvr>
+</p:sld>
+</file>
+
+<file path=ppt/slides/slide31.xml><?xml version="1.0" encoding="utf-8"?>
+<p:sld xmlns:a="http://schemas.openxmlformats.org/drawingml/2006/main" xmlns:r="http://schemas.openxmlformats.org/officeDocument/2006/relationships" xmlns:p="http://schemas.openxmlformats.org/presentationml/2006/main">
+  <p:cSld>
+    <p:spTree>
+      <p:nvGrpSpPr>
+        <p:cNvPr id="1" name=""/>
+        <p:cNvGrpSpPr/>
+        <p:nvPr/>
+      </p:nvGrpSpPr>
+      <p:grpSpPr>
+        <a:xfrm>
+          <a:off x="0" y="0"/>
+          <a:ext cx="0" cy="0"/>
+          <a:chOff x="0" y="0"/>
+          <a:chExt cx="0" cy="0"/>
+        </a:xfrm>
+      </p:grpSpPr>
+      <p:sp>
+        <p:nvSpPr>
+          <p:cNvPr id="2" name="Title 1"/>
+          <p:cNvSpPr>
+            <a:spLocks noGrp="1"/>
+          </p:cNvSpPr>
+          <p:nvPr>
+            <p:ph type="title"/>
+          </p:nvPr>
+        </p:nvSpPr>
+        <p:spPr/>
+        <p:txBody>
+          <a:bodyPr/>
+          <a:lstStyle/>
+          <a:p>
+            <a:r>
+              <a:rPr lang="en-IN" dirty="0" smtClean="0"/>
+              <a:t>Water Pollution</a:t>
+            </a:r>
+            <a:endParaRPr lang="en-IN" dirty="0"/>
+          </a:p>
+        </p:txBody>
+      </p:sp>
+      <p:sp>
+        <p:nvSpPr>
+          <p:cNvPr id="3" name="Content Placeholder 2"/>
+          <p:cNvSpPr>
+            <a:spLocks noGrp="1"/>
+          </p:cNvSpPr>
+          <p:nvPr>
+            <p:ph idx="1"/>
+          </p:nvPr>
+        </p:nvSpPr>
+        <p:spPr/>
+        <p:txBody>
+          <a:bodyPr>
+            <a:normAutofit/>
+          </a:bodyPr>
+          <a:lstStyle/>
+          <a:p>
+            <a:pPr algn="just"/>
+            <a:r>
+              <a:rPr lang="en-IN" dirty="0" smtClean="0"/>
+              <a:t>Non Point Sources</a:t>
+            </a:r>
+          </a:p>
+          <a:p>
+            <a:pPr lvl="1" algn="just"/>
+            <a:r>
+              <a:rPr lang="en-IN" dirty="0" smtClean="0"/>
+              <a:t>It is not specific sites which are scattered.</a:t>
+            </a:r>
+          </a:p>
+          <a:p>
+            <a:pPr lvl="2" algn="just"/>
+            <a:r>
+              <a:rPr lang="en-IN" dirty="0" smtClean="0"/>
+              <a:t>Surface runoff by agriculture.</a:t>
+            </a:r>
+          </a:p>
+          <a:p>
+            <a:pPr lvl="2" algn="just"/>
+            <a:r>
+              <a:rPr lang="en-IN" dirty="0" smtClean="0"/>
+              <a:t>Municipal drainage overflow.</a:t>
+            </a:r>
+          </a:p>
+          <a:p>
+            <a:pPr lvl="2" algn="just"/>
+            <a:r>
+              <a:rPr lang="en-IN" dirty="0" smtClean="0"/>
+              <a:t>Rain water sweeping the roads.</a:t>
+            </a:r>
+          </a:p>
+        </p:txBody>
+      </p:sp>
+    </p:spTree>
+    <p:extLst>
+      <p:ext uri="{BB962C8B-B14F-4D97-AF65-F5344CB8AC3E}">
+        <p14:creationId xmlns:p14="http://schemas.microsoft.com/office/powerpoint/2010/main" val="1616929723"/>
+      </p:ext>
+    </p:extLst>
+  </p:cSld>
+  <p:clrMapOvr>
+    <a:masterClrMapping/>
+  </p:clrMapOvr>
+</p:sld>
+</file>
+
+<file path=ppt/slides/slide32.xml><?xml version="1.0" encoding="utf-8"?>
+<p:sld xmlns:a="http://schemas.openxmlformats.org/drawingml/2006/main" xmlns:r="http://schemas.openxmlformats.org/officeDocument/2006/relationships" xmlns:p="http://schemas.openxmlformats.org/presentationml/2006/main">
+  <p:cSld>
+    <p:spTree>
+      <p:nvGrpSpPr>
+        <p:cNvPr id="1" name=""/>
+        <p:cNvGrpSpPr/>
+        <p:nvPr/>
+      </p:nvGrpSpPr>
+      <p:grpSpPr>
+        <a:xfrm>
+          <a:off x="0" y="0"/>
+          <a:ext cx="0" cy="0"/>
+          <a:chOff x="0" y="0"/>
+          <a:chExt cx="0" cy="0"/>
+        </a:xfrm>
+      </p:grpSpPr>
+      <p:sp>
+        <p:nvSpPr>
+          <p:cNvPr id="2" name="Title 1"/>
+          <p:cNvSpPr>
+            <a:spLocks noGrp="1"/>
+          </p:cNvSpPr>
+          <p:nvPr>
+            <p:ph type="title"/>
+          </p:nvPr>
+        </p:nvSpPr>
+        <p:spPr/>
+        <p:txBody>
+          <a:bodyPr/>
+          <a:lstStyle/>
+          <a:p>
+            <a:r>
+              <a:rPr lang="en-IN" dirty="0" smtClean="0"/>
+              <a:t>Common Water Pollutants</a:t>
+            </a:r>
+            <a:endParaRPr lang="en-IN" dirty="0"/>
+          </a:p>
+        </p:txBody>
+      </p:sp>
+      <p:sp>
+        <p:nvSpPr>
+          <p:cNvPr id="3" name="Content Placeholder 2"/>
+          <p:cNvSpPr>
+            <a:spLocks noGrp="1"/>
+          </p:cNvSpPr>
+          <p:nvPr>
+            <p:ph idx="1"/>
+          </p:nvPr>
+        </p:nvSpPr>
+        <p:spPr/>
+        <p:txBody>
+          <a:bodyPr>
+            <a:normAutofit/>
+          </a:bodyPr>
+          <a:lstStyle/>
+          <a:p>
+            <a:pPr algn="just"/>
+            <a:r>
+              <a:rPr lang="en-IN" dirty="0" smtClean="0"/>
+              <a:t>Industrial waste [effluents of industry]</a:t>
+            </a:r>
+          </a:p>
+          <a:p>
+            <a:pPr lvl="1" algn="just"/>
+            <a:r>
+              <a:rPr lang="en-IN" dirty="0" smtClean="0"/>
+              <a:t>Inorganic pollutants</a:t>
+            </a:r>
+          </a:p>
+          <a:p>
+            <a:pPr lvl="2" algn="just"/>
+            <a:r>
+              <a:rPr lang="en-IN" dirty="0" smtClean="0"/>
+              <a:t>Water soluble.</a:t>
+            </a:r>
+            <a:endParaRPr lang="en-IN" dirty="0"/>
+          </a:p>
+          <a:p>
+            <a:pPr lvl="2" algn="just"/>
+            <a:r>
+              <a:rPr lang="en-IN" dirty="0"/>
+              <a:t>s</a:t>
+            </a:r>
+            <a:r>
+              <a:rPr lang="en-IN" dirty="0" smtClean="0"/>
+              <a:t>ulphates, cyanides, cadmium.</a:t>
+            </a:r>
+          </a:p>
+          <a:p>
+            <a:pPr lvl="1" algn="just"/>
+            <a:r>
+              <a:rPr lang="en-IN" dirty="0" smtClean="0"/>
+              <a:t>Organic pollutants</a:t>
+            </a:r>
+          </a:p>
+          <a:p>
+            <a:pPr lvl="2" algn="just"/>
+            <a:r>
+              <a:rPr lang="en-IN" dirty="0" smtClean="0"/>
+              <a:t>Cellulose fibbers.</a:t>
+            </a:r>
+            <a:endParaRPr lang="en-IN" dirty="0"/>
+          </a:p>
+          <a:p>
+            <a:pPr lvl="2" algn="just"/>
+            <a:r>
+              <a:rPr lang="en-IN" dirty="0" smtClean="0"/>
+              <a:t>Oils, Fats, Phenols. </a:t>
+            </a:r>
+          </a:p>
+        </p:txBody>
+      </p:sp>
+    </p:spTree>
+    <p:extLst>
+      <p:ext uri="{BB962C8B-B14F-4D97-AF65-F5344CB8AC3E}">
+        <p14:creationId xmlns:p14="http://schemas.microsoft.com/office/powerpoint/2010/main" val="2107241651"/>
+      </p:ext>
+    </p:extLst>
+  </p:cSld>
+  <p:clrMapOvr>
+    <a:masterClrMapping/>
+  </p:clrMapOvr>
+</p:sld>
+</file>
+
+<file path=ppt/slides/slide33.xml><?xml version="1.0" encoding="utf-8"?>
+<p:sld xmlns:a="http://schemas.openxmlformats.org/drawingml/2006/main" xmlns:r="http://schemas.openxmlformats.org/officeDocument/2006/relationships" xmlns:p="http://schemas.openxmlformats.org/presentationml/2006/main">
+  <p:cSld>
+    <p:spTree>
+      <p:nvGrpSpPr>
+        <p:cNvPr id="1" name=""/>
+        <p:cNvGrpSpPr/>
+        <p:nvPr/>
+      </p:nvGrpSpPr>
+      <p:grpSpPr>
+        <a:xfrm>
+          <a:off x="0" y="0"/>
+          <a:ext cx="0" cy="0"/>
+          <a:chOff x="0" y="0"/>
+          <a:chExt cx="0" cy="0"/>
+        </a:xfrm>
+      </p:grpSpPr>
+      <p:sp>
+        <p:nvSpPr>
+          <p:cNvPr id="2" name="Title 1"/>
+          <p:cNvSpPr>
+            <a:spLocks noGrp="1"/>
+          </p:cNvSpPr>
+          <p:nvPr>
+            <p:ph type="title"/>
+          </p:nvPr>
+        </p:nvSpPr>
+        <p:spPr/>
+        <p:txBody>
+          <a:bodyPr/>
+          <a:lstStyle/>
+          <a:p>
+            <a:r>
+              <a:rPr lang="en-IN" dirty="0" smtClean="0"/>
+              <a:t>Common Water Pollutants</a:t>
+            </a:r>
+            <a:endParaRPr lang="en-IN" dirty="0"/>
+          </a:p>
+        </p:txBody>
+      </p:sp>
+      <p:sp>
+        <p:nvSpPr>
+          <p:cNvPr id="3" name="Content Placeholder 2"/>
+          <p:cNvSpPr>
+            <a:spLocks noGrp="1"/>
+          </p:cNvSpPr>
+          <p:nvPr>
+            <p:ph idx="1"/>
+          </p:nvPr>
+        </p:nvSpPr>
+        <p:spPr/>
+        <p:txBody>
+          <a:bodyPr>
+            <a:normAutofit/>
+          </a:bodyPr>
+          <a:lstStyle/>
+          <a:p>
+            <a:pPr algn="just"/>
+            <a:r>
+              <a:rPr lang="en-IN" dirty="0" smtClean="0"/>
+              <a:t>Community waste or Domestic waste</a:t>
+            </a:r>
+          </a:p>
+          <a:p>
+            <a:pPr lvl="1" algn="just"/>
+            <a:r>
+              <a:rPr lang="en-IN" dirty="0" smtClean="0"/>
+              <a:t>Agricultural sources</a:t>
+            </a:r>
+          </a:p>
+          <a:p>
+            <a:pPr lvl="1" algn="just"/>
+            <a:r>
+              <a:rPr lang="en-IN" dirty="0" smtClean="0"/>
+              <a:t>Oil</a:t>
+            </a:r>
+          </a:p>
+          <a:p>
+            <a:pPr lvl="1" algn="just"/>
+            <a:r>
+              <a:rPr lang="en-IN" dirty="0" smtClean="0"/>
+              <a:t>Waste heat</a:t>
+            </a:r>
+          </a:p>
+          <a:p>
+            <a:pPr lvl="1" algn="just"/>
+            <a:r>
+              <a:rPr lang="en-IN" dirty="0" smtClean="0"/>
+              <a:t>Mining</a:t>
+            </a:r>
+          </a:p>
+          <a:p>
+            <a:pPr lvl="1" algn="just"/>
+            <a:r>
+              <a:rPr lang="en-IN" dirty="0" smtClean="0"/>
+              <a:t>Air pollution</a:t>
+            </a:r>
+          </a:p>
+          <a:p>
+            <a:pPr lvl="1" algn="just"/>
+            <a:r>
+              <a:rPr lang="en-IN" dirty="0" smtClean="0"/>
+              <a:t>Ground water pollution.</a:t>
+            </a:r>
+          </a:p>
+        </p:txBody>
+      </p:sp>
+    </p:spTree>
+    <p:extLst>
+      <p:ext uri="{BB962C8B-B14F-4D97-AF65-F5344CB8AC3E}">
+        <p14:creationId xmlns:p14="http://schemas.microsoft.com/office/powerpoint/2010/main" val="1238680113"/>
+      </p:ext>
+    </p:extLst>
+  </p:cSld>
+  <p:clrMapOvr>
+    <a:masterClrMapping/>
+  </p:clrMapOvr>
+</p:sld>
+</file>
+
+<file path=ppt/slides/slide34.xml><?xml version="1.0" encoding="utf-8"?>
+<p:sld xmlns:a="http://schemas.openxmlformats.org/drawingml/2006/main" xmlns:r="http://schemas.openxmlformats.org/officeDocument/2006/relationships" xmlns:p="http://schemas.openxmlformats.org/presentationml/2006/main">
+  <p:cSld>
+    <p:spTree>
+      <p:nvGrpSpPr>
+        <p:cNvPr id="1" name=""/>
+        <p:cNvGrpSpPr/>
+        <p:nvPr/>
+      </p:nvGrpSpPr>
+      <p:grpSpPr>
+        <a:xfrm>
+          <a:off x="0" y="0"/>
+          <a:ext cx="0" cy="0"/>
+          <a:chOff x="0" y="0"/>
+          <a:chExt cx="0" cy="0"/>
+        </a:xfrm>
+      </p:grpSpPr>
+      <p:sp>
+        <p:nvSpPr>
+          <p:cNvPr id="2" name="Title 1"/>
+          <p:cNvSpPr>
+            <a:spLocks noGrp="1"/>
+          </p:cNvSpPr>
+          <p:nvPr>
+            <p:ph type="title"/>
+          </p:nvPr>
+        </p:nvSpPr>
+        <p:spPr>
+          <a:xfrm>
+            <a:off x="457200" y="1981200"/>
+            <a:ext cx="8229600" cy="1143000"/>
+          </a:xfrm>
+        </p:spPr>
+        <p:txBody>
+          <a:bodyPr/>
+          <a:lstStyle/>
+          <a:p>
+            <a:r>
+              <a:rPr lang="en-US" dirty="0" smtClean="0"/>
+              <a:t>Thank You</a:t>
+            </a:r>
+            <a:endParaRPr lang="en-US" dirty="0"/>
+          </a:p>
+        </p:txBody>
+      </p:sp>
+      <p:sp>
+        <p:nvSpPr>
+          <p:cNvPr id="4" name="Subtitle 2"/>
+          <p:cNvSpPr txBox="1">
+            <a:spLocks/>
+          </p:cNvSpPr>
+          <p:nvPr/>
+        </p:nvSpPr>
+        <p:spPr>
+          <a:xfrm>
+            <a:off x="4038600" y="4191000"/>
+            <a:ext cx="4191000" cy="1752600"/>
+          </a:xfrm>
+          <a:prstGeom prst="rect">
+            <a:avLst/>
+          </a:prstGeom>
+        </p:spPr>
+        <p:txBody>
+          <a:bodyPr vert="horz" lIns="91440" tIns="45720" rIns="91440" bIns="45720" rtlCol="0">
+            <a:normAutofit fontScale="92500" lnSpcReduction="10000"/>
+          </a:bodyPr>
+          <a:lstStyle/>
+          <a:p>
+            <a:pPr marL="342900" marR="0" lvl="0" indent="-342900" algn="r" defTabSz="914400" rtl="0" eaLnBrk="1" fontAlgn="auto" latinLnBrk="0" hangingPunct="1">
+              <a:lnSpc>
+                <a:spcPct val="100000"/>
+              </a:lnSpc>
+              <a:spcBef>
+                <a:spcPct val="20000"/>
+              </a:spcBef>
+              <a:spcAft>
+                <a:spcPts val="0"/>
+              </a:spcAft>
+              <a:buClrTx/>
+              <a:buSzTx/>
+              <a:tabLst/>
+              <a:defRPr/>
+            </a:pPr>
+            <a:r>
+              <a:rPr kumimoji="0" lang="en-US" sz="2200" b="0" i="0" u="none" strike="noStrike" kern="1200" cap="none" spc="0" normalizeH="0" baseline="0" noProof="0" dirty="0" err="1" smtClean="0">
+                <a:ln>
+                  <a:noFill/>
+                </a:ln>
+                <a:solidFill>
+                  <a:schemeClr val="tx1"/>
+                </a:solidFill>
+                <a:effectLst/>
+                <a:uLnTx/>
+                <a:uFillTx/>
+                <a:latin typeface="Cambria" pitchFamily="18" charset="0"/>
+                <a:ea typeface="+mn-ea"/>
+                <a:cs typeface="+mn-cs"/>
+              </a:rPr>
+              <a:t>Rajasekaran</a:t>
+            </a:r>
+            <a:r>
+              <a:rPr kumimoji="0" lang="en-US" sz="2200" b="0" i="0" u="none" strike="noStrike" kern="1200" cap="none" spc="0" normalizeH="0" baseline="0" noProof="0" dirty="0" smtClean="0">
+                <a:ln>
+                  <a:noFill/>
+                </a:ln>
+                <a:solidFill>
+                  <a:schemeClr val="tx1"/>
+                </a:solidFill>
+                <a:effectLst/>
+                <a:uLnTx/>
+                <a:uFillTx/>
+                <a:latin typeface="Cambria" pitchFamily="18" charset="0"/>
+                <a:ea typeface="+mn-ea"/>
+                <a:cs typeface="+mn-cs"/>
+              </a:rPr>
+              <a:t> S</a:t>
+            </a:r>
+          </a:p>
+          <a:p>
+            <a:pPr marL="342900" marR="0" lvl="0" indent="-342900" algn="r" defTabSz="914400" rtl="0" eaLnBrk="1" fontAlgn="auto" latinLnBrk="0" hangingPunct="1">
+              <a:lnSpc>
+                <a:spcPct val="100000"/>
+              </a:lnSpc>
+              <a:spcBef>
+                <a:spcPct val="20000"/>
+              </a:spcBef>
+              <a:spcAft>
+                <a:spcPts val="0"/>
+              </a:spcAft>
+              <a:buClrTx/>
+              <a:buSzTx/>
+              <a:tabLst/>
+              <a:defRPr/>
+            </a:pPr>
+            <a:r>
+              <a:rPr kumimoji="0" lang="en-US" sz="1600" b="0" i="0" u="none" strike="noStrike" kern="1200" cap="none" spc="0" normalizeH="0" baseline="0" noProof="0" dirty="0" smtClean="0">
+                <a:ln>
+                  <a:noFill/>
+                </a:ln>
+                <a:solidFill>
+                  <a:schemeClr val="tx1"/>
+                </a:solidFill>
+                <a:effectLst/>
+                <a:uLnTx/>
+                <a:uFillTx/>
+                <a:latin typeface="Cambria" pitchFamily="18" charset="0"/>
+                <a:ea typeface="+mn-ea"/>
+                <a:cs typeface="+mn-cs"/>
+              </a:rPr>
+              <a:t>Assistant Professor,</a:t>
+            </a:r>
+          </a:p>
+          <a:p>
+            <a:pPr marL="342900" marR="0" lvl="0" indent="-342900" algn="r" defTabSz="914400" rtl="0" eaLnBrk="1" fontAlgn="auto" latinLnBrk="0" hangingPunct="1">
+              <a:lnSpc>
+                <a:spcPct val="100000"/>
+              </a:lnSpc>
+              <a:spcBef>
+                <a:spcPct val="20000"/>
+              </a:spcBef>
+              <a:spcAft>
+                <a:spcPts val="0"/>
+              </a:spcAft>
+              <a:buClrTx/>
+              <a:buSzTx/>
+              <a:tabLst/>
+              <a:defRPr/>
+            </a:pPr>
+            <a:r>
+              <a:rPr kumimoji="0" lang="en-US" sz="1600" b="0" i="0" u="none" strike="noStrike" kern="1200" cap="none" spc="0" normalizeH="0" baseline="0" noProof="0" dirty="0" smtClean="0">
+                <a:ln>
+                  <a:noFill/>
+                </a:ln>
+                <a:solidFill>
+                  <a:schemeClr val="tx1"/>
+                </a:solidFill>
+                <a:effectLst/>
+                <a:uLnTx/>
+                <a:uFillTx/>
+                <a:latin typeface="Cambria" pitchFamily="18" charset="0"/>
+                <a:ea typeface="+mn-ea"/>
+                <a:cs typeface="+mn-cs"/>
+              </a:rPr>
+              <a:t>Department of Information Technology,</a:t>
+            </a:r>
+          </a:p>
+          <a:p>
+            <a:pPr marL="342900" marR="0" lvl="0" indent="-342900" algn="r" defTabSz="914400" rtl="0" eaLnBrk="1" fontAlgn="auto" latinLnBrk="0" hangingPunct="1">
+              <a:lnSpc>
+                <a:spcPct val="100000"/>
+              </a:lnSpc>
+              <a:spcBef>
+                <a:spcPct val="20000"/>
+              </a:spcBef>
+              <a:spcAft>
+                <a:spcPts val="0"/>
+              </a:spcAft>
+              <a:buClrTx/>
+              <a:buSzTx/>
+              <a:tabLst/>
+              <a:defRPr/>
+            </a:pPr>
+            <a:r>
+              <a:rPr kumimoji="0" lang="en-US" sz="1600" b="0" i="0" u="none" strike="noStrike" kern="1200" cap="none" spc="0" normalizeH="0" baseline="0" noProof="0" dirty="0" err="1" smtClean="0">
+                <a:ln>
+                  <a:noFill/>
+                </a:ln>
+                <a:solidFill>
+                  <a:schemeClr val="tx1"/>
+                </a:solidFill>
+                <a:effectLst/>
+                <a:uLnTx/>
+                <a:uFillTx/>
+                <a:latin typeface="Cambria" pitchFamily="18" charset="0"/>
+                <a:ea typeface="+mn-ea"/>
+                <a:cs typeface="+mn-cs"/>
+              </a:rPr>
+              <a:t>KGiSL</a:t>
+            </a:r>
+            <a:r>
+              <a:rPr kumimoji="0" lang="en-US" sz="1600" b="0" i="0" u="none" strike="noStrike" kern="1200" cap="none" spc="0" normalizeH="0" baseline="0" noProof="0" dirty="0" smtClean="0">
+                <a:ln>
+                  <a:noFill/>
+                </a:ln>
+                <a:solidFill>
+                  <a:schemeClr val="tx1"/>
+                </a:solidFill>
+                <a:effectLst/>
+                <a:uLnTx/>
+                <a:uFillTx/>
+                <a:latin typeface="Cambria" pitchFamily="18" charset="0"/>
+                <a:ea typeface="+mn-ea"/>
+                <a:cs typeface="+mn-cs"/>
+              </a:rPr>
+              <a:t> Institute of Technology,</a:t>
+            </a:r>
+          </a:p>
+          <a:p>
+            <a:pPr marL="342900" marR="0" lvl="0" indent="-342900" algn="r" defTabSz="914400" rtl="0" eaLnBrk="1" fontAlgn="auto" latinLnBrk="0" hangingPunct="1">
+              <a:lnSpc>
+                <a:spcPct val="100000"/>
+              </a:lnSpc>
+              <a:spcBef>
+                <a:spcPct val="20000"/>
+              </a:spcBef>
+              <a:spcAft>
+                <a:spcPts val="0"/>
+              </a:spcAft>
+              <a:buClrTx/>
+              <a:buSzTx/>
+              <a:tabLst/>
+              <a:defRPr/>
+            </a:pPr>
+            <a:r>
+              <a:rPr kumimoji="0" lang="en-US" sz="1600" b="0" i="0" u="none" strike="noStrike" kern="1200" cap="none" spc="0" normalizeH="0" baseline="0" noProof="0" dirty="0" smtClean="0">
+                <a:ln>
+                  <a:noFill/>
+                </a:ln>
+                <a:solidFill>
+                  <a:schemeClr val="tx1"/>
+                </a:solidFill>
+                <a:effectLst/>
+                <a:uLnTx/>
+                <a:uFillTx/>
+                <a:latin typeface="Cambria" pitchFamily="18" charset="0"/>
+                <a:ea typeface="+mn-ea"/>
+                <a:cs typeface="+mn-cs"/>
+              </a:rPr>
+              <a:t>email: </a:t>
+            </a:r>
+            <a:r>
+              <a:rPr kumimoji="0" lang="en-US" sz="1600" b="0" i="0" u="none" strike="noStrike" kern="1200" cap="none" spc="0" normalizeH="0" baseline="0" noProof="0" dirty="0" smtClean="0">
+                <a:ln>
+                  <a:noFill/>
+                </a:ln>
+                <a:solidFill>
+                  <a:schemeClr val="tx1"/>
+                </a:solidFill>
+                <a:effectLst/>
+                <a:uLnTx/>
+                <a:uFillTx/>
+                <a:latin typeface="Cambria" pitchFamily="18" charset="0"/>
+                <a:ea typeface="+mn-ea"/>
+                <a:cs typeface="+mn-cs"/>
+                <a:hlinkClick r:id="rId2"/>
+              </a:rPr>
+              <a:t>proffraja@gmail.com</a:t>
+            </a:r>
+            <a:endParaRPr lang="en-US" sz="1600" dirty="0" smtClean="0">
+              <a:latin typeface="Cambria" pitchFamily="18" charset="0"/>
+            </a:endParaRPr>
+          </a:p>
+          <a:p>
+            <a:pPr marL="342900" marR="0" lvl="0" indent="-342900" algn="r" defTabSz="914400" rtl="0" eaLnBrk="1" fontAlgn="auto" latinLnBrk="0" hangingPunct="1">
+              <a:lnSpc>
+                <a:spcPct val="100000"/>
+              </a:lnSpc>
+              <a:spcBef>
+                <a:spcPct val="20000"/>
+              </a:spcBef>
+              <a:spcAft>
+                <a:spcPts val="0"/>
+              </a:spcAft>
+              <a:buClrTx/>
+              <a:buSzTx/>
+              <a:tabLst/>
+              <a:defRPr/>
+            </a:pPr>
+            <a:r>
+              <a:rPr lang="en-US" sz="1600" dirty="0" err="1" smtClean="0">
+                <a:latin typeface="Cambria" pitchFamily="18" charset="0"/>
+              </a:rPr>
+              <a:t>Github:</a:t>
+            </a:r>
+            <a:r>
+              <a:rPr lang="en-US" sz="1600" dirty="0" err="1" smtClean="0">
+                <a:latin typeface="Cambria" pitchFamily="18" charset="0"/>
+                <a:hlinkClick r:id="rId3"/>
+              </a:rPr>
+              <a:t>www.github.com</a:t>
+            </a:r>
+            <a:r>
+              <a:rPr lang="en-US" sz="1600" dirty="0" smtClean="0">
+                <a:latin typeface="Cambria" pitchFamily="18" charset="0"/>
+                <a:hlinkClick r:id="rId3"/>
+              </a:rPr>
+              <a:t>/</a:t>
+            </a:r>
+            <a:r>
+              <a:rPr lang="en-US" sz="1600" dirty="0" err="1" smtClean="0">
+                <a:latin typeface="Cambria" pitchFamily="18" charset="0"/>
+                <a:hlinkClick r:id="rId3"/>
+              </a:rPr>
+              <a:t>rajasekaranap</a:t>
+            </a:r>
+            <a:endParaRPr lang="en-US" sz="1600" dirty="0" smtClean="0">
+              <a:latin typeface="Cambria" pitchFamily="18" charset="0"/>
+            </a:endParaRPr>
+          </a:p>
+          <a:p>
+            <a:pPr marL="342900" marR="0" lvl="0" indent="-342900" algn="r" defTabSz="914400" rtl="0" eaLnBrk="1" fontAlgn="auto" latinLnBrk="0" hangingPunct="1">
+              <a:lnSpc>
+                <a:spcPct val="100000"/>
+              </a:lnSpc>
+              <a:spcBef>
+                <a:spcPct val="20000"/>
+              </a:spcBef>
+              <a:spcAft>
+                <a:spcPts val="0"/>
+              </a:spcAft>
+              <a:buClrTx/>
+              <a:buSzTx/>
+              <a:tabLst/>
+              <a:defRPr/>
+            </a:pPr>
+            <a:endParaRPr lang="en-US" sz="1600" dirty="0" smtClean="0">
+              <a:latin typeface="Cambria" pitchFamily="18" charset="0"/>
+            </a:endParaRPr>
+          </a:p>
+        </p:txBody>
+      </p:sp>
+    </p:spTree>
+  </p:cSld>
+  <p:clrMapOvr>
+    <a:masterClrMapping/>
+  </p:clrMapOvr>
+  <p:timing>
+    <p:tnLst>
+      <p:par>
+        <p:cTn id="1" dur="indefinite" restart="never" nodeType="tmRoot"/>
+      </p:par>
+    </p:tnLst>
+  </p:timing>
+</p:sld>
+</file>
+
 <file path=ppt/slides/slide4.xml><?xml version="1.0" encoding="utf-8"?>
 <p:sld xmlns:a="http://schemas.openxmlformats.org/drawingml/2006/main" xmlns:r="http://schemas.openxmlformats.org/officeDocument/2006/relationships" xmlns:p="http://schemas.openxmlformats.org/presentationml/2006/main">
   <p:cSld>
@@ -5776,11 +8511,7 @@
             </a:r>
             <a:r>
               <a:rPr lang="en-IN" dirty="0" smtClean="0"/>
-              <a:t> </a:t>
-            </a:r>
-            <a:r>
-              <a:rPr lang="en-IN" dirty="0" smtClean="0"/>
-              <a:t>like </a:t>
+              <a:t> like </a:t>
             </a:r>
             <a:r>
               <a:rPr lang="en-IN" dirty="0" err="1" smtClean="0"/>
@@ -5796,11 +8527,7 @@
             </a:r>
             <a:r>
               <a:rPr lang="en-IN" dirty="0" smtClean="0"/>
-              <a:t> </a:t>
-            </a:r>
-            <a:r>
-              <a:rPr lang="en-IN" dirty="0" smtClean="0"/>
-              <a:t>and </a:t>
+              <a:t> and </a:t>
             </a:r>
             <a:r>
               <a:rPr lang="en-IN" dirty="0" err="1" smtClean="0"/>
@@ -6093,13 +8820,7 @@
               <a:rPr lang="en-IN" dirty="0" smtClean="0">
                 <a:sym typeface="Wingdings" pitchFamily="2" charset="2"/>
               </a:rPr>
-              <a:t> + </a:t>
-            </a:r>
-            <a:r>
-              <a:rPr lang="en-IN" dirty="0" smtClean="0">
-                <a:sym typeface="Wingdings" pitchFamily="2" charset="2"/>
-              </a:rPr>
-              <a:t>h</a:t>
+              <a:t> + h</a:t>
             </a:r>
             <a:r>
               <a:rPr lang="el-GR" dirty="0" smtClean="0">
@@ -6210,15 +8931,7 @@
             <a:pPr algn="just"/>
             <a:r>
               <a:rPr lang="en-IN" dirty="0" smtClean="0"/>
-              <a:t>The equilibrium is disturbed by chlorine, bromine ... </a:t>
-            </a:r>
-            <a:r>
-              <a:rPr lang="en-IN" dirty="0" smtClean="0"/>
-              <a:t>e</a:t>
-            </a:r>
-            <a:r>
-              <a:rPr lang="en-IN" dirty="0" smtClean="0"/>
-              <a:t>tc.</a:t>
+              <a:t>The equilibrium is disturbed by chlorine, bromine ... etc.</a:t>
             </a:r>
           </a:p>
           <a:p>
@@ -6443,7 +9156,6 @@
               <a:rPr lang="en-IN" dirty="0" smtClean="0"/>
               <a:t>Banned in many countries.</a:t>
             </a:r>
-            <a:endParaRPr lang="en-IN" dirty="0" smtClean="0"/>
           </a:p>
           <a:p>
             <a:pPr lvl="1"/>

</xml_diff>

<commit_message>
Last Update 07-02-2019  8:54:02.96
</commit_message>
<xml_diff>
--- a/Slides/GE8291-U2.pptx
+++ b/Slides/GE8291-U2.pptx
@@ -5,7 +5,7 @@
     <p:sldMasterId id="2147483648" r:id="rId1"/>
   </p:sldMasterIdLst>
   <p:notesMasterIdLst>
-    <p:notesMasterId r:id="rId36"/>
+    <p:notesMasterId r:id="rId46"/>
   </p:notesMasterIdLst>
   <p:sldIdLst>
     <p:sldId id="256" r:id="rId2"/>
@@ -41,7 +41,17 @@
     <p:sldId id="304" r:id="rId32"/>
     <p:sldId id="305" r:id="rId33"/>
     <p:sldId id="306" r:id="rId34"/>
-    <p:sldId id="272" r:id="rId35"/>
+    <p:sldId id="307" r:id="rId35"/>
+    <p:sldId id="310" r:id="rId36"/>
+    <p:sldId id="308" r:id="rId37"/>
+    <p:sldId id="309" r:id="rId38"/>
+    <p:sldId id="311" r:id="rId39"/>
+    <p:sldId id="312" r:id="rId40"/>
+    <p:sldId id="313" r:id="rId41"/>
+    <p:sldId id="314" r:id="rId42"/>
+    <p:sldId id="315" r:id="rId43"/>
+    <p:sldId id="316" r:id="rId44"/>
+    <p:sldId id="272" r:id="rId45"/>
   </p:sldIdLst>
   <p:sldSz cx="9144000" cy="6858000" type="screen4x3"/>
   <p:notesSz cx="6858000" cy="9144000"/>
@@ -242,7 +252,7 @@
             <a:fld id="{9515075B-F3F0-4441-A1BD-B7B515B708FF}" type="datetimeFigureOut">
               <a:rPr lang="en-US" smtClean="0"/>
               <a:pPr/>
-              <a:t>2/4/2019</a:t>
+              <a:t>2/6/2019</a:t>
             </a:fld>
             <a:endParaRPr lang="en-US"/>
           </a:p>
@@ -714,7 +724,7 @@
             <a:fld id="{6E658DF8-B8C0-4C7F-85EB-B53A2DDD44A9}" type="datetimeFigureOut">
               <a:rPr lang="en-US" smtClean="0"/>
               <a:pPr/>
-              <a:t>2/4/2019</a:t>
+              <a:t>2/6/2019</a:t>
             </a:fld>
             <a:endParaRPr lang="en-US"/>
           </a:p>
@@ -881,7 +891,7 @@
             <a:fld id="{6E658DF8-B8C0-4C7F-85EB-B53A2DDD44A9}" type="datetimeFigureOut">
               <a:rPr lang="en-US" smtClean="0"/>
               <a:pPr/>
-              <a:t>2/4/2019</a:t>
+              <a:t>2/6/2019</a:t>
             </a:fld>
             <a:endParaRPr lang="en-US"/>
           </a:p>
@@ -1058,7 +1068,7 @@
             <a:fld id="{6E658DF8-B8C0-4C7F-85EB-B53A2DDD44A9}" type="datetimeFigureOut">
               <a:rPr lang="en-US" smtClean="0"/>
               <a:pPr/>
-              <a:t>2/4/2019</a:t>
+              <a:t>2/6/2019</a:t>
             </a:fld>
             <a:endParaRPr lang="en-US"/>
           </a:p>
@@ -1257,7 +1267,7 @@
             <a:fld id="{6E658DF8-B8C0-4C7F-85EB-B53A2DDD44A9}" type="datetimeFigureOut">
               <a:rPr lang="en-US" smtClean="0"/>
               <a:pPr/>
-              <a:t>2/4/2019</a:t>
+              <a:t>2/6/2019</a:t>
             </a:fld>
             <a:endParaRPr lang="en-US"/>
           </a:p>
@@ -1500,7 +1510,7 @@
             <a:fld id="{6E658DF8-B8C0-4C7F-85EB-B53A2DDD44A9}" type="datetimeFigureOut">
               <a:rPr lang="en-US" smtClean="0"/>
               <a:pPr/>
-              <a:t>2/4/2019</a:t>
+              <a:t>2/6/2019</a:t>
             </a:fld>
             <a:endParaRPr lang="en-US"/>
           </a:p>
@@ -1785,7 +1795,7 @@
             <a:fld id="{6E658DF8-B8C0-4C7F-85EB-B53A2DDD44A9}" type="datetimeFigureOut">
               <a:rPr lang="en-US" smtClean="0"/>
               <a:pPr/>
-              <a:t>2/4/2019</a:t>
+              <a:t>2/6/2019</a:t>
             </a:fld>
             <a:endParaRPr lang="en-US"/>
           </a:p>
@@ -2204,7 +2214,7 @@
             <a:fld id="{6E658DF8-B8C0-4C7F-85EB-B53A2DDD44A9}" type="datetimeFigureOut">
               <a:rPr lang="en-US" smtClean="0"/>
               <a:pPr/>
-              <a:t>2/4/2019</a:t>
+              <a:t>2/6/2019</a:t>
             </a:fld>
             <a:endParaRPr lang="en-US"/>
           </a:p>
@@ -2319,7 +2329,7 @@
             <a:fld id="{6E658DF8-B8C0-4C7F-85EB-B53A2DDD44A9}" type="datetimeFigureOut">
               <a:rPr lang="en-US" smtClean="0"/>
               <a:pPr/>
-              <a:t>2/4/2019</a:t>
+              <a:t>2/6/2019</a:t>
             </a:fld>
             <a:endParaRPr lang="en-US"/>
           </a:p>
@@ -2411,7 +2421,7 @@
             <a:fld id="{6E658DF8-B8C0-4C7F-85EB-B53A2DDD44A9}" type="datetimeFigureOut">
               <a:rPr lang="en-US" smtClean="0"/>
               <a:pPr/>
-              <a:t>2/4/2019</a:t>
+              <a:t>2/6/2019</a:t>
             </a:fld>
             <a:endParaRPr lang="en-US"/>
           </a:p>
@@ -2685,7 +2695,7 @@
             <a:fld id="{6E658DF8-B8C0-4C7F-85EB-B53A2DDD44A9}" type="datetimeFigureOut">
               <a:rPr lang="en-US" smtClean="0"/>
               <a:pPr/>
-              <a:t>2/4/2019</a:t>
+              <a:t>2/6/2019</a:t>
             </a:fld>
             <a:endParaRPr lang="en-US"/>
           </a:p>
@@ -2939,7 +2949,7 @@
             <a:fld id="{6E658DF8-B8C0-4C7F-85EB-B53A2DDD44A9}" type="datetimeFigureOut">
               <a:rPr lang="en-US" smtClean="0"/>
               <a:pPr/>
-              <a:t>2/4/2019</a:t>
+              <a:t>2/6/2019</a:t>
             </a:fld>
             <a:endParaRPr lang="en-US"/>
           </a:p>
@@ -3161,7 +3171,7 @@
             <a:fld id="{6E658DF8-B8C0-4C7F-85EB-B53A2DDD44A9}" type="datetimeFigureOut">
               <a:rPr lang="en-US" smtClean="0"/>
               <a:pPr/>
-              <a:t>2/4/2019</a:t>
+              <a:t>2/6/2019</a:t>
             </a:fld>
             <a:endParaRPr lang="en-US"/>
           </a:p>
@@ -5963,8 +5973,8 @@
           </a:p>
         </p:txBody>
       </p:sp>
-      <mc:AlternateContent xmlns:mc="http://schemas.openxmlformats.org/markup-compatibility/2006">
-        <mc:Choice xmlns:a14="http://schemas.microsoft.com/office/drawing/2010/main" Requires="a14">
+      <mc:AlternateContent xmlns:mc="http://schemas.openxmlformats.org/markup-compatibility/2006" xmlns:a14="http://schemas.microsoft.com/office/drawing/2010/main">
+        <mc:Choice Requires="a14">
           <p:sp>
             <p:nvSpPr>
               <p:cNvPr id="3" name="Content Placeholder 2"/>
@@ -6309,13 +6319,7 @@
                           <a:rPr lang="en-IN" b="0" i="1" smtClean="0">
                             <a:latin typeface="Cambria Math" panose="02040503050406030204" pitchFamily="18" charset="0"/>
                           </a:rPr>
-                          <m:t>𝐻𝑁</m:t>
-                        </m:r>
-                        <m:r>
-                          <a:rPr lang="en-IN" i="1">
-                            <a:latin typeface="Cambria Math" panose="02040503050406030204" pitchFamily="18" charset="0"/>
-                          </a:rPr>
-                          <m:t>𝑂</m:t>
+                          <m:t>𝐻𝑁𝑂</m:t>
                         </m:r>
                       </m:e>
                       <m:sub>
@@ -6369,7 +6373,7 @@
             </p:txBody>
           </p:sp>
         </mc:Choice>
-        <mc:Fallback>
+        <mc:Fallback xmlns="">
           <p:sp>
             <p:nvSpPr>
               <p:cNvPr id="3" name="Content Placeholder 2"/>
@@ -6464,8 +6468,8 @@
           </a:p>
         </p:txBody>
       </p:sp>
-      <mc:AlternateContent xmlns:mc="http://schemas.openxmlformats.org/markup-compatibility/2006">
-        <mc:Choice xmlns:a14="http://schemas.microsoft.com/office/drawing/2010/main" Requires="a14">
+      <mc:AlternateContent xmlns:mc="http://schemas.openxmlformats.org/markup-compatibility/2006" xmlns:a14="http://schemas.microsoft.com/office/drawing/2010/main">
+        <mc:Choice Requires="a14">
           <p:sp>
             <p:nvSpPr>
               <p:cNvPr id="3" name="Content Placeholder 2"/>
@@ -6572,7 +6576,7 @@
             </p:txBody>
           </p:sp>
         </mc:Choice>
-        <mc:Fallback>
+        <mc:Fallback xmlns="">
           <p:sp>
             <p:nvSpPr>
               <p:cNvPr id="3" name="Content Placeholder 2"/>
@@ -6793,8 +6797,8 @@
           </a:p>
         </p:txBody>
       </p:sp>
-      <mc:AlternateContent xmlns:mc="http://schemas.openxmlformats.org/markup-compatibility/2006">
-        <mc:Choice xmlns:a14="http://schemas.microsoft.com/office/drawing/2010/main" Requires="a14">
+      <mc:AlternateContent xmlns:mc="http://schemas.openxmlformats.org/markup-compatibility/2006" xmlns:a14="http://schemas.microsoft.com/office/drawing/2010/main">
+        <mc:Choice Requires="a14">
           <p:sp>
             <p:nvSpPr>
               <p:cNvPr id="3" name="Content Placeholder 2"/>
@@ -7035,7 +7039,7 @@
             </p:txBody>
           </p:sp>
         </mc:Choice>
-        <mc:Fallback>
+        <mc:Fallback xmlns="">
           <p:sp>
             <p:nvSpPr>
               <p:cNvPr id="3" name="Content Placeholder 2"/>
@@ -8071,352 +8075,744 @@
             <p:ph type="title"/>
           </p:nvPr>
         </p:nvSpPr>
-        <p:spPr>
-          <a:xfrm>
-            <a:off x="457200" y="1981200"/>
-            <a:ext cx="8229600" cy="1143000"/>
-          </a:xfrm>
-        </p:spPr>
+        <p:spPr/>
         <p:txBody>
           <a:bodyPr/>
           <a:lstStyle/>
           <a:p>
             <a:r>
-              <a:rPr lang="en-US" dirty="0" smtClean="0"/>
-              <a:t>Thank You</a:t>
-            </a:r>
-            <a:endParaRPr lang="en-US" dirty="0"/>
-          </a:p>
-        </p:txBody>
-      </p:sp>
-      <p:sp>
-        <p:nvSpPr>
-          <p:cNvPr id="4" name="Subtitle 2"/>
-          <p:cNvSpPr txBox="1">
-            <a:spLocks/>
-          </p:cNvSpPr>
-          <p:nvPr/>
-        </p:nvSpPr>
-        <p:spPr>
-          <a:xfrm>
-            <a:off x="4038600" y="4191000"/>
-            <a:ext cx="4191000" cy="1752600"/>
-          </a:xfrm>
-          <a:prstGeom prst="rect">
-            <a:avLst/>
-          </a:prstGeom>
-        </p:spPr>
-        <p:txBody>
-          <a:bodyPr vert="horz" lIns="91440" tIns="45720" rIns="91440" bIns="45720" rtlCol="0">
-            <a:normAutofit fontScale="92500" lnSpcReduction="10000"/>
+              <a:rPr lang="en-IN" dirty="0" smtClean="0"/>
+              <a:t>Water Quality Parameters</a:t>
+            </a:r>
+            <a:endParaRPr lang="en-IN" dirty="0"/>
+          </a:p>
+        </p:txBody>
+      </p:sp>
+      <p:sp>
+        <p:nvSpPr>
+          <p:cNvPr id="3" name="Content Placeholder 2"/>
+          <p:cNvSpPr>
+            <a:spLocks noGrp="1"/>
+          </p:cNvSpPr>
+          <p:nvPr>
+            <p:ph idx="1"/>
+          </p:nvPr>
+        </p:nvSpPr>
+        <p:spPr/>
+        <p:txBody>
+          <a:bodyPr>
+            <a:normAutofit/>
           </a:bodyPr>
           <a:lstStyle/>
           <a:p>
-            <a:pPr marL="342900" marR="0" lvl="0" indent="-342900" algn="r" defTabSz="914400" rtl="0" eaLnBrk="1" fontAlgn="auto" latinLnBrk="0" hangingPunct="1">
-              <a:lnSpc>
-                <a:spcPct val="100000"/>
-              </a:lnSpc>
-              <a:spcBef>
-                <a:spcPct val="20000"/>
-              </a:spcBef>
-              <a:spcAft>
-                <a:spcPts val="0"/>
-              </a:spcAft>
-              <a:buClrTx/>
-              <a:buSzTx/>
-              <a:tabLst/>
-              <a:defRPr/>
-            </a:pPr>
-            <a:r>
-              <a:rPr kumimoji="0" lang="en-US" sz="2200" b="0" i="0" u="none" strike="noStrike" kern="1200" cap="none" spc="0" normalizeH="0" baseline="0" noProof="0" dirty="0" err="1" smtClean="0">
-                <a:ln>
-                  <a:noFill/>
-                </a:ln>
-                <a:solidFill>
-                  <a:schemeClr val="tx1"/>
-                </a:solidFill>
-                <a:effectLst/>
-                <a:uLnTx/>
-                <a:uFillTx/>
-                <a:latin typeface="Cambria" pitchFamily="18" charset="0"/>
-                <a:ea typeface="+mn-ea"/>
-                <a:cs typeface="+mn-cs"/>
-              </a:rPr>
-              <a:t>Rajasekaran</a:t>
-            </a:r>
-            <a:r>
-              <a:rPr kumimoji="0" lang="en-US" sz="2200" b="0" i="0" u="none" strike="noStrike" kern="1200" cap="none" spc="0" normalizeH="0" baseline="0" noProof="0" dirty="0" smtClean="0">
-                <a:ln>
-                  <a:noFill/>
-                </a:ln>
-                <a:solidFill>
-                  <a:schemeClr val="tx1"/>
-                </a:solidFill>
-                <a:effectLst/>
-                <a:uLnTx/>
-                <a:uFillTx/>
-                <a:latin typeface="Cambria" pitchFamily="18" charset="0"/>
-                <a:ea typeface="+mn-ea"/>
-                <a:cs typeface="+mn-cs"/>
-              </a:rPr>
-              <a:t> S</a:t>
-            </a:r>
-          </a:p>
-          <a:p>
-            <a:pPr marL="342900" marR="0" lvl="0" indent="-342900" algn="r" defTabSz="914400" rtl="0" eaLnBrk="1" fontAlgn="auto" latinLnBrk="0" hangingPunct="1">
-              <a:lnSpc>
-                <a:spcPct val="100000"/>
-              </a:lnSpc>
-              <a:spcBef>
-                <a:spcPct val="20000"/>
-              </a:spcBef>
-              <a:spcAft>
-                <a:spcPts val="0"/>
-              </a:spcAft>
-              <a:buClrTx/>
-              <a:buSzTx/>
-              <a:tabLst/>
-              <a:defRPr/>
-            </a:pPr>
-            <a:r>
-              <a:rPr kumimoji="0" lang="en-US" sz="1600" b="0" i="0" u="none" strike="noStrike" kern="1200" cap="none" spc="0" normalizeH="0" baseline="0" noProof="0" dirty="0" smtClean="0">
-                <a:ln>
-                  <a:noFill/>
-                </a:ln>
-                <a:solidFill>
-                  <a:schemeClr val="tx1"/>
-                </a:solidFill>
-                <a:effectLst/>
-                <a:uLnTx/>
-                <a:uFillTx/>
-                <a:latin typeface="Cambria" pitchFamily="18" charset="0"/>
-                <a:ea typeface="+mn-ea"/>
-                <a:cs typeface="+mn-cs"/>
-              </a:rPr>
-              <a:t>Assistant Professor,</a:t>
-            </a:r>
-          </a:p>
-          <a:p>
-            <a:pPr marL="342900" marR="0" lvl="0" indent="-342900" algn="r" defTabSz="914400" rtl="0" eaLnBrk="1" fontAlgn="auto" latinLnBrk="0" hangingPunct="1">
-              <a:lnSpc>
-                <a:spcPct val="100000"/>
-              </a:lnSpc>
-              <a:spcBef>
-                <a:spcPct val="20000"/>
-              </a:spcBef>
-              <a:spcAft>
-                <a:spcPts val="0"/>
-              </a:spcAft>
-              <a:buClrTx/>
-              <a:buSzTx/>
-              <a:tabLst/>
-              <a:defRPr/>
-            </a:pPr>
-            <a:r>
-              <a:rPr kumimoji="0" lang="en-US" sz="1600" b="0" i="0" u="none" strike="noStrike" kern="1200" cap="none" spc="0" normalizeH="0" baseline="0" noProof="0" dirty="0" smtClean="0">
-                <a:ln>
-                  <a:noFill/>
-                </a:ln>
-                <a:solidFill>
-                  <a:schemeClr val="tx1"/>
-                </a:solidFill>
-                <a:effectLst/>
-                <a:uLnTx/>
-                <a:uFillTx/>
-                <a:latin typeface="Cambria" pitchFamily="18" charset="0"/>
-                <a:ea typeface="+mn-ea"/>
-                <a:cs typeface="+mn-cs"/>
-              </a:rPr>
-              <a:t>Department of Information Technology,</a:t>
-            </a:r>
-          </a:p>
-          <a:p>
-            <a:pPr marL="342900" marR="0" lvl="0" indent="-342900" algn="r" defTabSz="914400" rtl="0" eaLnBrk="1" fontAlgn="auto" latinLnBrk="0" hangingPunct="1">
-              <a:lnSpc>
-                <a:spcPct val="100000"/>
-              </a:lnSpc>
-              <a:spcBef>
-                <a:spcPct val="20000"/>
-              </a:spcBef>
-              <a:spcAft>
-                <a:spcPts val="0"/>
-              </a:spcAft>
-              <a:buClrTx/>
-              <a:buSzTx/>
-              <a:tabLst/>
-              <a:defRPr/>
-            </a:pPr>
-            <a:r>
-              <a:rPr kumimoji="0" lang="en-US" sz="1600" b="0" i="0" u="none" strike="noStrike" kern="1200" cap="none" spc="0" normalizeH="0" baseline="0" noProof="0" dirty="0" err="1" smtClean="0">
-                <a:ln>
-                  <a:noFill/>
-                </a:ln>
-                <a:solidFill>
-                  <a:schemeClr val="tx1"/>
-                </a:solidFill>
-                <a:effectLst/>
-                <a:uLnTx/>
-                <a:uFillTx/>
-                <a:latin typeface="Cambria" pitchFamily="18" charset="0"/>
-                <a:ea typeface="+mn-ea"/>
-                <a:cs typeface="+mn-cs"/>
-              </a:rPr>
-              <a:t>KGiSL</a:t>
-            </a:r>
-            <a:r>
-              <a:rPr kumimoji="0" lang="en-US" sz="1600" b="0" i="0" u="none" strike="noStrike" kern="1200" cap="none" spc="0" normalizeH="0" baseline="0" noProof="0" dirty="0" smtClean="0">
-                <a:ln>
-                  <a:noFill/>
-                </a:ln>
-                <a:solidFill>
-                  <a:schemeClr val="tx1"/>
-                </a:solidFill>
-                <a:effectLst/>
-                <a:uLnTx/>
-                <a:uFillTx/>
-                <a:latin typeface="Cambria" pitchFamily="18" charset="0"/>
-                <a:ea typeface="+mn-ea"/>
-                <a:cs typeface="+mn-cs"/>
-              </a:rPr>
-              <a:t> Institute of Technology,</a:t>
-            </a:r>
-          </a:p>
-          <a:p>
-            <a:pPr marL="342900" marR="0" lvl="0" indent="-342900" algn="r" defTabSz="914400" rtl="0" eaLnBrk="1" fontAlgn="auto" latinLnBrk="0" hangingPunct="1">
-              <a:lnSpc>
-                <a:spcPct val="100000"/>
-              </a:lnSpc>
-              <a:spcBef>
-                <a:spcPct val="20000"/>
-              </a:spcBef>
-              <a:spcAft>
-                <a:spcPts val="0"/>
-              </a:spcAft>
-              <a:buClrTx/>
-              <a:buSzTx/>
-              <a:tabLst/>
-              <a:defRPr/>
-            </a:pPr>
-            <a:r>
-              <a:rPr kumimoji="0" lang="en-US" sz="1600" b="0" i="0" u="none" strike="noStrike" kern="1200" cap="none" spc="0" normalizeH="0" baseline="0" noProof="0" dirty="0" smtClean="0">
-                <a:ln>
-                  <a:noFill/>
-                </a:ln>
-                <a:solidFill>
-                  <a:schemeClr val="tx1"/>
-                </a:solidFill>
-                <a:effectLst/>
-                <a:uLnTx/>
-                <a:uFillTx/>
-                <a:latin typeface="Cambria" pitchFamily="18" charset="0"/>
-                <a:ea typeface="+mn-ea"/>
-                <a:cs typeface="+mn-cs"/>
-              </a:rPr>
-              <a:t>email: </a:t>
-            </a:r>
-            <a:r>
-              <a:rPr kumimoji="0" lang="en-US" sz="1600" b="0" i="0" u="none" strike="noStrike" kern="1200" cap="none" spc="0" normalizeH="0" baseline="0" noProof="0" dirty="0" smtClean="0">
-                <a:ln>
-                  <a:noFill/>
-                </a:ln>
-                <a:solidFill>
-                  <a:schemeClr val="tx1"/>
-                </a:solidFill>
-                <a:effectLst/>
-                <a:uLnTx/>
-                <a:uFillTx/>
-                <a:latin typeface="Cambria" pitchFamily="18" charset="0"/>
-                <a:ea typeface="+mn-ea"/>
-                <a:cs typeface="+mn-cs"/>
-                <a:hlinkClick r:id="rId2"/>
-              </a:rPr>
-              <a:t>proffraja@gmail.com</a:t>
-            </a:r>
-            <a:endParaRPr lang="en-US" sz="1600" dirty="0" smtClean="0">
-              <a:latin typeface="Cambria" pitchFamily="18" charset="0"/>
-            </a:endParaRPr>
-          </a:p>
-          <a:p>
-            <a:pPr marL="342900" marR="0" lvl="0" indent="-342900" algn="r" defTabSz="914400" rtl="0" eaLnBrk="1" fontAlgn="auto" latinLnBrk="0" hangingPunct="1">
-              <a:lnSpc>
-                <a:spcPct val="100000"/>
-              </a:lnSpc>
-              <a:spcBef>
-                <a:spcPct val="20000"/>
-              </a:spcBef>
-              <a:spcAft>
-                <a:spcPts val="0"/>
-              </a:spcAft>
-              <a:buClrTx/>
-              <a:buSzTx/>
-              <a:tabLst/>
-              <a:defRPr/>
-            </a:pPr>
-            <a:r>
-              <a:rPr lang="en-US" sz="1600" dirty="0" err="1" smtClean="0">
-                <a:latin typeface="Cambria" pitchFamily="18" charset="0"/>
-              </a:rPr>
-              <a:t>Github:</a:t>
-            </a:r>
-            <a:r>
-              <a:rPr lang="en-US" sz="1600" dirty="0" err="1" smtClean="0">
-                <a:latin typeface="Cambria" pitchFamily="18" charset="0"/>
-                <a:hlinkClick r:id="rId3"/>
-              </a:rPr>
-              <a:t>www.github.com</a:t>
-            </a:r>
-            <a:r>
-              <a:rPr lang="en-US" sz="1600" dirty="0" smtClean="0">
-                <a:latin typeface="Cambria" pitchFamily="18" charset="0"/>
-                <a:hlinkClick r:id="rId3"/>
-              </a:rPr>
-              <a:t>/</a:t>
-            </a:r>
-            <a:r>
-              <a:rPr lang="en-US" sz="1600" dirty="0" err="1" smtClean="0">
-                <a:latin typeface="Cambria" pitchFamily="18" charset="0"/>
-                <a:hlinkClick r:id="rId3"/>
-              </a:rPr>
-              <a:t>rajasekaranap</a:t>
-            </a:r>
-            <a:endParaRPr lang="en-US" sz="1600" dirty="0" smtClean="0">
-              <a:latin typeface="Cambria" pitchFamily="18" charset="0"/>
-            </a:endParaRPr>
-          </a:p>
-          <a:p>
-            <a:pPr marL="342900" marR="0" lvl="0" indent="-342900" algn="r" defTabSz="914400" rtl="0" eaLnBrk="1" fontAlgn="auto" latinLnBrk="0" hangingPunct="1">
-              <a:lnSpc>
-                <a:spcPct val="100000"/>
-              </a:lnSpc>
-              <a:spcBef>
-                <a:spcPct val="20000"/>
-              </a:spcBef>
-              <a:spcAft>
-                <a:spcPts val="0"/>
-              </a:spcAft>
-              <a:buClrTx/>
-              <a:buSzTx/>
-              <a:tabLst/>
-              <a:defRPr/>
-            </a:pPr>
-            <a:endParaRPr lang="en-US" sz="1600" dirty="0" smtClean="0">
-              <a:latin typeface="Cambria" pitchFamily="18" charset="0"/>
-            </a:endParaRPr>
+            <a:r>
+              <a:rPr lang="en-IN" dirty="0" smtClean="0"/>
+              <a:t>Physical Properties</a:t>
+            </a:r>
+          </a:p>
+          <a:p>
+            <a:pPr lvl="1"/>
+            <a:r>
+              <a:rPr lang="en-IN" dirty="0" smtClean="0"/>
+              <a:t>Colour</a:t>
+            </a:r>
+          </a:p>
+          <a:p>
+            <a:pPr lvl="1"/>
+            <a:r>
+              <a:rPr lang="en-IN" dirty="0" smtClean="0"/>
+              <a:t>Taste and Odour</a:t>
+            </a:r>
+          </a:p>
+          <a:p>
+            <a:pPr lvl="1"/>
+            <a:r>
+              <a:rPr lang="en-IN" dirty="0" smtClean="0"/>
+              <a:t>Turbidity</a:t>
+            </a:r>
+          </a:p>
+          <a:p>
+            <a:pPr lvl="1"/>
+            <a:r>
+              <a:rPr lang="en-IN" dirty="0" smtClean="0"/>
+              <a:t>Temperature</a:t>
+            </a:r>
+          </a:p>
+          <a:p>
+            <a:pPr lvl="1"/>
+            <a:endParaRPr lang="en-IN" dirty="0"/>
           </a:p>
         </p:txBody>
       </p:sp>
     </p:spTree>
+    <p:extLst>
+      <p:ext uri="{BB962C8B-B14F-4D97-AF65-F5344CB8AC3E}">
+        <p14:creationId xmlns:p14="http://schemas.microsoft.com/office/powerpoint/2010/main" val="939797543"/>
+      </p:ext>
+    </p:extLst>
   </p:cSld>
   <p:clrMapOvr>
     <a:masterClrMapping/>
   </p:clrMapOvr>
-  <p:timing>
-    <p:tnLst>
-      <p:par>
-        <p:cTn id="1" dur="indefinite" restart="never" nodeType="tmRoot"/>
-      </p:par>
-    </p:tnLst>
-  </p:timing>
+</p:sld>
+</file>
+
+<file path=ppt/slides/slide35.xml><?xml version="1.0" encoding="utf-8"?>
+<p:sld xmlns:a="http://schemas.openxmlformats.org/drawingml/2006/main" xmlns:r="http://schemas.openxmlformats.org/officeDocument/2006/relationships" xmlns:p="http://schemas.openxmlformats.org/presentationml/2006/main">
+  <p:cSld>
+    <p:spTree>
+      <p:nvGrpSpPr>
+        <p:cNvPr id="1" name=""/>
+        <p:cNvGrpSpPr/>
+        <p:nvPr/>
+      </p:nvGrpSpPr>
+      <p:grpSpPr>
+        <a:xfrm>
+          <a:off x="0" y="0"/>
+          <a:ext cx="0" cy="0"/>
+          <a:chOff x="0" y="0"/>
+          <a:chExt cx="0" cy="0"/>
+        </a:xfrm>
+      </p:grpSpPr>
+      <p:sp>
+        <p:nvSpPr>
+          <p:cNvPr id="2" name="Title 1"/>
+          <p:cNvSpPr>
+            <a:spLocks noGrp="1"/>
+          </p:cNvSpPr>
+          <p:nvPr>
+            <p:ph type="title"/>
+          </p:nvPr>
+        </p:nvSpPr>
+        <p:spPr/>
+        <p:txBody>
+          <a:bodyPr/>
+          <a:lstStyle/>
+          <a:p>
+            <a:r>
+              <a:rPr lang="en-IN" dirty="0" smtClean="0"/>
+              <a:t>Water Quality Parameters</a:t>
+            </a:r>
+            <a:endParaRPr lang="en-IN" dirty="0"/>
+          </a:p>
+        </p:txBody>
+      </p:sp>
+      <p:sp>
+        <p:nvSpPr>
+          <p:cNvPr id="3" name="Content Placeholder 2"/>
+          <p:cNvSpPr>
+            <a:spLocks noGrp="1"/>
+          </p:cNvSpPr>
+          <p:nvPr>
+            <p:ph idx="1"/>
+          </p:nvPr>
+        </p:nvSpPr>
+        <p:spPr/>
+        <p:txBody>
+          <a:bodyPr>
+            <a:normAutofit fontScale="92500" lnSpcReduction="10000"/>
+          </a:bodyPr>
+          <a:lstStyle/>
+          <a:p>
+            <a:r>
+              <a:rPr lang="en-IN" dirty="0" smtClean="0"/>
+              <a:t>Colour</a:t>
+            </a:r>
+          </a:p>
+          <a:p>
+            <a:pPr lvl="1"/>
+            <a:r>
+              <a:rPr lang="en-IN" dirty="0" smtClean="0"/>
+              <a:t>Due to presence of organic materials and minerals.</a:t>
+            </a:r>
+          </a:p>
+          <a:p>
+            <a:pPr lvl="1"/>
+            <a:r>
+              <a:rPr lang="en-IN" dirty="0" smtClean="0"/>
+              <a:t>Measured in </a:t>
+            </a:r>
+            <a:r>
+              <a:rPr lang="en-IN" dirty="0" err="1" smtClean="0"/>
+              <a:t>Hazan</a:t>
+            </a:r>
+            <a:r>
+              <a:rPr lang="en-IN" dirty="0" smtClean="0"/>
+              <a:t> unit</a:t>
+            </a:r>
+          </a:p>
+          <a:p>
+            <a:pPr lvl="1"/>
+            <a:r>
+              <a:rPr lang="en-IN" dirty="0" smtClean="0"/>
+              <a:t> 5 </a:t>
+            </a:r>
+            <a:r>
+              <a:rPr lang="en-IN" dirty="0" err="1" smtClean="0"/>
+              <a:t>Hazan</a:t>
+            </a:r>
+            <a:r>
+              <a:rPr lang="en-IN" dirty="0" smtClean="0"/>
+              <a:t> is safe more than 25 </a:t>
+            </a:r>
+            <a:r>
+              <a:rPr lang="en-IN" dirty="0" err="1" smtClean="0"/>
+              <a:t>Hazan</a:t>
+            </a:r>
+            <a:r>
+              <a:rPr lang="en-IN" dirty="0" smtClean="0"/>
+              <a:t> is not usable for any purpose.</a:t>
+            </a:r>
+          </a:p>
+          <a:p>
+            <a:r>
+              <a:rPr lang="en-IN" dirty="0" smtClean="0"/>
+              <a:t>Taste and Odour</a:t>
+            </a:r>
+          </a:p>
+          <a:p>
+            <a:pPr lvl="1"/>
+            <a:r>
+              <a:rPr lang="en-IN" dirty="0" smtClean="0"/>
+              <a:t>It is affected by living organic components and carbon dioxide , sulphur, hydrogen, oxygen, iron.</a:t>
+            </a:r>
+          </a:p>
+          <a:p>
+            <a:pPr lvl="1"/>
+            <a:r>
+              <a:rPr lang="en-IN" dirty="0" smtClean="0"/>
+              <a:t>It is TTN (Threshold Taste Number).</a:t>
+            </a:r>
+          </a:p>
+          <a:p>
+            <a:pPr lvl="1"/>
+            <a:r>
+              <a:rPr lang="en-IN" dirty="0" smtClean="0"/>
+              <a:t>It should not have unpleasant odour.</a:t>
+            </a:r>
+          </a:p>
+          <a:p>
+            <a:pPr lvl="1"/>
+            <a:endParaRPr lang="en-IN" dirty="0" smtClean="0"/>
+          </a:p>
+          <a:p>
+            <a:pPr lvl="1"/>
+            <a:endParaRPr lang="en-IN" dirty="0"/>
+          </a:p>
+        </p:txBody>
+      </p:sp>
+    </p:spTree>
+    <p:extLst>
+      <p:ext uri="{BB962C8B-B14F-4D97-AF65-F5344CB8AC3E}">
+        <p14:creationId xmlns:p14="http://schemas.microsoft.com/office/powerpoint/2010/main" val="2524953855"/>
+      </p:ext>
+    </p:extLst>
+  </p:cSld>
+  <p:clrMapOvr>
+    <a:masterClrMapping/>
+  </p:clrMapOvr>
+</p:sld>
+</file>
+
+<file path=ppt/slides/slide36.xml><?xml version="1.0" encoding="utf-8"?>
+<p:sld xmlns:a="http://schemas.openxmlformats.org/drawingml/2006/main" xmlns:r="http://schemas.openxmlformats.org/officeDocument/2006/relationships" xmlns:p="http://schemas.openxmlformats.org/presentationml/2006/main">
+  <p:cSld>
+    <p:spTree>
+      <p:nvGrpSpPr>
+        <p:cNvPr id="1" name=""/>
+        <p:cNvGrpSpPr/>
+        <p:nvPr/>
+      </p:nvGrpSpPr>
+      <p:grpSpPr>
+        <a:xfrm>
+          <a:off x="0" y="0"/>
+          <a:ext cx="0" cy="0"/>
+          <a:chOff x="0" y="0"/>
+          <a:chExt cx="0" cy="0"/>
+        </a:xfrm>
+      </p:grpSpPr>
+      <p:sp>
+        <p:nvSpPr>
+          <p:cNvPr id="2" name="Title 1"/>
+          <p:cNvSpPr>
+            <a:spLocks noGrp="1"/>
+          </p:cNvSpPr>
+          <p:nvPr>
+            <p:ph type="title"/>
+          </p:nvPr>
+        </p:nvSpPr>
+        <p:spPr/>
+        <p:txBody>
+          <a:bodyPr/>
+          <a:lstStyle/>
+          <a:p>
+            <a:r>
+              <a:rPr lang="en-IN" dirty="0" smtClean="0"/>
+              <a:t>Water Quality Parameters</a:t>
+            </a:r>
+            <a:endParaRPr lang="en-IN" dirty="0"/>
+          </a:p>
+        </p:txBody>
+      </p:sp>
+      <p:sp>
+        <p:nvSpPr>
+          <p:cNvPr id="3" name="Content Placeholder 2"/>
+          <p:cNvSpPr>
+            <a:spLocks noGrp="1"/>
+          </p:cNvSpPr>
+          <p:nvPr>
+            <p:ph idx="1"/>
+          </p:nvPr>
+        </p:nvSpPr>
+        <p:spPr/>
+        <p:txBody>
+          <a:bodyPr>
+            <a:normAutofit lnSpcReduction="10000"/>
+          </a:bodyPr>
+          <a:lstStyle/>
+          <a:p>
+            <a:r>
+              <a:rPr lang="en-IN" dirty="0" smtClean="0"/>
+              <a:t>Turbidity</a:t>
+            </a:r>
+          </a:p>
+          <a:p>
+            <a:pPr lvl="1"/>
+            <a:r>
+              <a:rPr lang="en-IN" dirty="0" smtClean="0"/>
+              <a:t>It is due presence of colloidal and suspended particles.</a:t>
+            </a:r>
+          </a:p>
+          <a:p>
+            <a:pPr lvl="1"/>
+            <a:r>
+              <a:rPr lang="en-IN" dirty="0" smtClean="0"/>
+              <a:t>Expressed in </a:t>
+            </a:r>
+            <a:r>
+              <a:rPr lang="en-IN" dirty="0" err="1" smtClean="0"/>
+              <a:t>nephelometric</a:t>
+            </a:r>
+            <a:r>
+              <a:rPr lang="en-IN" dirty="0" smtClean="0"/>
+              <a:t> turbidity units.</a:t>
+            </a:r>
+          </a:p>
+          <a:p>
+            <a:pPr lvl="1"/>
+            <a:r>
+              <a:rPr lang="en-IN" dirty="0" smtClean="0"/>
+              <a:t>Should be below 5 NTU.</a:t>
+            </a:r>
+          </a:p>
+          <a:p>
+            <a:r>
+              <a:rPr lang="en-IN" dirty="0" smtClean="0"/>
+              <a:t>Temperature</a:t>
+            </a:r>
+            <a:endParaRPr lang="en-IN" dirty="0"/>
+          </a:p>
+          <a:p>
+            <a:pPr lvl="1"/>
+            <a:r>
+              <a:rPr lang="en-IN" dirty="0" smtClean="0"/>
+              <a:t>It is depend on viscosity, density, vapour pressure, surface tension.</a:t>
+            </a:r>
+          </a:p>
+          <a:p>
+            <a:pPr lvl="1"/>
+            <a:r>
+              <a:rPr lang="en-IN" dirty="0" smtClean="0"/>
+              <a:t>It should be 10℃ to 15℃ </a:t>
+            </a:r>
+          </a:p>
+          <a:p>
+            <a:endParaRPr lang="en-IN" dirty="0"/>
+          </a:p>
+        </p:txBody>
+      </p:sp>
+    </p:spTree>
+    <p:extLst>
+      <p:ext uri="{BB962C8B-B14F-4D97-AF65-F5344CB8AC3E}">
+        <p14:creationId xmlns:p14="http://schemas.microsoft.com/office/powerpoint/2010/main" val="1754838545"/>
+      </p:ext>
+    </p:extLst>
+  </p:cSld>
+  <p:clrMapOvr>
+    <a:masterClrMapping/>
+  </p:clrMapOvr>
+</p:sld>
+</file>
+
+<file path=ppt/slides/slide37.xml><?xml version="1.0" encoding="utf-8"?>
+<p:sld xmlns:a="http://schemas.openxmlformats.org/drawingml/2006/main" xmlns:r="http://schemas.openxmlformats.org/officeDocument/2006/relationships" xmlns:p="http://schemas.openxmlformats.org/presentationml/2006/main">
+  <p:cSld>
+    <p:spTree>
+      <p:nvGrpSpPr>
+        <p:cNvPr id="1" name=""/>
+        <p:cNvGrpSpPr/>
+        <p:nvPr/>
+      </p:nvGrpSpPr>
+      <p:grpSpPr>
+        <a:xfrm>
+          <a:off x="0" y="0"/>
+          <a:ext cx="0" cy="0"/>
+          <a:chOff x="0" y="0"/>
+          <a:chExt cx="0" cy="0"/>
+        </a:xfrm>
+      </p:grpSpPr>
+      <p:sp>
+        <p:nvSpPr>
+          <p:cNvPr id="2" name="Title 1"/>
+          <p:cNvSpPr>
+            <a:spLocks noGrp="1"/>
+          </p:cNvSpPr>
+          <p:nvPr>
+            <p:ph type="title"/>
+          </p:nvPr>
+        </p:nvSpPr>
+        <p:spPr/>
+        <p:txBody>
+          <a:bodyPr/>
+          <a:lstStyle/>
+          <a:p>
+            <a:r>
+              <a:rPr lang="en-IN" dirty="0" smtClean="0"/>
+              <a:t>Water Quality Parameters</a:t>
+            </a:r>
+            <a:endParaRPr lang="en-IN" dirty="0"/>
+          </a:p>
+        </p:txBody>
+      </p:sp>
+      <p:sp>
+        <p:nvSpPr>
+          <p:cNvPr id="3" name="Content Placeholder 2"/>
+          <p:cNvSpPr>
+            <a:spLocks noGrp="1"/>
+          </p:cNvSpPr>
+          <p:nvPr>
+            <p:ph idx="1"/>
+          </p:nvPr>
+        </p:nvSpPr>
+        <p:spPr/>
+        <p:txBody>
+          <a:bodyPr>
+            <a:normAutofit/>
+          </a:bodyPr>
+          <a:lstStyle/>
+          <a:p>
+            <a:r>
+              <a:rPr lang="en-IN" dirty="0" smtClean="0"/>
+              <a:t>Chemical Properties</a:t>
+            </a:r>
+          </a:p>
+          <a:p>
+            <a:pPr lvl="1"/>
+            <a:r>
+              <a:rPr lang="en-IN" dirty="0" smtClean="0"/>
+              <a:t>Total dissolved solids</a:t>
+            </a:r>
+          </a:p>
+          <a:p>
+            <a:pPr lvl="1"/>
+            <a:r>
+              <a:rPr lang="en-IN" dirty="0" smtClean="0"/>
+              <a:t>Hardness</a:t>
+            </a:r>
+          </a:p>
+          <a:p>
+            <a:pPr lvl="1"/>
+            <a:r>
+              <a:rPr lang="en-IN" dirty="0" smtClean="0"/>
+              <a:t>pH</a:t>
+            </a:r>
+          </a:p>
+          <a:p>
+            <a:pPr lvl="1"/>
+            <a:r>
+              <a:rPr lang="en-IN" dirty="0" smtClean="0"/>
+              <a:t>Copper</a:t>
+            </a:r>
+          </a:p>
+          <a:p>
+            <a:pPr lvl="1"/>
+            <a:r>
+              <a:rPr lang="en-IN" dirty="0" smtClean="0"/>
+              <a:t>Sodium</a:t>
+            </a:r>
+          </a:p>
+          <a:p>
+            <a:pPr lvl="1"/>
+            <a:r>
+              <a:rPr lang="en-IN" dirty="0" smtClean="0"/>
+              <a:t>Zinc</a:t>
+            </a:r>
+            <a:endParaRPr lang="en-IN" dirty="0"/>
+          </a:p>
+        </p:txBody>
+      </p:sp>
+    </p:spTree>
+    <p:extLst>
+      <p:ext uri="{BB962C8B-B14F-4D97-AF65-F5344CB8AC3E}">
+        <p14:creationId xmlns:p14="http://schemas.microsoft.com/office/powerpoint/2010/main" val="2388883483"/>
+      </p:ext>
+    </p:extLst>
+  </p:cSld>
+  <p:clrMapOvr>
+    <a:masterClrMapping/>
+  </p:clrMapOvr>
+</p:sld>
+</file>
+
+<file path=ppt/slides/slide38.xml><?xml version="1.0" encoding="utf-8"?>
+<p:sld xmlns:a="http://schemas.openxmlformats.org/drawingml/2006/main" xmlns:r="http://schemas.openxmlformats.org/officeDocument/2006/relationships" xmlns:p="http://schemas.openxmlformats.org/presentationml/2006/main">
+  <p:cSld>
+    <p:spTree>
+      <p:nvGrpSpPr>
+        <p:cNvPr id="1" name=""/>
+        <p:cNvGrpSpPr/>
+        <p:nvPr/>
+      </p:nvGrpSpPr>
+      <p:grpSpPr>
+        <a:xfrm>
+          <a:off x="0" y="0"/>
+          <a:ext cx="0" cy="0"/>
+          <a:chOff x="0" y="0"/>
+          <a:chExt cx="0" cy="0"/>
+        </a:xfrm>
+      </p:grpSpPr>
+      <p:sp>
+        <p:nvSpPr>
+          <p:cNvPr id="2" name="Title 1"/>
+          <p:cNvSpPr>
+            <a:spLocks noGrp="1"/>
+          </p:cNvSpPr>
+          <p:nvPr>
+            <p:ph type="title"/>
+          </p:nvPr>
+        </p:nvSpPr>
+        <p:spPr/>
+        <p:txBody>
+          <a:bodyPr/>
+          <a:lstStyle/>
+          <a:p>
+            <a:r>
+              <a:rPr lang="en-IN" dirty="0" smtClean="0"/>
+              <a:t>Water Quality Parameters</a:t>
+            </a:r>
+            <a:endParaRPr lang="en-IN" dirty="0"/>
+          </a:p>
+        </p:txBody>
+      </p:sp>
+      <p:sp>
+        <p:nvSpPr>
+          <p:cNvPr id="3" name="Content Placeholder 2"/>
+          <p:cNvSpPr>
+            <a:spLocks noGrp="1"/>
+          </p:cNvSpPr>
+          <p:nvPr>
+            <p:ph idx="1"/>
+          </p:nvPr>
+        </p:nvSpPr>
+        <p:spPr/>
+        <p:txBody>
+          <a:bodyPr>
+            <a:normAutofit/>
+          </a:bodyPr>
+          <a:lstStyle/>
+          <a:p>
+            <a:r>
+              <a:rPr lang="en-IN" dirty="0" smtClean="0"/>
+              <a:t>Total dissolved solids</a:t>
+            </a:r>
+          </a:p>
+          <a:p>
+            <a:pPr lvl="1"/>
+            <a:r>
+              <a:rPr lang="en-IN" dirty="0" smtClean="0"/>
+              <a:t>Total organic and inorganic maters.</a:t>
+            </a:r>
+          </a:p>
+          <a:p>
+            <a:pPr lvl="1"/>
+            <a:r>
+              <a:rPr lang="en-IN" dirty="0" smtClean="0"/>
+              <a:t>It is expressed in mg/l</a:t>
+            </a:r>
+          </a:p>
+          <a:p>
+            <a:pPr lvl="1"/>
+            <a:r>
+              <a:rPr lang="en-IN" dirty="0" smtClean="0"/>
+              <a:t>~500 mg/l is safe.</a:t>
+            </a:r>
+          </a:p>
+          <a:p>
+            <a:r>
+              <a:rPr lang="en-IN" dirty="0" smtClean="0"/>
+              <a:t>Hardness</a:t>
+            </a:r>
+          </a:p>
+          <a:p>
+            <a:pPr lvl="1"/>
+            <a:r>
+              <a:rPr lang="en-IN" dirty="0" smtClean="0"/>
+              <a:t>It is a ability to prevent form lather formation with soap.</a:t>
+            </a:r>
+          </a:p>
+          <a:p>
+            <a:pPr lvl="1"/>
+            <a:r>
+              <a:rPr lang="en-IN" dirty="0" smtClean="0"/>
+              <a:t>300 ppm as CaCO3 safe. </a:t>
+            </a:r>
+            <a:endParaRPr lang="en-IN" dirty="0"/>
+          </a:p>
+        </p:txBody>
+      </p:sp>
+    </p:spTree>
+    <p:extLst>
+      <p:ext uri="{BB962C8B-B14F-4D97-AF65-F5344CB8AC3E}">
+        <p14:creationId xmlns:p14="http://schemas.microsoft.com/office/powerpoint/2010/main" val="2027579133"/>
+      </p:ext>
+    </p:extLst>
+  </p:cSld>
+  <p:clrMapOvr>
+    <a:masterClrMapping/>
+  </p:clrMapOvr>
+</p:sld>
+</file>
+
+<file path=ppt/slides/slide39.xml><?xml version="1.0" encoding="utf-8"?>
+<p:sld xmlns:a="http://schemas.openxmlformats.org/drawingml/2006/main" xmlns:r="http://schemas.openxmlformats.org/officeDocument/2006/relationships" xmlns:p="http://schemas.openxmlformats.org/presentationml/2006/main">
+  <p:cSld>
+    <p:spTree>
+      <p:nvGrpSpPr>
+        <p:cNvPr id="1" name=""/>
+        <p:cNvGrpSpPr/>
+        <p:nvPr/>
+      </p:nvGrpSpPr>
+      <p:grpSpPr>
+        <a:xfrm>
+          <a:off x="0" y="0"/>
+          <a:ext cx="0" cy="0"/>
+          <a:chOff x="0" y="0"/>
+          <a:chExt cx="0" cy="0"/>
+        </a:xfrm>
+      </p:grpSpPr>
+      <p:sp>
+        <p:nvSpPr>
+          <p:cNvPr id="2" name="Title 1"/>
+          <p:cNvSpPr>
+            <a:spLocks noGrp="1"/>
+          </p:cNvSpPr>
+          <p:nvPr>
+            <p:ph type="title"/>
+          </p:nvPr>
+        </p:nvSpPr>
+        <p:spPr/>
+        <p:txBody>
+          <a:bodyPr/>
+          <a:lstStyle/>
+          <a:p>
+            <a:r>
+              <a:rPr lang="en-IN" dirty="0" smtClean="0"/>
+              <a:t>Water Quality Parameters</a:t>
+            </a:r>
+            <a:endParaRPr lang="en-IN" dirty="0"/>
+          </a:p>
+        </p:txBody>
+      </p:sp>
+      <p:sp>
+        <p:nvSpPr>
+          <p:cNvPr id="3" name="Content Placeholder 2"/>
+          <p:cNvSpPr>
+            <a:spLocks noGrp="1"/>
+          </p:cNvSpPr>
+          <p:nvPr>
+            <p:ph idx="1"/>
+          </p:nvPr>
+        </p:nvSpPr>
+        <p:spPr/>
+        <p:txBody>
+          <a:bodyPr>
+            <a:normAutofit fontScale="92500" lnSpcReduction="10000"/>
+          </a:bodyPr>
+          <a:lstStyle/>
+          <a:p>
+            <a:r>
+              <a:rPr lang="en-IN" dirty="0" smtClean="0"/>
+              <a:t>pH</a:t>
+            </a:r>
+          </a:p>
+          <a:p>
+            <a:pPr lvl="1"/>
+            <a:r>
+              <a:rPr lang="en-IN" dirty="0" smtClean="0"/>
+              <a:t>pH value is 7 for pure water.</a:t>
+            </a:r>
+          </a:p>
+          <a:p>
+            <a:pPr lvl="1"/>
+            <a:r>
+              <a:rPr lang="en-IN" dirty="0" smtClean="0"/>
+              <a:t>pH is between 7 to 14 is for water</a:t>
+            </a:r>
+          </a:p>
+          <a:p>
+            <a:pPr lvl="1"/>
+            <a:r>
+              <a:rPr lang="en-IN" dirty="0" smtClean="0"/>
+              <a:t>6.5 to 8.5 is safe to drink.</a:t>
+            </a:r>
+          </a:p>
+          <a:p>
+            <a:r>
+              <a:rPr lang="en-US" dirty="0" smtClean="0"/>
+              <a:t>Copper</a:t>
+            </a:r>
+          </a:p>
+          <a:p>
+            <a:pPr lvl="1"/>
+            <a:r>
+              <a:rPr lang="en-US" dirty="0" smtClean="0"/>
+              <a:t>It affects the taste.</a:t>
+            </a:r>
+          </a:p>
+          <a:p>
+            <a:pPr lvl="1"/>
+            <a:r>
+              <a:rPr lang="en-US" dirty="0" smtClean="0"/>
+              <a:t>Excess of copper cause stomach and intestinal distress.</a:t>
+            </a:r>
+          </a:p>
+          <a:p>
+            <a:pPr lvl="1"/>
+            <a:r>
+              <a:rPr lang="en-US" dirty="0" smtClean="0"/>
+              <a:t>Corroding water pipes is a source.</a:t>
+            </a:r>
+          </a:p>
+          <a:p>
+            <a:pPr lvl="1"/>
+            <a:r>
+              <a:rPr lang="en-US" dirty="0" smtClean="0"/>
+              <a:t>Safe limit is 0.05 ppm.</a:t>
+            </a:r>
+            <a:endParaRPr lang="en-IN" dirty="0" smtClean="0"/>
+          </a:p>
+        </p:txBody>
+      </p:sp>
+    </p:spTree>
+    <p:extLst>
+      <p:ext uri="{BB962C8B-B14F-4D97-AF65-F5344CB8AC3E}">
+        <p14:creationId xmlns:p14="http://schemas.microsoft.com/office/powerpoint/2010/main" val="2687884142"/>
+      </p:ext>
+    </p:extLst>
+  </p:cSld>
+  <p:clrMapOvr>
+    <a:masterClrMapping/>
+  </p:clrMapOvr>
 </p:sld>
 </file>
 
@@ -8567,6 +8963,906 @@
   <p:clrMapOvr>
     <a:masterClrMapping/>
   </p:clrMapOvr>
+</p:sld>
+</file>
+
+<file path=ppt/slides/slide40.xml><?xml version="1.0" encoding="utf-8"?>
+<p:sld xmlns:a="http://schemas.openxmlformats.org/drawingml/2006/main" xmlns:r="http://schemas.openxmlformats.org/officeDocument/2006/relationships" xmlns:p="http://schemas.openxmlformats.org/presentationml/2006/main">
+  <p:cSld>
+    <p:spTree>
+      <p:nvGrpSpPr>
+        <p:cNvPr id="1" name=""/>
+        <p:cNvGrpSpPr/>
+        <p:nvPr/>
+      </p:nvGrpSpPr>
+      <p:grpSpPr>
+        <a:xfrm>
+          <a:off x="0" y="0"/>
+          <a:ext cx="0" cy="0"/>
+          <a:chOff x="0" y="0"/>
+          <a:chExt cx="0" cy="0"/>
+        </a:xfrm>
+      </p:grpSpPr>
+      <p:sp>
+        <p:nvSpPr>
+          <p:cNvPr id="2" name="Title 1"/>
+          <p:cNvSpPr>
+            <a:spLocks noGrp="1"/>
+          </p:cNvSpPr>
+          <p:nvPr>
+            <p:ph type="title"/>
+          </p:nvPr>
+        </p:nvSpPr>
+        <p:spPr/>
+        <p:txBody>
+          <a:bodyPr/>
+          <a:lstStyle/>
+          <a:p>
+            <a:r>
+              <a:rPr lang="en-IN" dirty="0" smtClean="0"/>
+              <a:t>Water Quality Parameters</a:t>
+            </a:r>
+            <a:endParaRPr lang="en-IN" dirty="0"/>
+          </a:p>
+        </p:txBody>
+      </p:sp>
+      <p:sp>
+        <p:nvSpPr>
+          <p:cNvPr id="3" name="Content Placeholder 2"/>
+          <p:cNvSpPr>
+            <a:spLocks noGrp="1"/>
+          </p:cNvSpPr>
+          <p:nvPr>
+            <p:ph idx="1"/>
+          </p:nvPr>
+        </p:nvSpPr>
+        <p:spPr/>
+        <p:txBody>
+          <a:bodyPr>
+            <a:normAutofit/>
+          </a:bodyPr>
+          <a:lstStyle/>
+          <a:p>
+            <a:r>
+              <a:rPr lang="en-US" dirty="0"/>
+              <a:t>S</a:t>
+            </a:r>
+            <a:r>
+              <a:rPr lang="en-US" dirty="0" smtClean="0"/>
+              <a:t>odium</a:t>
+            </a:r>
+            <a:endParaRPr lang="en-US" dirty="0"/>
+          </a:p>
+          <a:p>
+            <a:pPr lvl="1"/>
+            <a:r>
+              <a:rPr lang="en-US" dirty="0" smtClean="0"/>
+              <a:t>Excessive presence affects the heart, kidney.</a:t>
+            </a:r>
+          </a:p>
+          <a:p>
+            <a:pPr lvl="1"/>
+            <a:r>
+              <a:rPr lang="en-US" dirty="0" smtClean="0"/>
+              <a:t>It is increases the blood pressure.</a:t>
+            </a:r>
+            <a:endParaRPr lang="en-IN" dirty="0"/>
+          </a:p>
+          <a:p>
+            <a:r>
+              <a:rPr lang="en-US" dirty="0" smtClean="0"/>
+              <a:t>Zinc</a:t>
+            </a:r>
+          </a:p>
+          <a:p>
+            <a:pPr lvl="1"/>
+            <a:r>
+              <a:rPr lang="en-US" dirty="0" smtClean="0"/>
+              <a:t>It affects the taste.</a:t>
+            </a:r>
+          </a:p>
+          <a:p>
+            <a:pPr lvl="1"/>
+            <a:r>
+              <a:rPr lang="en-US" dirty="0" smtClean="0"/>
+              <a:t>Safe limit is 5 mg/l</a:t>
+            </a:r>
+          </a:p>
+        </p:txBody>
+      </p:sp>
+    </p:spTree>
+    <p:extLst>
+      <p:ext uri="{BB962C8B-B14F-4D97-AF65-F5344CB8AC3E}">
+        <p14:creationId xmlns:p14="http://schemas.microsoft.com/office/powerpoint/2010/main" val="121155102"/>
+      </p:ext>
+    </p:extLst>
+  </p:cSld>
+  <p:clrMapOvr>
+    <a:masterClrMapping/>
+  </p:clrMapOvr>
+</p:sld>
+</file>
+
+<file path=ppt/slides/slide41.xml><?xml version="1.0" encoding="utf-8"?>
+<p:sld xmlns:a="http://schemas.openxmlformats.org/drawingml/2006/main" xmlns:r="http://schemas.openxmlformats.org/officeDocument/2006/relationships" xmlns:p="http://schemas.openxmlformats.org/presentationml/2006/main">
+  <p:cSld>
+    <p:spTree>
+      <p:nvGrpSpPr>
+        <p:cNvPr id="1" name=""/>
+        <p:cNvGrpSpPr/>
+        <p:nvPr/>
+      </p:nvGrpSpPr>
+      <p:grpSpPr>
+        <a:xfrm>
+          <a:off x="0" y="0"/>
+          <a:ext cx="0" cy="0"/>
+          <a:chOff x="0" y="0"/>
+          <a:chExt cx="0" cy="0"/>
+        </a:xfrm>
+      </p:grpSpPr>
+      <p:sp>
+        <p:nvSpPr>
+          <p:cNvPr id="2" name="Title 1"/>
+          <p:cNvSpPr>
+            <a:spLocks noGrp="1"/>
+          </p:cNvSpPr>
+          <p:nvPr>
+            <p:ph type="title"/>
+          </p:nvPr>
+        </p:nvSpPr>
+        <p:spPr/>
+        <p:txBody>
+          <a:bodyPr/>
+          <a:lstStyle/>
+          <a:p>
+            <a:r>
+              <a:rPr lang="en-IN" dirty="0" smtClean="0"/>
+              <a:t>Water Quality Parameters</a:t>
+            </a:r>
+            <a:endParaRPr lang="en-IN" dirty="0"/>
+          </a:p>
+        </p:txBody>
+      </p:sp>
+      <p:sp>
+        <p:nvSpPr>
+          <p:cNvPr id="3" name="Content Placeholder 2"/>
+          <p:cNvSpPr>
+            <a:spLocks noGrp="1"/>
+          </p:cNvSpPr>
+          <p:nvPr>
+            <p:ph idx="1"/>
+          </p:nvPr>
+        </p:nvSpPr>
+        <p:spPr/>
+        <p:txBody>
+          <a:bodyPr>
+            <a:normAutofit fontScale="92500" lnSpcReduction="10000"/>
+          </a:bodyPr>
+          <a:lstStyle/>
+          <a:p>
+            <a:r>
+              <a:rPr lang="en-US" dirty="0" smtClean="0"/>
+              <a:t>Biological Parameters</a:t>
+            </a:r>
+          </a:p>
+          <a:p>
+            <a:pPr lvl="1"/>
+            <a:r>
+              <a:rPr lang="en-US" dirty="0" smtClean="0"/>
+              <a:t>Bacteria</a:t>
+            </a:r>
+          </a:p>
+          <a:p>
+            <a:pPr lvl="2"/>
+            <a:r>
+              <a:rPr lang="en-US" dirty="0" smtClean="0"/>
+              <a:t>Disease causing bacteria's are known as pathogens.</a:t>
+            </a:r>
+          </a:p>
+          <a:p>
+            <a:pPr lvl="2"/>
+            <a:r>
+              <a:rPr lang="en-US" dirty="0" smtClean="0"/>
+              <a:t>It is removed by disinfection. </a:t>
+            </a:r>
+          </a:p>
+          <a:p>
+            <a:pPr lvl="1"/>
+            <a:r>
+              <a:rPr lang="en-US" dirty="0" smtClean="0"/>
+              <a:t>Algae</a:t>
+            </a:r>
+          </a:p>
+          <a:p>
+            <a:pPr lvl="2"/>
+            <a:r>
+              <a:rPr lang="en-US" dirty="0" smtClean="0"/>
+              <a:t>It is food for fish.</a:t>
+            </a:r>
+          </a:p>
+          <a:p>
+            <a:pPr lvl="2"/>
+            <a:r>
+              <a:rPr lang="en-US" dirty="0" smtClean="0"/>
+              <a:t>Presence in drinking water gives unpleasant taste and odor.</a:t>
+            </a:r>
+          </a:p>
+          <a:p>
+            <a:pPr lvl="1"/>
+            <a:r>
+              <a:rPr lang="en-US" dirty="0" smtClean="0"/>
+              <a:t>Protozoa</a:t>
+            </a:r>
+          </a:p>
+          <a:p>
+            <a:pPr lvl="2"/>
+            <a:r>
+              <a:rPr lang="en-US" dirty="0" smtClean="0"/>
+              <a:t>One cell organism (Ameba).</a:t>
+            </a:r>
+          </a:p>
+          <a:p>
+            <a:pPr lvl="2"/>
+            <a:r>
+              <a:rPr lang="en-US" dirty="0" smtClean="0"/>
+              <a:t>Causes </a:t>
+            </a:r>
+            <a:r>
+              <a:rPr lang="en-US" dirty="0" err="1"/>
+              <a:t>d</a:t>
+            </a:r>
+            <a:r>
+              <a:rPr lang="en-US" dirty="0" err="1" smtClean="0"/>
+              <a:t>isentery</a:t>
+            </a:r>
+            <a:r>
+              <a:rPr lang="en-US" dirty="0" smtClean="0"/>
+              <a:t> for children's.</a:t>
+            </a:r>
+          </a:p>
+        </p:txBody>
+      </p:sp>
+    </p:spTree>
+    <p:extLst>
+      <p:ext uri="{BB962C8B-B14F-4D97-AF65-F5344CB8AC3E}">
+        <p14:creationId xmlns:p14="http://schemas.microsoft.com/office/powerpoint/2010/main" val="1370219696"/>
+      </p:ext>
+    </p:extLst>
+  </p:cSld>
+  <p:clrMapOvr>
+    <a:masterClrMapping/>
+  </p:clrMapOvr>
+</p:sld>
+</file>
+
+<file path=ppt/slides/slide42.xml><?xml version="1.0" encoding="utf-8"?>
+<p:sld xmlns:a="http://schemas.openxmlformats.org/drawingml/2006/main" xmlns:r="http://schemas.openxmlformats.org/officeDocument/2006/relationships" xmlns:p="http://schemas.openxmlformats.org/presentationml/2006/main">
+  <p:cSld>
+    <p:spTree>
+      <p:nvGrpSpPr>
+        <p:cNvPr id="1" name=""/>
+        <p:cNvGrpSpPr/>
+        <p:nvPr/>
+      </p:nvGrpSpPr>
+      <p:grpSpPr>
+        <a:xfrm>
+          <a:off x="0" y="0"/>
+          <a:ext cx="0" cy="0"/>
+          <a:chOff x="0" y="0"/>
+          <a:chExt cx="0" cy="0"/>
+        </a:xfrm>
+      </p:grpSpPr>
+      <p:sp>
+        <p:nvSpPr>
+          <p:cNvPr id="2" name="Title 1"/>
+          <p:cNvSpPr>
+            <a:spLocks noGrp="1"/>
+          </p:cNvSpPr>
+          <p:nvPr>
+            <p:ph type="title"/>
+          </p:nvPr>
+        </p:nvSpPr>
+        <p:spPr/>
+        <p:txBody>
+          <a:bodyPr>
+            <a:normAutofit/>
+          </a:bodyPr>
+          <a:lstStyle/>
+          <a:p>
+            <a:r>
+              <a:rPr lang="en-IN" sz="3600" dirty="0" smtClean="0"/>
+              <a:t>Properties of Terrestrial and Seawater</a:t>
+            </a:r>
+            <a:endParaRPr lang="en-IN" sz="3600" dirty="0"/>
+          </a:p>
+        </p:txBody>
+      </p:sp>
+      <p:sp>
+        <p:nvSpPr>
+          <p:cNvPr id="3" name="Content Placeholder 2"/>
+          <p:cNvSpPr>
+            <a:spLocks noGrp="1"/>
+          </p:cNvSpPr>
+          <p:nvPr>
+            <p:ph idx="1"/>
+          </p:nvPr>
+        </p:nvSpPr>
+        <p:spPr/>
+        <p:txBody>
+          <a:bodyPr>
+            <a:normAutofit/>
+          </a:bodyPr>
+          <a:lstStyle/>
+          <a:p>
+            <a:r>
+              <a:rPr lang="en-US" dirty="0" smtClean="0"/>
+              <a:t>Mixture of 96.5 % pure water and 3.5 % materials (salts, dissolved gases, organic substances).</a:t>
+            </a:r>
+          </a:p>
+          <a:p>
+            <a:r>
+              <a:rPr lang="en-US" dirty="0" smtClean="0"/>
+              <a:t>60 % of animal body made of water.</a:t>
+            </a:r>
+          </a:p>
+          <a:p>
+            <a:r>
+              <a:rPr lang="en-US" dirty="0" smtClean="0"/>
+              <a:t>It is naturally has 3 forms (solid, liquid, gas).</a:t>
+            </a:r>
+          </a:p>
+          <a:p>
+            <a:r>
+              <a:rPr lang="en-US" dirty="0" smtClean="0"/>
+              <a:t>It affects the climate.</a:t>
+            </a:r>
+          </a:p>
+          <a:p>
+            <a:r>
+              <a:rPr lang="en-US" dirty="0" smtClean="0"/>
+              <a:t>It has dissolved salts.</a:t>
+            </a:r>
+          </a:p>
+        </p:txBody>
+      </p:sp>
+    </p:spTree>
+    <p:extLst>
+      <p:ext uri="{BB962C8B-B14F-4D97-AF65-F5344CB8AC3E}">
+        <p14:creationId xmlns:p14="http://schemas.microsoft.com/office/powerpoint/2010/main" val="394278778"/>
+      </p:ext>
+    </p:extLst>
+  </p:cSld>
+  <p:clrMapOvr>
+    <a:masterClrMapping/>
+  </p:clrMapOvr>
+</p:sld>
+</file>
+
+<file path=ppt/slides/slide43.xml><?xml version="1.0" encoding="utf-8"?>
+<p:sld xmlns:a="http://schemas.openxmlformats.org/drawingml/2006/main" xmlns:r="http://schemas.openxmlformats.org/officeDocument/2006/relationships" xmlns:p="http://schemas.openxmlformats.org/presentationml/2006/main">
+  <p:cSld>
+    <p:spTree>
+      <p:nvGrpSpPr>
+        <p:cNvPr id="1" name=""/>
+        <p:cNvGrpSpPr/>
+        <p:nvPr/>
+      </p:nvGrpSpPr>
+      <p:grpSpPr>
+        <a:xfrm>
+          <a:off x="0" y="0"/>
+          <a:ext cx="0" cy="0"/>
+          <a:chOff x="0" y="0"/>
+          <a:chExt cx="0" cy="0"/>
+        </a:xfrm>
+      </p:grpSpPr>
+      <p:sp>
+        <p:nvSpPr>
+          <p:cNvPr id="2" name="Title 1"/>
+          <p:cNvSpPr>
+            <a:spLocks noGrp="1"/>
+          </p:cNvSpPr>
+          <p:nvPr>
+            <p:ph type="title"/>
+          </p:nvPr>
+        </p:nvSpPr>
+        <p:spPr/>
+        <p:txBody>
+          <a:bodyPr>
+            <a:normAutofit/>
+          </a:bodyPr>
+          <a:lstStyle/>
+          <a:p>
+            <a:r>
+              <a:rPr lang="en-IN" sz="3600" dirty="0" smtClean="0"/>
+              <a:t>Properties of Terrestrial and Seawater</a:t>
+            </a:r>
+            <a:endParaRPr lang="en-IN" sz="3600" dirty="0"/>
+          </a:p>
+        </p:txBody>
+      </p:sp>
+      <p:sp>
+        <p:nvSpPr>
+          <p:cNvPr id="3" name="Content Placeholder 2"/>
+          <p:cNvSpPr>
+            <a:spLocks noGrp="1"/>
+          </p:cNvSpPr>
+          <p:nvPr>
+            <p:ph idx="1"/>
+          </p:nvPr>
+        </p:nvSpPr>
+        <p:spPr/>
+        <p:txBody>
+          <a:bodyPr>
+            <a:normAutofit fontScale="92500" lnSpcReduction="10000"/>
+          </a:bodyPr>
+          <a:lstStyle/>
+          <a:p>
+            <a:r>
+              <a:rPr lang="en-US" dirty="0" smtClean="0"/>
+              <a:t>Absorption of Heavy metals</a:t>
+            </a:r>
+          </a:p>
+          <a:p>
+            <a:pPr lvl="1"/>
+            <a:r>
+              <a:rPr lang="en-US" dirty="0" smtClean="0"/>
+              <a:t>It is environmentally stable elements of high specific gravity and atomic weight.</a:t>
+            </a:r>
+          </a:p>
+          <a:p>
+            <a:pPr lvl="1"/>
+            <a:r>
+              <a:rPr lang="en-US" dirty="0" smtClean="0"/>
+              <a:t>Cd, Cu, Fe, Co, Zn, Hg, V, Ni, Cr, </a:t>
+            </a:r>
+            <a:r>
+              <a:rPr lang="en-US" dirty="0" err="1" smtClean="0"/>
+              <a:t>Mn</a:t>
+            </a:r>
+            <a:r>
+              <a:rPr lang="en-US" dirty="0" smtClean="0"/>
+              <a:t>, Mo.</a:t>
+            </a:r>
+          </a:p>
+          <a:p>
+            <a:pPr lvl="1"/>
+            <a:r>
+              <a:rPr lang="en-US" dirty="0" smtClean="0"/>
+              <a:t>It has binding property of metabolically active groups.</a:t>
+            </a:r>
+          </a:p>
+          <a:p>
+            <a:pPr lvl="1"/>
+            <a:r>
+              <a:rPr lang="en-US" dirty="0" smtClean="0"/>
+              <a:t>Toxicity</a:t>
+            </a:r>
+          </a:p>
+          <a:p>
+            <a:pPr lvl="2"/>
+            <a:r>
+              <a:rPr lang="en-US" dirty="0" smtClean="0"/>
+              <a:t>Solubility.</a:t>
+            </a:r>
+            <a:endParaRPr lang="en-US" dirty="0"/>
+          </a:p>
+          <a:p>
+            <a:pPr lvl="2"/>
+            <a:r>
+              <a:rPr lang="en-US" dirty="0" smtClean="0"/>
+              <a:t>Stability.</a:t>
+            </a:r>
+          </a:p>
+          <a:p>
+            <a:pPr lvl="2"/>
+            <a:r>
+              <a:rPr lang="en-US" dirty="0" smtClean="0"/>
+              <a:t>B</a:t>
+            </a:r>
+          </a:p>
+          <a:p>
+            <a:pPr lvl="2"/>
+            <a:r>
+              <a:rPr lang="en-US"/>
+              <a:t>B</a:t>
+            </a:r>
+            <a:r>
+              <a:rPr lang="en-US" smtClean="0"/>
+              <a:t>iological </a:t>
+            </a:r>
+            <a:r>
+              <a:rPr lang="en-US" dirty="0" smtClean="0"/>
+              <a:t>reactivity.</a:t>
+            </a:r>
+          </a:p>
+        </p:txBody>
+      </p:sp>
+    </p:spTree>
+    <p:extLst>
+      <p:ext uri="{BB962C8B-B14F-4D97-AF65-F5344CB8AC3E}">
+        <p14:creationId xmlns:p14="http://schemas.microsoft.com/office/powerpoint/2010/main" val="2125858254"/>
+      </p:ext>
+    </p:extLst>
+  </p:cSld>
+  <p:clrMapOvr>
+    <a:masterClrMapping/>
+  </p:clrMapOvr>
+</p:sld>
+</file>
+
+<file path=ppt/slides/slide44.xml><?xml version="1.0" encoding="utf-8"?>
+<p:sld xmlns:a="http://schemas.openxmlformats.org/drawingml/2006/main" xmlns:r="http://schemas.openxmlformats.org/officeDocument/2006/relationships" xmlns:p="http://schemas.openxmlformats.org/presentationml/2006/main">
+  <p:cSld>
+    <p:spTree>
+      <p:nvGrpSpPr>
+        <p:cNvPr id="1" name=""/>
+        <p:cNvGrpSpPr/>
+        <p:nvPr/>
+      </p:nvGrpSpPr>
+      <p:grpSpPr>
+        <a:xfrm>
+          <a:off x="0" y="0"/>
+          <a:ext cx="0" cy="0"/>
+          <a:chOff x="0" y="0"/>
+          <a:chExt cx="0" cy="0"/>
+        </a:xfrm>
+      </p:grpSpPr>
+      <p:sp>
+        <p:nvSpPr>
+          <p:cNvPr id="2" name="Title 1"/>
+          <p:cNvSpPr>
+            <a:spLocks noGrp="1"/>
+          </p:cNvSpPr>
+          <p:nvPr>
+            <p:ph type="title"/>
+          </p:nvPr>
+        </p:nvSpPr>
+        <p:spPr>
+          <a:xfrm>
+            <a:off x="457200" y="1981200"/>
+            <a:ext cx="8229600" cy="1143000"/>
+          </a:xfrm>
+        </p:spPr>
+        <p:txBody>
+          <a:bodyPr/>
+          <a:lstStyle/>
+          <a:p>
+            <a:r>
+              <a:rPr lang="en-US" dirty="0" smtClean="0"/>
+              <a:t>Thank You</a:t>
+            </a:r>
+            <a:endParaRPr lang="en-US" dirty="0"/>
+          </a:p>
+        </p:txBody>
+      </p:sp>
+      <p:sp>
+        <p:nvSpPr>
+          <p:cNvPr id="4" name="Subtitle 2"/>
+          <p:cNvSpPr txBox="1">
+            <a:spLocks/>
+          </p:cNvSpPr>
+          <p:nvPr/>
+        </p:nvSpPr>
+        <p:spPr>
+          <a:xfrm>
+            <a:off x="4038600" y="4191000"/>
+            <a:ext cx="4191000" cy="1752600"/>
+          </a:xfrm>
+          <a:prstGeom prst="rect">
+            <a:avLst/>
+          </a:prstGeom>
+        </p:spPr>
+        <p:txBody>
+          <a:bodyPr vert="horz" lIns="91440" tIns="45720" rIns="91440" bIns="45720" rtlCol="0">
+            <a:normAutofit fontScale="92500" lnSpcReduction="10000"/>
+          </a:bodyPr>
+          <a:lstStyle/>
+          <a:p>
+            <a:pPr marL="342900" marR="0" lvl="0" indent="-342900" algn="r" defTabSz="914400" rtl="0" eaLnBrk="1" fontAlgn="auto" latinLnBrk="0" hangingPunct="1">
+              <a:lnSpc>
+                <a:spcPct val="100000"/>
+              </a:lnSpc>
+              <a:spcBef>
+                <a:spcPct val="20000"/>
+              </a:spcBef>
+              <a:spcAft>
+                <a:spcPts val="0"/>
+              </a:spcAft>
+              <a:buClrTx/>
+              <a:buSzTx/>
+              <a:tabLst/>
+              <a:defRPr/>
+            </a:pPr>
+            <a:r>
+              <a:rPr kumimoji="0" lang="en-US" sz="2200" b="0" i="0" u="none" strike="noStrike" kern="1200" cap="none" spc="0" normalizeH="0" baseline="0" noProof="0" dirty="0" err="1" smtClean="0">
+                <a:ln>
+                  <a:noFill/>
+                </a:ln>
+                <a:solidFill>
+                  <a:schemeClr val="tx1"/>
+                </a:solidFill>
+                <a:effectLst/>
+                <a:uLnTx/>
+                <a:uFillTx/>
+                <a:latin typeface="Cambria" pitchFamily="18" charset="0"/>
+                <a:ea typeface="+mn-ea"/>
+                <a:cs typeface="+mn-cs"/>
+              </a:rPr>
+              <a:t>Rajasekaran</a:t>
+            </a:r>
+            <a:r>
+              <a:rPr kumimoji="0" lang="en-US" sz="2200" b="0" i="0" u="none" strike="noStrike" kern="1200" cap="none" spc="0" normalizeH="0" baseline="0" noProof="0" dirty="0" smtClean="0">
+                <a:ln>
+                  <a:noFill/>
+                </a:ln>
+                <a:solidFill>
+                  <a:schemeClr val="tx1"/>
+                </a:solidFill>
+                <a:effectLst/>
+                <a:uLnTx/>
+                <a:uFillTx/>
+                <a:latin typeface="Cambria" pitchFamily="18" charset="0"/>
+                <a:ea typeface="+mn-ea"/>
+                <a:cs typeface="+mn-cs"/>
+              </a:rPr>
+              <a:t> S</a:t>
+            </a:r>
+          </a:p>
+          <a:p>
+            <a:pPr marL="342900" marR="0" lvl="0" indent="-342900" algn="r" defTabSz="914400" rtl="0" eaLnBrk="1" fontAlgn="auto" latinLnBrk="0" hangingPunct="1">
+              <a:lnSpc>
+                <a:spcPct val="100000"/>
+              </a:lnSpc>
+              <a:spcBef>
+                <a:spcPct val="20000"/>
+              </a:spcBef>
+              <a:spcAft>
+                <a:spcPts val="0"/>
+              </a:spcAft>
+              <a:buClrTx/>
+              <a:buSzTx/>
+              <a:tabLst/>
+              <a:defRPr/>
+            </a:pPr>
+            <a:r>
+              <a:rPr kumimoji="0" lang="en-US" sz="1600" b="0" i="0" u="none" strike="noStrike" kern="1200" cap="none" spc="0" normalizeH="0" baseline="0" noProof="0" dirty="0" smtClean="0">
+                <a:ln>
+                  <a:noFill/>
+                </a:ln>
+                <a:solidFill>
+                  <a:schemeClr val="tx1"/>
+                </a:solidFill>
+                <a:effectLst/>
+                <a:uLnTx/>
+                <a:uFillTx/>
+                <a:latin typeface="Cambria" pitchFamily="18" charset="0"/>
+                <a:ea typeface="+mn-ea"/>
+                <a:cs typeface="+mn-cs"/>
+              </a:rPr>
+              <a:t>Assistant Professor,</a:t>
+            </a:r>
+          </a:p>
+          <a:p>
+            <a:pPr marL="342900" marR="0" lvl="0" indent="-342900" algn="r" defTabSz="914400" rtl="0" eaLnBrk="1" fontAlgn="auto" latinLnBrk="0" hangingPunct="1">
+              <a:lnSpc>
+                <a:spcPct val="100000"/>
+              </a:lnSpc>
+              <a:spcBef>
+                <a:spcPct val="20000"/>
+              </a:spcBef>
+              <a:spcAft>
+                <a:spcPts val="0"/>
+              </a:spcAft>
+              <a:buClrTx/>
+              <a:buSzTx/>
+              <a:tabLst/>
+              <a:defRPr/>
+            </a:pPr>
+            <a:r>
+              <a:rPr kumimoji="0" lang="en-US" sz="1600" b="0" i="0" u="none" strike="noStrike" kern="1200" cap="none" spc="0" normalizeH="0" baseline="0" noProof="0" dirty="0" smtClean="0">
+                <a:ln>
+                  <a:noFill/>
+                </a:ln>
+                <a:solidFill>
+                  <a:schemeClr val="tx1"/>
+                </a:solidFill>
+                <a:effectLst/>
+                <a:uLnTx/>
+                <a:uFillTx/>
+                <a:latin typeface="Cambria" pitchFamily="18" charset="0"/>
+                <a:ea typeface="+mn-ea"/>
+                <a:cs typeface="+mn-cs"/>
+              </a:rPr>
+              <a:t>Department of Information Technology,</a:t>
+            </a:r>
+          </a:p>
+          <a:p>
+            <a:pPr marL="342900" marR="0" lvl="0" indent="-342900" algn="r" defTabSz="914400" rtl="0" eaLnBrk="1" fontAlgn="auto" latinLnBrk="0" hangingPunct="1">
+              <a:lnSpc>
+                <a:spcPct val="100000"/>
+              </a:lnSpc>
+              <a:spcBef>
+                <a:spcPct val="20000"/>
+              </a:spcBef>
+              <a:spcAft>
+                <a:spcPts val="0"/>
+              </a:spcAft>
+              <a:buClrTx/>
+              <a:buSzTx/>
+              <a:tabLst/>
+              <a:defRPr/>
+            </a:pPr>
+            <a:r>
+              <a:rPr kumimoji="0" lang="en-US" sz="1600" b="0" i="0" u="none" strike="noStrike" kern="1200" cap="none" spc="0" normalizeH="0" baseline="0" noProof="0" dirty="0" err="1" smtClean="0">
+                <a:ln>
+                  <a:noFill/>
+                </a:ln>
+                <a:solidFill>
+                  <a:schemeClr val="tx1"/>
+                </a:solidFill>
+                <a:effectLst/>
+                <a:uLnTx/>
+                <a:uFillTx/>
+                <a:latin typeface="Cambria" pitchFamily="18" charset="0"/>
+                <a:ea typeface="+mn-ea"/>
+                <a:cs typeface="+mn-cs"/>
+              </a:rPr>
+              <a:t>KGiSL</a:t>
+            </a:r>
+            <a:r>
+              <a:rPr kumimoji="0" lang="en-US" sz="1600" b="0" i="0" u="none" strike="noStrike" kern="1200" cap="none" spc="0" normalizeH="0" baseline="0" noProof="0" dirty="0" smtClean="0">
+                <a:ln>
+                  <a:noFill/>
+                </a:ln>
+                <a:solidFill>
+                  <a:schemeClr val="tx1"/>
+                </a:solidFill>
+                <a:effectLst/>
+                <a:uLnTx/>
+                <a:uFillTx/>
+                <a:latin typeface="Cambria" pitchFamily="18" charset="0"/>
+                <a:ea typeface="+mn-ea"/>
+                <a:cs typeface="+mn-cs"/>
+              </a:rPr>
+              <a:t> Institute of Technology,</a:t>
+            </a:r>
+          </a:p>
+          <a:p>
+            <a:pPr marL="342900" marR="0" lvl="0" indent="-342900" algn="r" defTabSz="914400" rtl="0" eaLnBrk="1" fontAlgn="auto" latinLnBrk="0" hangingPunct="1">
+              <a:lnSpc>
+                <a:spcPct val="100000"/>
+              </a:lnSpc>
+              <a:spcBef>
+                <a:spcPct val="20000"/>
+              </a:spcBef>
+              <a:spcAft>
+                <a:spcPts val="0"/>
+              </a:spcAft>
+              <a:buClrTx/>
+              <a:buSzTx/>
+              <a:tabLst/>
+              <a:defRPr/>
+            </a:pPr>
+            <a:r>
+              <a:rPr kumimoji="0" lang="en-US" sz="1600" b="0" i="0" u="none" strike="noStrike" kern="1200" cap="none" spc="0" normalizeH="0" baseline="0" noProof="0" dirty="0" smtClean="0">
+                <a:ln>
+                  <a:noFill/>
+                </a:ln>
+                <a:solidFill>
+                  <a:schemeClr val="tx1"/>
+                </a:solidFill>
+                <a:effectLst/>
+                <a:uLnTx/>
+                <a:uFillTx/>
+                <a:latin typeface="Cambria" pitchFamily="18" charset="0"/>
+                <a:ea typeface="+mn-ea"/>
+                <a:cs typeface="+mn-cs"/>
+              </a:rPr>
+              <a:t>email: </a:t>
+            </a:r>
+            <a:r>
+              <a:rPr kumimoji="0" lang="en-US" sz="1600" b="0" i="0" u="none" strike="noStrike" kern="1200" cap="none" spc="0" normalizeH="0" baseline="0" noProof="0" dirty="0" smtClean="0">
+                <a:ln>
+                  <a:noFill/>
+                </a:ln>
+                <a:solidFill>
+                  <a:schemeClr val="tx1"/>
+                </a:solidFill>
+                <a:effectLst/>
+                <a:uLnTx/>
+                <a:uFillTx/>
+                <a:latin typeface="Cambria" pitchFamily="18" charset="0"/>
+                <a:ea typeface="+mn-ea"/>
+                <a:cs typeface="+mn-cs"/>
+                <a:hlinkClick r:id="rId2"/>
+              </a:rPr>
+              <a:t>proffraja@gmail.com</a:t>
+            </a:r>
+            <a:endParaRPr lang="en-US" sz="1600" dirty="0" smtClean="0">
+              <a:latin typeface="Cambria" pitchFamily="18" charset="0"/>
+            </a:endParaRPr>
+          </a:p>
+          <a:p>
+            <a:pPr marL="342900" marR="0" lvl="0" indent="-342900" algn="r" defTabSz="914400" rtl="0" eaLnBrk="1" fontAlgn="auto" latinLnBrk="0" hangingPunct="1">
+              <a:lnSpc>
+                <a:spcPct val="100000"/>
+              </a:lnSpc>
+              <a:spcBef>
+                <a:spcPct val="20000"/>
+              </a:spcBef>
+              <a:spcAft>
+                <a:spcPts val="0"/>
+              </a:spcAft>
+              <a:buClrTx/>
+              <a:buSzTx/>
+              <a:tabLst/>
+              <a:defRPr/>
+            </a:pPr>
+            <a:r>
+              <a:rPr lang="en-US" sz="1600" dirty="0" err="1" smtClean="0">
+                <a:latin typeface="Cambria" pitchFamily="18" charset="0"/>
+              </a:rPr>
+              <a:t>Github:</a:t>
+            </a:r>
+            <a:r>
+              <a:rPr lang="en-US" sz="1600" dirty="0" err="1" smtClean="0">
+                <a:latin typeface="Cambria" pitchFamily="18" charset="0"/>
+                <a:hlinkClick r:id="rId3"/>
+              </a:rPr>
+              <a:t>www.github.com</a:t>
+            </a:r>
+            <a:r>
+              <a:rPr lang="en-US" sz="1600" dirty="0" smtClean="0">
+                <a:latin typeface="Cambria" pitchFamily="18" charset="0"/>
+                <a:hlinkClick r:id="rId3"/>
+              </a:rPr>
+              <a:t>/</a:t>
+            </a:r>
+            <a:r>
+              <a:rPr lang="en-US" sz="1600" dirty="0" err="1" smtClean="0">
+                <a:latin typeface="Cambria" pitchFamily="18" charset="0"/>
+                <a:hlinkClick r:id="rId3"/>
+              </a:rPr>
+              <a:t>rajasekaranap</a:t>
+            </a:r>
+            <a:endParaRPr lang="en-US" sz="1600" dirty="0" smtClean="0">
+              <a:latin typeface="Cambria" pitchFamily="18" charset="0"/>
+            </a:endParaRPr>
+          </a:p>
+          <a:p>
+            <a:pPr marL="342900" marR="0" lvl="0" indent="-342900" algn="r" defTabSz="914400" rtl="0" eaLnBrk="1" fontAlgn="auto" latinLnBrk="0" hangingPunct="1">
+              <a:lnSpc>
+                <a:spcPct val="100000"/>
+              </a:lnSpc>
+              <a:spcBef>
+                <a:spcPct val="20000"/>
+              </a:spcBef>
+              <a:spcAft>
+                <a:spcPts val="0"/>
+              </a:spcAft>
+              <a:buClrTx/>
+              <a:buSzTx/>
+              <a:tabLst/>
+              <a:defRPr/>
+            </a:pPr>
+            <a:endParaRPr lang="en-US" sz="1600" dirty="0" smtClean="0">
+              <a:latin typeface="Cambria" pitchFamily="18" charset="0"/>
+            </a:endParaRPr>
+          </a:p>
+        </p:txBody>
+      </p:sp>
+    </p:spTree>
+  </p:cSld>
+  <p:clrMapOvr>
+    <a:masterClrMapping/>
+  </p:clrMapOvr>
+  <p:timing>
+    <p:tnLst>
+      <p:par>
+        <p:cTn id="1" dur="indefinite" restart="never" nodeType="tmRoot"/>
+      </p:par>
+    </p:tnLst>
+  </p:timing>
 </p:sld>
 </file>
 

</xml_diff>